<commit_message>
add text analysis slides
</commit_message>
<xml_diff>
--- a/lectures/text-analysis.pptx
+++ b/lectures/text-analysis.pptx
@@ -13,15 +13,15 @@
     <p:sldId id="286" r:id="rId7"/>
     <p:sldId id="278" r:id="rId8"/>
     <p:sldId id="277" r:id="rId9"/>
-    <p:sldId id="279" r:id="rId10"/>
-    <p:sldId id="287" r:id="rId11"/>
-    <p:sldId id="288" r:id="rId12"/>
-    <p:sldId id="281" r:id="rId13"/>
-    <p:sldId id="280" r:id="rId14"/>
-    <p:sldId id="257" r:id="rId15"/>
-    <p:sldId id="273" r:id="rId16"/>
-    <p:sldId id="282" r:id="rId17"/>
-    <p:sldId id="283" r:id="rId18"/>
+    <p:sldId id="287" r:id="rId10"/>
+    <p:sldId id="288" r:id="rId11"/>
+    <p:sldId id="279" r:id="rId12"/>
+    <p:sldId id="628" r:id="rId13"/>
+    <p:sldId id="281" r:id="rId14"/>
+    <p:sldId id="280" r:id="rId15"/>
+    <p:sldId id="257" r:id="rId16"/>
+    <p:sldId id="283" r:id="rId17"/>
+    <p:sldId id="282" r:id="rId18"/>
     <p:sldId id="536" r:id="rId19"/>
     <p:sldId id="537" r:id="rId20"/>
     <p:sldId id="606" r:id="rId21"/>
@@ -266,7 +266,7 @@
           <a:p>
             <a:fld id="{A1D2A1B3-83D7-468C-9D29-E73E42EAB5F6}" type="datetimeFigureOut">
               <a:rPr lang="en-US" smtClean="0"/>
-              <a:t>2/17/2020</a:t>
+              <a:t>1/29/2024</a:t>
             </a:fld>
             <a:endParaRPr lang="en-US"/>
           </a:p>
@@ -434,7 +434,7 @@
           <a:p>
             <a:fld id="{A1D2A1B3-83D7-468C-9D29-E73E42EAB5F6}" type="datetimeFigureOut">
               <a:rPr lang="en-US" smtClean="0"/>
-              <a:t>2/17/2020</a:t>
+              <a:t>1/29/2024</a:t>
             </a:fld>
             <a:endParaRPr lang="en-US"/>
           </a:p>
@@ -612,7 +612,7 @@
           <a:p>
             <a:fld id="{A1D2A1B3-83D7-468C-9D29-E73E42EAB5F6}" type="datetimeFigureOut">
               <a:rPr lang="en-US" smtClean="0"/>
-              <a:t>2/17/2020</a:t>
+              <a:t>1/29/2024</a:t>
             </a:fld>
             <a:endParaRPr lang="en-US"/>
           </a:p>
@@ -820,7 +820,7 @@
           <a:p>
             <a:fld id="{2C184D62-E87B-4E78-8D51-A71AAF7EFE70}" type="datetime1">
               <a:rPr lang="en-US" smtClean="0"/>
-              <a:t>2/17/2020</a:t>
+              <a:t>1/29/2024</a:t>
             </a:fld>
             <a:endParaRPr lang="en-US"/>
           </a:p>
@@ -1018,7 +1018,7 @@
           <a:p>
             <a:fld id="{C656BC0E-6968-47DA-9DB9-D508F49A0C0D}" type="datetime1">
               <a:rPr lang="en-US" smtClean="0"/>
-              <a:t>2/17/2020</a:t>
+              <a:t>1/29/2024</a:t>
             </a:fld>
             <a:endParaRPr lang="en-US"/>
           </a:p>
@@ -1293,7 +1293,7 @@
           <a:p>
             <a:fld id="{2588A9C0-7A89-4285-8B2D-1E4FA1910F1E}" type="datetime1">
               <a:rPr lang="en-US" smtClean="0"/>
-              <a:t>2/17/2020</a:t>
+              <a:t>1/29/2024</a:t>
             </a:fld>
             <a:endParaRPr lang="en-US"/>
           </a:p>
@@ -1558,7 +1558,7 @@
           <a:p>
             <a:fld id="{DA5CC23E-F11C-48D9-AE55-0EF6324A9F73}" type="datetime1">
               <a:rPr lang="en-US" smtClean="0"/>
-              <a:t>2/17/2020</a:t>
+              <a:t>1/29/2024</a:t>
             </a:fld>
             <a:endParaRPr lang="en-US"/>
           </a:p>
@@ -1970,7 +1970,7 @@
           <a:p>
             <a:fld id="{E6454B23-E954-413E-A340-E1B67CB96215}" type="datetime1">
               <a:rPr lang="en-US" smtClean="0"/>
-              <a:t>2/17/2020</a:t>
+              <a:t>1/29/2024</a:t>
             </a:fld>
             <a:endParaRPr lang="en-US"/>
           </a:p>
@@ -2111,7 +2111,7 @@
           <a:p>
             <a:fld id="{98D01C05-EBE7-4848-9605-17FA64F26282}" type="datetime1">
               <a:rPr lang="en-US" smtClean="0"/>
-              <a:t>2/17/2020</a:t>
+              <a:t>1/29/2024</a:t>
             </a:fld>
             <a:endParaRPr lang="en-US"/>
           </a:p>
@@ -2224,7 +2224,7 @@
           <a:p>
             <a:fld id="{2DF4748F-0361-4B75-9FB6-0FD67B2CAA53}" type="datetime1">
               <a:rPr lang="en-US" smtClean="0"/>
-              <a:t>2/17/2020</a:t>
+              <a:t>1/29/2024</a:t>
             </a:fld>
             <a:endParaRPr lang="en-US"/>
           </a:p>
@@ -2535,7 +2535,7 @@
           <a:p>
             <a:fld id="{B719F1C2-23BD-4B0F-AE95-81945CE4C218}" type="datetime1">
               <a:rPr lang="en-US" smtClean="0"/>
-              <a:t>2/17/2020</a:t>
+              <a:t>1/29/2024</a:t>
             </a:fld>
             <a:endParaRPr lang="en-US"/>
           </a:p>
@@ -2715,7 +2715,7 @@
           <a:p>
             <a:fld id="{A1D2A1B3-83D7-468C-9D29-E73E42EAB5F6}" type="datetimeFigureOut">
               <a:rPr lang="en-US" smtClean="0"/>
-              <a:t>2/17/2020</a:t>
+              <a:t>1/29/2024</a:t>
             </a:fld>
             <a:endParaRPr lang="en-US"/>
           </a:p>
@@ -2991,7 +2991,7 @@
           <a:p>
             <a:fld id="{F43C9308-E77D-4F00-A0E0-E2C48A09AD1C}" type="datetime1">
               <a:rPr lang="en-US" smtClean="0"/>
-              <a:t>2/17/2020</a:t>
+              <a:t>1/29/2024</a:t>
             </a:fld>
             <a:endParaRPr lang="en-US"/>
           </a:p>
@@ -3189,7 +3189,7 @@
           <a:p>
             <a:fld id="{0BF6E970-6936-4886-BB3E-53EA998AF177}" type="datetime1">
               <a:rPr lang="en-US" smtClean="0"/>
-              <a:t>2/17/2020</a:t>
+              <a:t>1/29/2024</a:t>
             </a:fld>
             <a:endParaRPr lang="en-US"/>
           </a:p>
@@ -3397,7 +3397,7 @@
           <a:p>
             <a:fld id="{12FEA7D1-46F2-462B-AA03-0A881131FDBD}" type="datetime1">
               <a:rPr lang="en-US" smtClean="0"/>
-              <a:t>2/17/2020</a:t>
+              <a:t>1/29/2024</a:t>
             </a:fld>
             <a:endParaRPr lang="en-US"/>
           </a:p>
@@ -3650,7 +3650,7 @@
             <a:fld id="{025C7DB5-6BF9-4FFF-A9F4-6DC7CC4F06D1}" type="datetimeFigureOut">
               <a:rPr lang="en-US" smtClean="0"/>
               <a:pPr/>
-              <a:t>2/17/2020</a:t>
+              <a:t>1/29/2024</a:t>
             </a:fld>
             <a:endParaRPr lang="en-US"/>
           </a:p>
@@ -3820,7 +3820,7 @@
             <a:fld id="{025C7DB5-6BF9-4FFF-A9F4-6DC7CC4F06D1}" type="datetimeFigureOut">
               <a:rPr lang="en-US" smtClean="0"/>
               <a:pPr/>
-              <a:t>2/17/2020</a:t>
+              <a:t>1/29/2024</a:t>
             </a:fld>
             <a:endParaRPr lang="en-US"/>
           </a:p>
@@ -4067,7 +4067,7 @@
             <a:fld id="{025C7DB5-6BF9-4FFF-A9F4-6DC7CC4F06D1}" type="datetimeFigureOut">
               <a:rPr lang="en-US" smtClean="0"/>
               <a:pPr/>
-              <a:t>2/17/2020</a:t>
+              <a:t>1/29/2024</a:t>
             </a:fld>
             <a:endParaRPr lang="en-US"/>
           </a:p>
@@ -4354,7 +4354,7 @@
             <a:fld id="{025C7DB5-6BF9-4FFF-A9F4-6DC7CC4F06D1}" type="datetimeFigureOut">
               <a:rPr lang="en-US" smtClean="0"/>
               <a:pPr/>
-              <a:t>2/17/2020</a:t>
+              <a:t>1/29/2024</a:t>
             </a:fld>
             <a:endParaRPr lang="en-US"/>
           </a:p>
@@ -4775,7 +4775,7 @@
             <a:fld id="{025C7DB5-6BF9-4FFF-A9F4-6DC7CC4F06D1}" type="datetimeFigureOut">
               <a:rPr lang="en-US" smtClean="0"/>
               <a:pPr/>
-              <a:t>2/17/2020</a:t>
+              <a:t>1/29/2024</a:t>
             </a:fld>
             <a:endParaRPr lang="en-US"/>
           </a:p>
@@ -4894,7 +4894,7 @@
             <a:fld id="{025C7DB5-6BF9-4FFF-A9F4-6DC7CC4F06D1}" type="datetimeFigureOut">
               <a:rPr lang="en-US" smtClean="0"/>
               <a:pPr/>
-              <a:t>2/17/2020</a:t>
+              <a:t>1/29/2024</a:t>
             </a:fld>
             <a:endParaRPr lang="en-US"/>
           </a:p>
@@ -4991,7 +4991,7 @@
             <a:fld id="{025C7DB5-6BF9-4FFF-A9F4-6DC7CC4F06D1}" type="datetimeFigureOut">
               <a:rPr lang="en-US" smtClean="0"/>
               <a:pPr/>
-              <a:t>2/17/2020</a:t>
+              <a:t>1/29/2024</a:t>
             </a:fld>
             <a:endParaRPr lang="en-US"/>
           </a:p>
@@ -5237,7 +5237,7 @@
           <a:p>
             <a:fld id="{A1D2A1B3-83D7-468C-9D29-E73E42EAB5F6}" type="datetimeFigureOut">
               <a:rPr lang="en-US" smtClean="0"/>
-              <a:t>2/17/2020</a:t>
+              <a:t>1/29/2024</a:t>
             </a:fld>
             <a:endParaRPr lang="en-US"/>
           </a:p>
@@ -5513,7 +5513,7 @@
             <a:fld id="{025C7DB5-6BF9-4FFF-A9F4-6DC7CC4F06D1}" type="datetimeFigureOut">
               <a:rPr lang="en-US" smtClean="0"/>
               <a:pPr/>
-              <a:t>2/17/2020</a:t>
+              <a:t>1/29/2024</a:t>
             </a:fld>
             <a:endParaRPr lang="en-US"/>
           </a:p>
@@ -5767,7 +5767,7 @@
             <a:fld id="{025C7DB5-6BF9-4FFF-A9F4-6DC7CC4F06D1}" type="datetimeFigureOut">
               <a:rPr lang="en-US" smtClean="0"/>
               <a:pPr/>
-              <a:t>2/17/2020</a:t>
+              <a:t>1/29/2024</a:t>
             </a:fld>
             <a:endParaRPr lang="en-US"/>
           </a:p>
@@ -5937,7 +5937,7 @@
             <a:fld id="{025C7DB5-6BF9-4FFF-A9F4-6DC7CC4F06D1}" type="datetimeFigureOut">
               <a:rPr lang="en-US" smtClean="0"/>
               <a:pPr/>
-              <a:t>2/17/2020</a:t>
+              <a:t>1/29/2024</a:t>
             </a:fld>
             <a:endParaRPr lang="en-US"/>
           </a:p>
@@ -6117,7 +6117,7 @@
             <a:fld id="{025C7DB5-6BF9-4FFF-A9F4-6DC7CC4F06D1}" type="datetimeFigureOut">
               <a:rPr lang="en-US" smtClean="0"/>
               <a:pPr/>
-              <a:t>2/17/2020</a:t>
+              <a:t>1/29/2024</a:t>
             </a:fld>
             <a:endParaRPr lang="en-US"/>
           </a:p>
@@ -6326,7 +6326,7 @@
           <a:p>
             <a:fld id="{BE1184C5-9966-4E4D-8B26-F4A142CBDA78}" type="datetimeFigureOut">
               <a:rPr lang="en-US" smtClean="0"/>
-              <a:t>2/17/2020</a:t>
+              <a:t>1/29/2024</a:t>
             </a:fld>
             <a:endParaRPr lang="en-US"/>
           </a:p>
@@ -6524,7 +6524,7 @@
           <a:p>
             <a:fld id="{BE1184C5-9966-4E4D-8B26-F4A142CBDA78}" type="datetimeFigureOut">
               <a:rPr lang="en-US" smtClean="0"/>
-              <a:t>2/17/2020</a:t>
+              <a:t>1/29/2024</a:t>
             </a:fld>
             <a:endParaRPr lang="en-US"/>
           </a:p>
@@ -6799,7 +6799,7 @@
           <a:p>
             <a:fld id="{BE1184C5-9966-4E4D-8B26-F4A142CBDA78}" type="datetimeFigureOut">
               <a:rPr lang="en-US" smtClean="0"/>
-              <a:t>2/17/2020</a:t>
+              <a:t>1/29/2024</a:t>
             </a:fld>
             <a:endParaRPr lang="en-US"/>
           </a:p>
@@ -7064,7 +7064,7 @@
           <a:p>
             <a:fld id="{BE1184C5-9966-4E4D-8B26-F4A142CBDA78}" type="datetimeFigureOut">
               <a:rPr lang="en-US" smtClean="0"/>
-              <a:t>2/17/2020</a:t>
+              <a:t>1/29/2024</a:t>
             </a:fld>
             <a:endParaRPr lang="en-US"/>
           </a:p>
@@ -7476,7 +7476,7 @@
           <a:p>
             <a:fld id="{BE1184C5-9966-4E4D-8B26-F4A142CBDA78}" type="datetimeFigureOut">
               <a:rPr lang="en-US" smtClean="0"/>
-              <a:t>2/17/2020</a:t>
+              <a:t>1/29/2024</a:t>
             </a:fld>
             <a:endParaRPr lang="en-US"/>
           </a:p>
@@ -7617,7 +7617,7 @@
           <a:p>
             <a:fld id="{BE1184C5-9966-4E4D-8B26-F4A142CBDA78}" type="datetimeFigureOut">
               <a:rPr lang="en-US" smtClean="0"/>
-              <a:t>2/17/2020</a:t>
+              <a:t>1/29/2024</a:t>
             </a:fld>
             <a:endParaRPr lang="en-US"/>
           </a:p>
@@ -7858,7 +7858,7 @@
           <a:p>
             <a:fld id="{A1D2A1B3-83D7-468C-9D29-E73E42EAB5F6}" type="datetimeFigureOut">
               <a:rPr lang="en-US" smtClean="0"/>
-              <a:t>2/17/2020</a:t>
+              <a:t>1/29/2024</a:t>
             </a:fld>
             <a:endParaRPr lang="en-US"/>
           </a:p>
@@ -7959,7 +7959,7 @@
           <a:p>
             <a:fld id="{BE1184C5-9966-4E4D-8B26-F4A142CBDA78}" type="datetimeFigureOut">
               <a:rPr lang="en-US" smtClean="0"/>
-              <a:t>2/17/2020</a:t>
+              <a:t>1/29/2024</a:t>
             </a:fld>
             <a:endParaRPr lang="en-US"/>
           </a:p>
@@ -8270,7 +8270,7 @@
           <a:p>
             <a:fld id="{BE1184C5-9966-4E4D-8B26-F4A142CBDA78}" type="datetimeFigureOut">
               <a:rPr lang="en-US" smtClean="0"/>
-              <a:t>2/17/2020</a:t>
+              <a:t>1/29/2024</a:t>
             </a:fld>
             <a:endParaRPr lang="en-US"/>
           </a:p>
@@ -8558,7 +8558,7 @@
           <a:p>
             <a:fld id="{BE1184C5-9966-4E4D-8B26-F4A142CBDA78}" type="datetimeFigureOut">
               <a:rPr lang="en-US" smtClean="0"/>
-              <a:t>2/17/2020</a:t>
+              <a:t>1/29/2024</a:t>
             </a:fld>
             <a:endParaRPr lang="en-US"/>
           </a:p>
@@ -8756,7 +8756,7 @@
           <a:p>
             <a:fld id="{BE1184C5-9966-4E4D-8B26-F4A142CBDA78}" type="datetimeFigureOut">
               <a:rPr lang="en-US" smtClean="0"/>
-              <a:t>2/17/2020</a:t>
+              <a:t>1/29/2024</a:t>
             </a:fld>
             <a:endParaRPr lang="en-US"/>
           </a:p>
@@ -8964,7 +8964,7 @@
           <a:p>
             <a:fld id="{BE1184C5-9966-4E4D-8B26-F4A142CBDA78}" type="datetimeFigureOut">
               <a:rPr lang="en-US" smtClean="0"/>
-              <a:t>2/17/2020</a:t>
+              <a:t>1/29/2024</a:t>
             </a:fld>
             <a:endParaRPr lang="en-US"/>
           </a:p>
@@ -9166,7 +9166,7 @@
           <a:p>
             <a:fld id="{5F8CB659-BAAB-4DA9-8080-ED588401F2FB}" type="datetimeFigureOut">
               <a:rPr lang="en-US" smtClean="0"/>
-              <a:t>2/17/2020</a:t>
+              <a:t>1/29/2024</a:t>
             </a:fld>
             <a:endParaRPr lang="en-US"/>
           </a:p>
@@ -9334,7 +9334,7 @@
           <a:p>
             <a:fld id="{5F8CB659-BAAB-4DA9-8080-ED588401F2FB}" type="datetimeFigureOut">
               <a:rPr lang="en-US" smtClean="0"/>
-              <a:t>2/17/2020</a:t>
+              <a:t>1/29/2024</a:t>
             </a:fld>
             <a:endParaRPr lang="en-US"/>
           </a:p>
@@ -9579,7 +9579,7 @@
           <a:p>
             <a:fld id="{5F8CB659-BAAB-4DA9-8080-ED588401F2FB}" type="datetimeFigureOut">
               <a:rPr lang="en-US" smtClean="0"/>
-              <a:t>2/17/2020</a:t>
+              <a:t>1/29/2024</a:t>
             </a:fld>
             <a:endParaRPr lang="en-US"/>
           </a:p>
@@ -9808,7 +9808,7 @@
           <a:p>
             <a:fld id="{5F8CB659-BAAB-4DA9-8080-ED588401F2FB}" type="datetimeFigureOut">
               <a:rPr lang="en-US" smtClean="0"/>
-              <a:t>2/17/2020</a:t>
+              <a:t>1/29/2024</a:t>
             </a:fld>
             <a:endParaRPr lang="en-US"/>
           </a:p>
@@ -10172,7 +10172,7 @@
           <a:p>
             <a:fld id="{5F8CB659-BAAB-4DA9-8080-ED588401F2FB}" type="datetimeFigureOut">
               <a:rPr lang="en-US" smtClean="0"/>
-              <a:t>2/17/2020</a:t>
+              <a:t>1/29/2024</a:t>
             </a:fld>
             <a:endParaRPr lang="en-US"/>
           </a:p>
@@ -10536,7 +10536,7 @@
           <a:p>
             <a:fld id="{A1D2A1B3-83D7-468C-9D29-E73E42EAB5F6}" type="datetimeFigureOut">
               <a:rPr lang="en-US" smtClean="0"/>
-              <a:t>2/17/2020</a:t>
+              <a:t>1/29/2024</a:t>
             </a:fld>
             <a:endParaRPr lang="en-US"/>
           </a:p>
@@ -10653,7 +10653,7 @@
           <a:p>
             <a:fld id="{5F8CB659-BAAB-4DA9-8080-ED588401F2FB}" type="datetimeFigureOut">
               <a:rPr lang="en-US" smtClean="0"/>
-              <a:t>2/17/2020</a:t>
+              <a:t>1/29/2024</a:t>
             </a:fld>
             <a:endParaRPr lang="en-US"/>
           </a:p>
@@ -10748,7 +10748,7 @@
           <a:p>
             <a:fld id="{5F8CB659-BAAB-4DA9-8080-ED588401F2FB}" type="datetimeFigureOut">
               <a:rPr lang="en-US" smtClean="0"/>
-              <a:t>2/17/2020</a:t>
+              <a:t>1/29/2024</a:t>
             </a:fld>
             <a:endParaRPr lang="en-US"/>
           </a:p>
@@ -11023,7 +11023,7 @@
           <a:p>
             <a:fld id="{5F8CB659-BAAB-4DA9-8080-ED588401F2FB}" type="datetimeFigureOut">
               <a:rPr lang="en-US" smtClean="0"/>
-              <a:t>2/17/2020</a:t>
+              <a:t>1/29/2024</a:t>
             </a:fld>
             <a:endParaRPr lang="en-US"/>
           </a:p>
@@ -11275,7 +11275,7 @@
           <a:p>
             <a:fld id="{5F8CB659-BAAB-4DA9-8080-ED588401F2FB}" type="datetimeFigureOut">
               <a:rPr lang="en-US" smtClean="0"/>
-              <a:t>2/17/2020</a:t>
+              <a:t>1/29/2024</a:t>
             </a:fld>
             <a:endParaRPr lang="en-US"/>
           </a:p>
@@ -11443,7 +11443,7 @@
           <a:p>
             <a:fld id="{5F8CB659-BAAB-4DA9-8080-ED588401F2FB}" type="datetimeFigureOut">
               <a:rPr lang="en-US" smtClean="0"/>
-              <a:t>2/17/2020</a:t>
+              <a:t>1/29/2024</a:t>
             </a:fld>
             <a:endParaRPr lang="en-US"/>
           </a:p>
@@ -11621,7 +11621,7 @@
           <a:p>
             <a:fld id="{5F8CB659-BAAB-4DA9-8080-ED588401F2FB}" type="datetimeFigureOut">
               <a:rPr lang="en-US" smtClean="0"/>
-              <a:t>2/17/2020</a:t>
+              <a:t>1/29/2024</a:t>
             </a:fld>
             <a:endParaRPr lang="en-US"/>
           </a:p>
@@ -11738,7 +11738,7 @@
           <a:p>
             <a:fld id="{A1D2A1B3-83D7-468C-9D29-E73E42EAB5F6}" type="datetimeFigureOut">
               <a:rPr lang="en-US" smtClean="0"/>
-              <a:t>2/17/2020</a:t>
+              <a:t>1/29/2024</a:t>
             </a:fld>
             <a:endParaRPr lang="en-US"/>
           </a:p>
@@ -11833,7 +11833,7 @@
           <a:p>
             <a:fld id="{A1D2A1B3-83D7-468C-9D29-E73E42EAB5F6}" type="datetimeFigureOut">
               <a:rPr lang="en-US" smtClean="0"/>
-              <a:t>2/17/2020</a:t>
+              <a:t>1/29/2024</a:t>
             </a:fld>
             <a:endParaRPr lang="en-US"/>
           </a:p>
@@ -12108,7 +12108,7 @@
           <a:p>
             <a:fld id="{A1D2A1B3-83D7-468C-9D29-E73E42EAB5F6}" type="datetimeFigureOut">
               <a:rPr lang="en-US" smtClean="0"/>
-              <a:t>2/17/2020</a:t>
+              <a:t>1/29/2024</a:t>
             </a:fld>
             <a:endParaRPr lang="en-US"/>
           </a:p>
@@ -12360,7 +12360,7 @@
           <a:p>
             <a:fld id="{A1D2A1B3-83D7-468C-9D29-E73E42EAB5F6}" type="datetimeFigureOut">
               <a:rPr lang="en-US" smtClean="0"/>
-              <a:t>2/17/2020</a:t>
+              <a:t>1/29/2024</a:t>
             </a:fld>
             <a:endParaRPr lang="en-US"/>
           </a:p>
@@ -12571,7 +12571,7 @@
           <a:p>
             <a:fld id="{A1D2A1B3-83D7-468C-9D29-E73E42EAB5F6}" type="datetimeFigureOut">
               <a:rPr lang="en-US" smtClean="0"/>
-              <a:t>2/17/2020</a:t>
+              <a:t>1/29/2024</a:t>
             </a:fld>
             <a:endParaRPr lang="en-US"/>
           </a:p>
@@ -13127,7 +13127,7 @@
           <a:p>
             <a:fld id="{37598191-276C-495B-A44A-B9D8EBF2CD4E}" type="datetime1">
               <a:rPr lang="en-US" smtClean="0"/>
-              <a:t>2/17/2020</a:t>
+              <a:t>1/29/2024</a:t>
             </a:fld>
             <a:endParaRPr lang="en-US"/>
           </a:p>
@@ -13679,7 +13679,7 @@
             <a:fld id="{025C7DB5-6BF9-4FFF-A9F4-6DC7CC4F06D1}" type="datetimeFigureOut">
               <a:rPr lang="en-US" smtClean="0"/>
               <a:pPr/>
-              <a:t>2/17/2020</a:t>
+              <a:t>1/29/2024</a:t>
             </a:fld>
             <a:endParaRPr lang="en-US"/>
           </a:p>
@@ -14206,7 +14206,7 @@
           <a:p>
             <a:fld id="{BE1184C5-9966-4E4D-8B26-F4A142CBDA78}" type="datetimeFigureOut">
               <a:rPr lang="en-US" smtClean="0"/>
-              <a:t>2/17/2020</a:t>
+              <a:t>1/29/2024</a:t>
             </a:fld>
             <a:endParaRPr lang="en-US"/>
           </a:p>
@@ -14756,7 +14756,7 @@
           <a:p>
             <a:fld id="{5F8CB659-BAAB-4DA9-8080-ED588401F2FB}" type="datetimeFigureOut">
               <a:rPr lang="en-US" smtClean="0"/>
-              <a:t>2/17/2020</a:t>
+              <a:t>1/29/2024</a:t>
             </a:fld>
             <a:endParaRPr lang="en-US"/>
           </a:p>
@@ -15300,6 +15300,178 @@
 <file path=ppt/slides/slide10.xml><?xml version="1.0" encoding="utf-8"?>
 <p:sld xmlns:a="http://schemas.openxmlformats.org/drawingml/2006/main" xmlns:r="http://schemas.openxmlformats.org/officeDocument/2006/relationships" xmlns:p="http://schemas.openxmlformats.org/presentationml/2006/main">
   <p:cSld>
+    <p:bg>
+      <p:bgPr>
+        <a:solidFill>
+          <a:schemeClr val="bg2">
+            <a:lumMod val="25000"/>
+          </a:schemeClr>
+        </a:solidFill>
+        <a:effectLst/>
+      </p:bgPr>
+    </p:bg>
+    <p:spTree>
+      <p:nvGrpSpPr>
+        <p:cNvPr id="1" name=""/>
+        <p:cNvGrpSpPr/>
+        <p:nvPr/>
+      </p:nvGrpSpPr>
+      <p:grpSpPr>
+        <a:xfrm>
+          <a:off x="0" y="0"/>
+          <a:ext cx="0" cy="0"/>
+          <a:chOff x="0" y="0"/>
+          <a:chExt cx="0" cy="0"/>
+        </a:xfrm>
+      </p:grpSpPr>
+      <p:sp>
+        <p:nvSpPr>
+          <p:cNvPr id="2" name="Title 1">
+            <a:extLst>
+              <a:ext uri="{FF2B5EF4-FFF2-40B4-BE49-F238E27FC236}">
+                <a16:creationId xmlns:a16="http://schemas.microsoft.com/office/drawing/2014/main" id="{F949266A-EDBD-4981-AC19-0432B39789F9}"/>
+              </a:ext>
+            </a:extLst>
+          </p:cNvPr>
+          <p:cNvSpPr>
+            <a:spLocks noGrp="1"/>
+          </p:cNvSpPr>
+          <p:nvPr>
+            <p:ph type="ctrTitle"/>
+          </p:nvPr>
+        </p:nvSpPr>
+        <p:spPr>
+          <a:xfrm>
+            <a:off x="1154984" y="989045"/>
+            <a:ext cx="9663954" cy="2387600"/>
+          </a:xfrm>
+        </p:spPr>
+        <p:txBody>
+          <a:bodyPr>
+            <a:noAutofit/>
+          </a:bodyPr>
+          <a:lstStyle/>
+          <a:p>
+            <a:r>
+              <a:rPr lang="en-US" sz="8000" cap="small" dirty="0">
+                <a:solidFill>
+                  <a:schemeClr val="bg1"/>
+                </a:solidFill>
+              </a:rPr>
+              <a:t>Machine Learning</a:t>
+            </a:r>
+          </a:p>
+        </p:txBody>
+      </p:sp>
+      <p:cxnSp>
+        <p:nvCxnSpPr>
+          <p:cNvPr id="5" name="Straight Connector 4"/>
+          <p:cNvCxnSpPr/>
+          <p:nvPr/>
+        </p:nvCxnSpPr>
+        <p:spPr>
+          <a:xfrm>
+            <a:off x="3433666" y="3704252"/>
+            <a:ext cx="5271796" cy="0"/>
+          </a:xfrm>
+          <a:prstGeom prst="line">
+            <a:avLst/>
+          </a:prstGeom>
+          <a:ln w="22225">
+            <a:solidFill>
+              <a:schemeClr val="bg1"/>
+            </a:solidFill>
+          </a:ln>
+        </p:spPr>
+        <p:style>
+          <a:lnRef idx="1">
+            <a:schemeClr val="accent1"/>
+          </a:lnRef>
+          <a:fillRef idx="0">
+            <a:schemeClr val="accent1"/>
+          </a:fillRef>
+          <a:effectRef idx="0">
+            <a:schemeClr val="accent1"/>
+          </a:effectRef>
+          <a:fontRef idx="minor">
+            <a:schemeClr val="tx1"/>
+          </a:fontRef>
+        </p:style>
+      </p:cxnSp>
+      <p:sp>
+        <p:nvSpPr>
+          <p:cNvPr id="6" name="Title 1">
+            <a:extLst>
+              <a:ext uri="{FF2B5EF4-FFF2-40B4-BE49-F238E27FC236}">
+                <a16:creationId xmlns:a16="http://schemas.microsoft.com/office/drawing/2014/main" id="{F949266A-EDBD-4981-AC19-0432B39789F9}"/>
+              </a:ext>
+            </a:extLst>
+          </p:cNvPr>
+          <p:cNvSpPr txBox="1">
+            <a:spLocks/>
+          </p:cNvSpPr>
+          <p:nvPr/>
+        </p:nvSpPr>
+        <p:spPr>
+          <a:xfrm>
+            <a:off x="1064788" y="2510452"/>
+            <a:ext cx="9663954" cy="2387600"/>
+          </a:xfrm>
+          <a:prstGeom prst="rect">
+            <a:avLst/>
+          </a:prstGeom>
+        </p:spPr>
+        <p:txBody>
+          <a:bodyPr vert="horz" lIns="91440" tIns="45720" rIns="91440" bIns="45720" rtlCol="0" anchor="b">
+            <a:noAutofit/>
+          </a:bodyPr>
+          <a:lstStyle>
+            <a:lvl1pPr algn="ctr" defTabSz="914400" rtl="0" eaLnBrk="1" latinLnBrk="0" hangingPunct="1">
+              <a:lnSpc>
+                <a:spcPct val="90000"/>
+              </a:lnSpc>
+              <a:spcBef>
+                <a:spcPct val="0"/>
+              </a:spcBef>
+              <a:buNone/>
+              <a:defRPr sz="6000" kern="1200">
+                <a:solidFill>
+                  <a:schemeClr val="tx1"/>
+                </a:solidFill>
+                <a:latin typeface="+mj-lt"/>
+                <a:ea typeface="+mj-ea"/>
+                <a:cs typeface="+mj-cs"/>
+              </a:defRPr>
+            </a:lvl1pPr>
+          </a:lstStyle>
+          <a:p>
+            <a:r>
+              <a:rPr lang="en-US" cap="small" dirty="0">
+                <a:solidFill>
+                  <a:schemeClr val="bg1"/>
+                </a:solidFill>
+              </a:rPr>
+              <a:t>( classification )</a:t>
+            </a:r>
+          </a:p>
+        </p:txBody>
+      </p:sp>
+    </p:spTree>
+    <p:extLst>
+      <p:ext uri="{BB962C8B-B14F-4D97-AF65-F5344CB8AC3E}">
+        <p14:creationId xmlns:p14="http://schemas.microsoft.com/office/powerpoint/2010/main" val="788097437"/>
+      </p:ext>
+    </p:extLst>
+  </p:cSld>
+  <p:clrMapOvr>
+    <a:masterClrMapping/>
+  </p:clrMapOvr>
+</p:sld>
+</file>
+
+<file path=ppt/slides/slide11.xml><?xml version="1.0" encoding="utf-8"?>
+<p:sld xmlns:a="http://schemas.openxmlformats.org/drawingml/2006/main" xmlns:r="http://schemas.openxmlformats.org/officeDocument/2006/relationships" xmlns:p="http://schemas.openxmlformats.org/presentationml/2006/main">
+  <p:cSld>
     <p:spTree>
       <p:nvGrpSpPr>
         <p:cNvPr id="1" name=""/>
@@ -15468,1471 +15640,7 @@
 </p:sld>
 </file>
 
-<file path=ppt/slides/slide11.xml><?xml version="1.0" encoding="utf-8"?>
-<p:sld xmlns:a="http://schemas.openxmlformats.org/drawingml/2006/main" xmlns:r="http://schemas.openxmlformats.org/officeDocument/2006/relationships" xmlns:p="http://schemas.openxmlformats.org/presentationml/2006/main">
-  <p:cSld>
-    <p:bg>
-      <p:bgPr>
-        <a:solidFill>
-          <a:schemeClr val="bg2">
-            <a:lumMod val="25000"/>
-          </a:schemeClr>
-        </a:solidFill>
-        <a:effectLst/>
-      </p:bgPr>
-    </p:bg>
-    <p:spTree>
-      <p:nvGrpSpPr>
-        <p:cNvPr id="1" name=""/>
-        <p:cNvGrpSpPr/>
-        <p:nvPr/>
-      </p:nvGrpSpPr>
-      <p:grpSpPr>
-        <a:xfrm>
-          <a:off x="0" y="0"/>
-          <a:ext cx="0" cy="0"/>
-          <a:chOff x="0" y="0"/>
-          <a:chExt cx="0" cy="0"/>
-        </a:xfrm>
-      </p:grpSpPr>
-      <p:sp>
-        <p:nvSpPr>
-          <p:cNvPr id="2" name="Title 1">
-            <a:extLst>
-              <a:ext uri="{FF2B5EF4-FFF2-40B4-BE49-F238E27FC236}">
-                <a16:creationId xmlns:a16="http://schemas.microsoft.com/office/drawing/2014/main" id="{F949266A-EDBD-4981-AC19-0432B39789F9}"/>
-              </a:ext>
-            </a:extLst>
-          </p:cNvPr>
-          <p:cNvSpPr>
-            <a:spLocks noGrp="1"/>
-          </p:cNvSpPr>
-          <p:nvPr>
-            <p:ph type="ctrTitle"/>
-          </p:nvPr>
-        </p:nvSpPr>
-        <p:spPr>
-          <a:xfrm>
-            <a:off x="1250058" y="4135977"/>
-            <a:ext cx="9663954" cy="2387600"/>
-          </a:xfrm>
-        </p:spPr>
-        <p:txBody>
-          <a:bodyPr>
-            <a:noAutofit/>
-          </a:bodyPr>
-          <a:lstStyle/>
-          <a:p>
-            <a:br>
-              <a:rPr lang="en-US" sz="2800" dirty="0">
-                <a:solidFill>
-                  <a:schemeClr val="bg1"/>
-                </a:solidFill>
-              </a:rPr>
-            </a:br>
-            <a:br>
-              <a:rPr lang="en-US" sz="2800" dirty="0">
-                <a:solidFill>
-                  <a:schemeClr val="bg1"/>
-                </a:solidFill>
-              </a:rPr>
-            </a:br>
-            <a:br>
-              <a:rPr lang="en-US" sz="2800" dirty="0">
-                <a:solidFill>
-                  <a:schemeClr val="bg1"/>
-                </a:solidFill>
-              </a:rPr>
-            </a:br>
-            <a:br>
-              <a:rPr lang="en-US" sz="2800" dirty="0">
-                <a:solidFill>
-                  <a:schemeClr val="bg1"/>
-                </a:solidFill>
-              </a:rPr>
-            </a:br>
-            <a:r>
-              <a:rPr lang="en-US" sz="2800" dirty="0">
-                <a:solidFill>
-                  <a:schemeClr val="bg1"/>
-                </a:solidFill>
-              </a:rPr>
-              <a:t>Netflix provided a </a:t>
-            </a:r>
-            <a:r>
-              <a:rPr lang="en-US" sz="2800" i="1" dirty="0">
-                <a:solidFill>
-                  <a:schemeClr val="accent4"/>
-                </a:solidFill>
-              </a:rPr>
-              <a:t>training data set </a:t>
-            </a:r>
-            <a:r>
-              <a:rPr lang="en-US" sz="2800" dirty="0">
-                <a:solidFill>
-                  <a:schemeClr val="bg1"/>
-                </a:solidFill>
-              </a:rPr>
-              <a:t>of 100,480,507 ratings that 480,189 users gave to 17,770 movies, graded from 1 to 5 stars.</a:t>
-            </a:r>
-            <a:br>
-              <a:rPr lang="en-US" sz="2800" dirty="0">
-                <a:solidFill>
-                  <a:schemeClr val="bg1"/>
-                </a:solidFill>
-              </a:rPr>
-            </a:br>
-            <a:br>
-              <a:rPr lang="en-US" sz="2800" dirty="0">
-                <a:solidFill>
-                  <a:schemeClr val="bg1"/>
-                </a:solidFill>
-              </a:rPr>
-            </a:br>
-            <a:br>
-              <a:rPr lang="en-US" sz="2800" dirty="0">
-                <a:solidFill>
-                  <a:schemeClr val="bg1"/>
-                </a:solidFill>
-              </a:rPr>
-            </a:br>
-            <a:br>
-              <a:rPr lang="en-US" sz="2800" dirty="0">
-                <a:solidFill>
-                  <a:schemeClr val="bg1"/>
-                </a:solidFill>
-              </a:rPr>
-            </a:br>
-            <a:r>
-              <a:rPr lang="en-US" sz="2800" dirty="0">
-                <a:solidFill>
-                  <a:schemeClr val="bg1"/>
-                </a:solidFill>
-              </a:rPr>
-              <a:t>The </a:t>
-            </a:r>
-            <a:r>
-              <a:rPr lang="en-US" sz="2800" i="1" dirty="0">
-                <a:solidFill>
-                  <a:schemeClr val="accent4"/>
-                </a:solidFill>
-              </a:rPr>
-              <a:t>test set </a:t>
-            </a:r>
-            <a:r>
-              <a:rPr lang="en-US" sz="2800" dirty="0">
-                <a:solidFill>
-                  <a:schemeClr val="bg1"/>
-                </a:solidFill>
-              </a:rPr>
-              <a:t>of 1,408,789 ratings is used by the jury to determine potential prize winners. </a:t>
-            </a:r>
-            <a:br>
-              <a:rPr lang="en-US" sz="2800" dirty="0">
-                <a:solidFill>
-                  <a:schemeClr val="bg1"/>
-                </a:solidFill>
-              </a:rPr>
-            </a:br>
-            <a:br>
-              <a:rPr lang="en-US" sz="2800" dirty="0">
-                <a:solidFill>
-                  <a:schemeClr val="bg1"/>
-                </a:solidFill>
-              </a:rPr>
-            </a:br>
-            <a:r>
-              <a:rPr lang="en-US" sz="2400" dirty="0">
-                <a:solidFill>
-                  <a:schemeClr val="bg1"/>
-                </a:solidFill>
-              </a:rPr>
-              <a:t>In 2009 the </a:t>
-            </a:r>
-            <a:r>
-              <a:rPr lang="en-US" sz="2400" dirty="0">
-                <a:solidFill>
-                  <a:schemeClr val="accent4"/>
-                </a:solidFill>
-              </a:rPr>
-              <a:t>grand prize of $1,000,000</a:t>
-            </a:r>
-            <a:r>
-              <a:rPr lang="en-US" sz="2400" dirty="0">
-                <a:solidFill>
-                  <a:schemeClr val="bg1"/>
-                </a:solidFill>
-              </a:rPr>
-              <a:t> was given to the </a:t>
-            </a:r>
-            <a:r>
-              <a:rPr lang="en-US" sz="2400" dirty="0" err="1">
-                <a:solidFill>
-                  <a:schemeClr val="bg1"/>
-                </a:solidFill>
-              </a:rPr>
-              <a:t>BellKor's</a:t>
-            </a:r>
-            <a:r>
-              <a:rPr lang="en-US" sz="2400" dirty="0">
-                <a:solidFill>
-                  <a:schemeClr val="bg1"/>
-                </a:solidFill>
-              </a:rPr>
-              <a:t> Pragmatic Chaos team which </a:t>
-            </a:r>
-            <a:br>
-              <a:rPr lang="en-US" sz="2400" dirty="0">
-                <a:solidFill>
-                  <a:schemeClr val="bg1"/>
-                </a:solidFill>
-              </a:rPr>
-            </a:br>
-            <a:r>
-              <a:rPr lang="en-US" sz="2400" dirty="0">
-                <a:solidFill>
-                  <a:schemeClr val="accent4"/>
-                </a:solidFill>
-              </a:rPr>
-              <a:t>improved Netflix's own algorithm by 10%</a:t>
-            </a:r>
-            <a:endParaRPr lang="en-US" sz="1200" cap="small" dirty="0">
-              <a:solidFill>
-                <a:schemeClr val="accent4"/>
-              </a:solidFill>
-            </a:endParaRPr>
-          </a:p>
-        </p:txBody>
-      </p:sp>
-      <p:pic>
-        <p:nvPicPr>
-          <p:cNvPr id="3076" name="Picture 4" descr="Image result for star rating"/>
-          <p:cNvPicPr>
-            <a:picLocks noChangeAspect="1" noChangeArrowheads="1"/>
-          </p:cNvPicPr>
-          <p:nvPr/>
-        </p:nvPicPr>
-        <p:blipFill>
-          <a:blip r:embed="rId2" cstate="print">
-            <a:extLst>
-              <a:ext uri="{28A0092B-C50C-407E-A947-70E740481C1C}">
-                <a14:useLocalDpi xmlns:a14="http://schemas.microsoft.com/office/drawing/2010/main" val="0"/>
-              </a:ext>
-            </a:extLst>
-          </a:blip>
-          <a:srcRect/>
-          <a:stretch>
-            <a:fillRect/>
-          </a:stretch>
-        </p:blipFill>
-        <p:spPr bwMode="auto">
-          <a:xfrm>
-            <a:off x="4837208" y="3430394"/>
-            <a:ext cx="2489654" cy="485062"/>
-          </a:xfrm>
-          <a:prstGeom prst="rect">
-            <a:avLst/>
-          </a:prstGeom>
-          <a:noFill/>
-          <a:extLst>
-            <a:ext uri="{909E8E84-426E-40DD-AFC4-6F175D3DCCD1}">
-              <a14:hiddenFill xmlns:a14="http://schemas.microsoft.com/office/drawing/2010/main">
-                <a:solidFill>
-                  <a:srgbClr val="FFFFFF"/>
-                </a:solidFill>
-              </a14:hiddenFill>
-            </a:ext>
-          </a:extLst>
-        </p:spPr>
-      </p:pic>
-      <p:sp>
-        <p:nvSpPr>
-          <p:cNvPr id="5" name="Title 2"/>
-          <p:cNvSpPr txBox="1">
-            <a:spLocks/>
-          </p:cNvSpPr>
-          <p:nvPr/>
-        </p:nvSpPr>
-        <p:spPr>
-          <a:xfrm>
-            <a:off x="824235" y="131860"/>
-            <a:ext cx="10515600" cy="1325563"/>
-          </a:xfrm>
-          <a:prstGeom prst="rect">
-            <a:avLst/>
-          </a:prstGeom>
-        </p:spPr>
-        <p:txBody>
-          <a:bodyPr vert="horz" lIns="91440" tIns="45720" rIns="91440" bIns="45720" rtlCol="0" anchor="b">
-            <a:normAutofit/>
-          </a:bodyPr>
-          <a:lstStyle>
-            <a:lvl1pPr algn="ctr" defTabSz="914400" rtl="0" eaLnBrk="1" latinLnBrk="0" hangingPunct="1">
-              <a:lnSpc>
-                <a:spcPct val="90000"/>
-              </a:lnSpc>
-              <a:spcBef>
-                <a:spcPct val="0"/>
-              </a:spcBef>
-              <a:buNone/>
-              <a:defRPr sz="6000" kern="1200">
-                <a:solidFill>
-                  <a:schemeClr val="tx1"/>
-                </a:solidFill>
-                <a:latin typeface="+mj-lt"/>
-                <a:ea typeface="+mj-ea"/>
-                <a:cs typeface="+mj-cs"/>
-              </a:defRPr>
-            </a:lvl1pPr>
-          </a:lstStyle>
-          <a:p>
-            <a:r>
-              <a:rPr lang="en-US" sz="8000" dirty="0">
-                <a:solidFill>
-                  <a:schemeClr val="accent4"/>
-                </a:solidFill>
-                <a:latin typeface="Century Gothic" panose="020B0502020202020204" pitchFamily="34" charset="0"/>
-              </a:rPr>
-              <a:t>    The Netflix Prize</a:t>
-            </a:r>
-          </a:p>
-        </p:txBody>
-      </p:sp>
-      <p:pic>
-        <p:nvPicPr>
-          <p:cNvPr id="6" name="Picture 4" descr="Image result for netflix prize"/>
-          <p:cNvPicPr>
-            <a:picLocks noChangeAspect="1" noChangeArrowheads="1"/>
-          </p:cNvPicPr>
-          <p:nvPr/>
-        </p:nvPicPr>
-        <p:blipFill>
-          <a:blip r:embed="rId3" cstate="print">
-            <a:extLst>
-              <a:ext uri="{28A0092B-C50C-407E-A947-70E740481C1C}">
-                <a14:useLocalDpi xmlns:a14="http://schemas.microsoft.com/office/drawing/2010/main" val="0"/>
-              </a:ext>
-            </a:extLst>
-          </a:blip>
-          <a:srcRect/>
-          <a:stretch>
-            <a:fillRect/>
-          </a:stretch>
-        </p:blipFill>
-        <p:spPr bwMode="auto">
-          <a:xfrm>
-            <a:off x="754951" y="131860"/>
-            <a:ext cx="1717661" cy="1288246"/>
-          </a:xfrm>
-          <a:prstGeom prst="rect">
-            <a:avLst/>
-          </a:prstGeom>
-          <a:noFill/>
-          <a:extLst>
-            <a:ext uri="{909E8E84-426E-40DD-AFC4-6F175D3DCCD1}">
-              <a14:hiddenFill xmlns:a14="http://schemas.microsoft.com/office/drawing/2010/main">
-                <a:solidFill>
-                  <a:srgbClr val="FFFFFF"/>
-                </a:solidFill>
-              </a14:hiddenFill>
-            </a:ext>
-          </a:extLst>
-        </p:spPr>
-      </p:pic>
-    </p:spTree>
-    <p:extLst>
-      <p:ext uri="{BB962C8B-B14F-4D97-AF65-F5344CB8AC3E}">
-        <p14:creationId xmlns:p14="http://schemas.microsoft.com/office/powerpoint/2010/main" val="4212421921"/>
-      </p:ext>
-    </p:extLst>
-  </p:cSld>
-  <p:clrMapOvr>
-    <a:masterClrMapping/>
-  </p:clrMapOvr>
-</p:sld>
-</file>
-
 <file path=ppt/slides/slide12.xml><?xml version="1.0" encoding="utf-8"?>
-<p:sld xmlns:a="http://schemas.openxmlformats.org/drawingml/2006/main" xmlns:r="http://schemas.openxmlformats.org/officeDocument/2006/relationships" xmlns:p="http://schemas.openxmlformats.org/presentationml/2006/main">
-  <p:cSld>
-    <p:spTree>
-      <p:nvGrpSpPr>
-        <p:cNvPr id="1" name=""/>
-        <p:cNvGrpSpPr/>
-        <p:nvPr/>
-      </p:nvGrpSpPr>
-      <p:grpSpPr>
-        <a:xfrm>
-          <a:off x="0" y="0"/>
-          <a:ext cx="0" cy="0"/>
-          <a:chOff x="0" y="0"/>
-          <a:chExt cx="0" cy="0"/>
-        </a:xfrm>
-      </p:grpSpPr>
-      <p:sp>
-        <p:nvSpPr>
-          <p:cNvPr id="2" name="Oval 1"/>
-          <p:cNvSpPr/>
-          <p:nvPr/>
-        </p:nvSpPr>
-        <p:spPr>
-          <a:xfrm>
-            <a:off x="960153" y="258357"/>
-            <a:ext cx="6615404" cy="3844211"/>
-          </a:xfrm>
-          <a:prstGeom prst="ellipse">
-            <a:avLst/>
-          </a:prstGeom>
-          <a:noFill/>
-          <a:ln>
-            <a:solidFill>
-              <a:schemeClr val="bg2">
-                <a:lumMod val="50000"/>
-              </a:schemeClr>
-            </a:solidFill>
-          </a:ln>
-        </p:spPr>
-        <p:style>
-          <a:lnRef idx="2">
-            <a:schemeClr val="accent1">
-              <a:shade val="50000"/>
-            </a:schemeClr>
-          </a:lnRef>
-          <a:fillRef idx="1">
-            <a:schemeClr val="accent1"/>
-          </a:fillRef>
-          <a:effectRef idx="0">
-            <a:schemeClr val="accent1"/>
-          </a:effectRef>
-          <a:fontRef idx="minor">
-            <a:schemeClr val="lt1"/>
-          </a:fontRef>
-        </p:style>
-        <p:txBody>
-          <a:bodyPr rtlCol="0" anchor="ctr"/>
-          <a:lstStyle/>
-          <a:p>
-            <a:pPr marL="0" marR="0" lvl="0" indent="0" algn="ctr" defTabSz="914400" rtl="0" eaLnBrk="1" fontAlgn="auto" latinLnBrk="0" hangingPunct="1">
-              <a:lnSpc>
-                <a:spcPct val="100000"/>
-              </a:lnSpc>
-              <a:spcBef>
-                <a:spcPts val="0"/>
-              </a:spcBef>
-              <a:spcAft>
-                <a:spcPts val="0"/>
-              </a:spcAft>
-              <a:buClrTx/>
-              <a:buSzTx/>
-              <a:buFontTx/>
-              <a:buNone/>
-              <a:tabLst/>
-              <a:defRPr/>
-            </a:pPr>
-            <a:endParaRPr kumimoji="0" lang="en-US" sz="1800" b="0" i="0" u="none" strike="noStrike" kern="1200" cap="none" spc="0" normalizeH="0" baseline="0" noProof="0">
-              <a:ln>
-                <a:noFill/>
-              </a:ln>
-              <a:solidFill>
-                <a:prstClr val="white"/>
-              </a:solidFill>
-              <a:effectLst/>
-              <a:uLnTx/>
-              <a:uFillTx/>
-              <a:latin typeface="Calibri" panose="020F0502020204030204"/>
-              <a:ea typeface="+mn-ea"/>
-              <a:cs typeface="+mn-cs"/>
-            </a:endParaRPr>
-          </a:p>
-        </p:txBody>
-      </p:sp>
-      <p:sp>
-        <p:nvSpPr>
-          <p:cNvPr id="13" name="TextBox 12"/>
-          <p:cNvSpPr txBox="1"/>
-          <p:nvPr/>
-        </p:nvSpPr>
-        <p:spPr>
-          <a:xfrm>
-            <a:off x="4675972" y="1771493"/>
-            <a:ext cx="2654779" cy="584775"/>
-          </a:xfrm>
-          <a:prstGeom prst="rect">
-            <a:avLst/>
-          </a:prstGeom>
-          <a:noFill/>
-        </p:spPr>
-        <p:txBody>
-          <a:bodyPr wrap="square" rtlCol="0">
-            <a:spAutoFit/>
-          </a:bodyPr>
-          <a:lstStyle/>
-          <a:p>
-            <a:pPr marL="0" marR="0" lvl="0" indent="0" algn="ctr" defTabSz="914400" rtl="0" eaLnBrk="1" fontAlgn="auto" latinLnBrk="0" hangingPunct="1">
-              <a:lnSpc>
-                <a:spcPct val="100000"/>
-              </a:lnSpc>
-              <a:spcBef>
-                <a:spcPts val="0"/>
-              </a:spcBef>
-              <a:spcAft>
-                <a:spcPts val="0"/>
-              </a:spcAft>
-              <a:buClrTx/>
-              <a:buSzTx/>
-              <a:buFontTx/>
-              <a:buNone/>
-              <a:tabLst/>
-              <a:defRPr/>
-            </a:pPr>
-            <a:r>
-              <a:rPr kumimoji="0" lang="en-US" sz="3200" b="0" i="0" u="none" strike="noStrike" kern="1200" cap="none" spc="0" normalizeH="0" baseline="0" noProof="0" dirty="0">
-                <a:ln>
-                  <a:noFill/>
-                </a:ln>
-                <a:solidFill>
-                  <a:prstClr val="black"/>
-                </a:solidFill>
-                <a:effectLst/>
-                <a:uLnTx/>
-                <a:uFillTx/>
-                <a:latin typeface="Century Gothic" panose="020B0502020202020204" pitchFamily="34" charset="0"/>
-                <a:ea typeface="+mn-ea"/>
-                <a:cs typeface="+mn-cs"/>
-              </a:rPr>
-              <a:t>stewardship</a:t>
-            </a:r>
-          </a:p>
-        </p:txBody>
-      </p:sp>
-      <p:sp>
-        <p:nvSpPr>
-          <p:cNvPr id="18" name="TextBox 17"/>
-          <p:cNvSpPr txBox="1"/>
-          <p:nvPr/>
-        </p:nvSpPr>
-        <p:spPr>
-          <a:xfrm>
-            <a:off x="1704826" y="1771492"/>
-            <a:ext cx="2226473" cy="584775"/>
-          </a:xfrm>
-          <a:prstGeom prst="rect">
-            <a:avLst/>
-          </a:prstGeom>
-          <a:noFill/>
-        </p:spPr>
-        <p:txBody>
-          <a:bodyPr wrap="square" rtlCol="0">
-            <a:spAutoFit/>
-          </a:bodyPr>
-          <a:lstStyle/>
-          <a:p>
-            <a:pPr marL="0" marR="0" lvl="0" indent="0" algn="ctr" defTabSz="914400" rtl="0" eaLnBrk="1" fontAlgn="auto" latinLnBrk="0" hangingPunct="1">
-              <a:lnSpc>
-                <a:spcPct val="100000"/>
-              </a:lnSpc>
-              <a:spcBef>
-                <a:spcPts val="0"/>
-              </a:spcBef>
-              <a:spcAft>
-                <a:spcPts val="0"/>
-              </a:spcAft>
-              <a:buClrTx/>
-              <a:buSzTx/>
-              <a:buFontTx/>
-              <a:buNone/>
-              <a:tabLst/>
-              <a:defRPr/>
-            </a:pPr>
-            <a:r>
-              <a:rPr kumimoji="0" lang="en-US" sz="3200" b="0" i="0" u="none" strike="noStrike" kern="1200" cap="none" spc="0" normalizeH="0" baseline="0" noProof="0" dirty="0">
-                <a:ln>
-                  <a:noFill/>
-                </a:ln>
-                <a:solidFill>
-                  <a:prstClr val="black"/>
-                </a:solidFill>
-                <a:effectLst/>
-                <a:uLnTx/>
-                <a:uFillTx/>
-                <a:latin typeface="Century Gothic" panose="020B0502020202020204" pitchFamily="34" charset="0"/>
-                <a:ea typeface="+mn-ea"/>
-                <a:cs typeface="+mn-cs"/>
-              </a:rPr>
-              <a:t>salvation</a:t>
-            </a:r>
-          </a:p>
-        </p:txBody>
-      </p:sp>
-      <p:sp>
-        <p:nvSpPr>
-          <p:cNvPr id="19" name="TextBox 18"/>
-          <p:cNvSpPr txBox="1"/>
-          <p:nvPr/>
-        </p:nvSpPr>
-        <p:spPr>
-          <a:xfrm>
-            <a:off x="7898509" y="1776445"/>
-            <a:ext cx="2682658" cy="584775"/>
-          </a:xfrm>
-          <a:prstGeom prst="rect">
-            <a:avLst/>
-          </a:prstGeom>
-          <a:noFill/>
-        </p:spPr>
-        <p:txBody>
-          <a:bodyPr wrap="square" rtlCol="0">
-            <a:spAutoFit/>
-          </a:bodyPr>
-          <a:lstStyle/>
-          <a:p>
-            <a:pPr marL="0" marR="0" lvl="0" indent="0" algn="ctr" defTabSz="914400" rtl="0" eaLnBrk="1" fontAlgn="auto" latinLnBrk="0" hangingPunct="1">
-              <a:lnSpc>
-                <a:spcPct val="100000"/>
-              </a:lnSpc>
-              <a:spcBef>
-                <a:spcPts val="0"/>
-              </a:spcBef>
-              <a:spcAft>
-                <a:spcPts val="0"/>
-              </a:spcAft>
-              <a:buClrTx/>
-              <a:buSzTx/>
-              <a:buFontTx/>
-              <a:buNone/>
-              <a:tabLst/>
-              <a:defRPr/>
-            </a:pPr>
-            <a:r>
-              <a:rPr kumimoji="0" lang="en-US" sz="3200" b="0" i="0" u="none" strike="noStrike" kern="1200" cap="none" spc="0" normalizeH="0" baseline="0" noProof="0" dirty="0">
-                <a:ln>
-                  <a:noFill/>
-                </a:ln>
-                <a:solidFill>
-                  <a:prstClr val="black"/>
-                </a:solidFill>
-                <a:effectLst/>
-                <a:uLnTx/>
-                <a:uFillTx/>
-                <a:latin typeface="Century Gothic" panose="020B0502020202020204" pitchFamily="34" charset="0"/>
-                <a:ea typeface="+mn-ea"/>
-                <a:cs typeface="+mn-cs"/>
-              </a:rPr>
-              <a:t>recycling</a:t>
-            </a:r>
-          </a:p>
-        </p:txBody>
-      </p:sp>
-      <p:sp>
-        <p:nvSpPr>
-          <p:cNvPr id="20" name="Oval 19"/>
-          <p:cNvSpPr/>
-          <p:nvPr/>
-        </p:nvSpPr>
-        <p:spPr>
-          <a:xfrm>
-            <a:off x="4359606" y="258356"/>
-            <a:ext cx="6615404" cy="3844211"/>
-          </a:xfrm>
-          <a:prstGeom prst="ellipse">
-            <a:avLst/>
-          </a:prstGeom>
-          <a:noFill/>
-          <a:ln>
-            <a:solidFill>
-              <a:schemeClr val="bg2">
-                <a:lumMod val="50000"/>
-              </a:schemeClr>
-            </a:solidFill>
-          </a:ln>
-        </p:spPr>
-        <p:style>
-          <a:lnRef idx="2">
-            <a:schemeClr val="accent1">
-              <a:shade val="50000"/>
-            </a:schemeClr>
-          </a:lnRef>
-          <a:fillRef idx="1">
-            <a:schemeClr val="accent1"/>
-          </a:fillRef>
-          <a:effectRef idx="0">
-            <a:schemeClr val="accent1"/>
-          </a:effectRef>
-          <a:fontRef idx="minor">
-            <a:schemeClr val="lt1"/>
-          </a:fontRef>
-        </p:style>
-        <p:txBody>
-          <a:bodyPr rtlCol="0" anchor="ctr"/>
-          <a:lstStyle/>
-          <a:p>
-            <a:pPr marL="0" marR="0" lvl="0" indent="0" algn="ctr" defTabSz="914400" rtl="0" eaLnBrk="1" fontAlgn="auto" latinLnBrk="0" hangingPunct="1">
-              <a:lnSpc>
-                <a:spcPct val="100000"/>
-              </a:lnSpc>
-              <a:spcBef>
-                <a:spcPts val="0"/>
-              </a:spcBef>
-              <a:spcAft>
-                <a:spcPts val="0"/>
-              </a:spcAft>
-              <a:buClrTx/>
-              <a:buSzTx/>
-              <a:buFontTx/>
-              <a:buNone/>
-              <a:tabLst/>
-              <a:defRPr/>
-            </a:pPr>
-            <a:endParaRPr kumimoji="0" lang="en-US" sz="1800" b="0" i="0" u="none" strike="noStrike" kern="1200" cap="none" spc="0" normalizeH="0" baseline="0" noProof="0">
-              <a:ln>
-                <a:noFill/>
-              </a:ln>
-              <a:solidFill>
-                <a:prstClr val="white"/>
-              </a:solidFill>
-              <a:effectLst/>
-              <a:uLnTx/>
-              <a:uFillTx/>
-              <a:latin typeface="Calibri" panose="020F0502020204030204"/>
-              <a:ea typeface="+mn-ea"/>
-              <a:cs typeface="+mn-cs"/>
-            </a:endParaRPr>
-          </a:p>
-        </p:txBody>
-      </p:sp>
-      <p:sp>
-        <p:nvSpPr>
-          <p:cNvPr id="21" name="Rectangle 20"/>
-          <p:cNvSpPr/>
-          <p:nvPr/>
-        </p:nvSpPr>
-        <p:spPr>
-          <a:xfrm>
-            <a:off x="4485167" y="4387564"/>
-            <a:ext cx="6096000" cy="2308324"/>
-          </a:xfrm>
-          <a:prstGeom prst="rect">
-            <a:avLst/>
-          </a:prstGeom>
-        </p:spPr>
-        <p:txBody>
-          <a:bodyPr>
-            <a:spAutoFit/>
-          </a:bodyPr>
-          <a:lstStyle/>
-          <a:p>
-            <a:pPr marL="0" marR="0" lvl="0" indent="0" algn="l" defTabSz="914400" rtl="0" eaLnBrk="1" fontAlgn="auto" latinLnBrk="0" hangingPunct="1">
-              <a:lnSpc>
-                <a:spcPct val="100000"/>
-              </a:lnSpc>
-              <a:spcBef>
-                <a:spcPts val="0"/>
-              </a:spcBef>
-              <a:spcAft>
-                <a:spcPts val="0"/>
-              </a:spcAft>
-              <a:buClrTx/>
-              <a:buSzTx/>
-              <a:buFontTx/>
-              <a:buNone/>
-              <a:tabLst/>
-              <a:defRPr/>
-            </a:pPr>
-            <a:r>
-              <a:rPr kumimoji="0" lang="en-US" sz="1800" b="0" i="0" u="none" strike="noStrike" kern="1200" cap="none" spc="0" normalizeH="0" baseline="0" noProof="0" dirty="0">
-                <a:ln>
-                  <a:noFill/>
-                </a:ln>
-                <a:solidFill>
-                  <a:srgbClr val="4A4B4A"/>
-                </a:solidFill>
-                <a:effectLst/>
-                <a:uLnTx/>
-                <a:uFillTx/>
-                <a:latin typeface="LatoRegular"/>
-                <a:ea typeface="+mn-ea"/>
-                <a:cs typeface="+mn-cs"/>
-              </a:rPr>
-              <a:t>I. Arts, Culture, and Humanities</a:t>
-            </a:r>
-            <a:br>
-              <a:rPr kumimoji="0" lang="en-US" sz="1800" b="0" i="0" u="none" strike="noStrike" kern="1200" cap="none" spc="0" normalizeH="0" baseline="0" noProof="0" dirty="0">
-                <a:ln>
-                  <a:noFill/>
-                </a:ln>
-                <a:solidFill>
-                  <a:prstClr val="black"/>
-                </a:solidFill>
-                <a:effectLst/>
-                <a:uLnTx/>
-                <a:uFillTx/>
-                <a:latin typeface="Calibri" panose="020F0502020204030204"/>
-                <a:ea typeface="+mn-ea"/>
-                <a:cs typeface="+mn-cs"/>
-              </a:rPr>
-            </a:br>
-            <a:r>
-              <a:rPr kumimoji="0" lang="en-US" sz="1800" b="0" i="0" u="none" strike="noStrike" kern="1200" cap="none" spc="0" normalizeH="0" baseline="0" noProof="0" dirty="0">
-                <a:ln>
-                  <a:noFill/>
-                </a:ln>
-                <a:solidFill>
-                  <a:srgbClr val="4A4B4A"/>
-                </a:solidFill>
-                <a:effectLst/>
-                <a:uLnTx/>
-                <a:uFillTx/>
-                <a:latin typeface="LatoRegular"/>
-                <a:ea typeface="+mn-ea"/>
-                <a:cs typeface="+mn-cs"/>
-              </a:rPr>
-              <a:t>II. Education</a:t>
-            </a:r>
-            <a:br>
-              <a:rPr kumimoji="0" lang="en-US" sz="1800" b="0" i="0" u="none" strike="noStrike" kern="1200" cap="none" spc="0" normalizeH="0" baseline="0" noProof="0" dirty="0">
-                <a:ln>
-                  <a:noFill/>
-                </a:ln>
-                <a:solidFill>
-                  <a:prstClr val="black"/>
-                </a:solidFill>
-                <a:effectLst/>
-                <a:uLnTx/>
-                <a:uFillTx/>
-                <a:latin typeface="Calibri" panose="020F0502020204030204"/>
-                <a:ea typeface="+mn-ea"/>
-                <a:cs typeface="+mn-cs"/>
-              </a:rPr>
-            </a:br>
-            <a:r>
-              <a:rPr kumimoji="0" lang="en-US" sz="1800" b="0" i="0" u="none" strike="noStrike" kern="1200" cap="none" spc="0" normalizeH="0" baseline="0" noProof="0" dirty="0">
-                <a:ln>
-                  <a:noFill/>
-                </a:ln>
-                <a:solidFill>
-                  <a:srgbClr val="953E16"/>
-                </a:solidFill>
-                <a:effectLst/>
-                <a:uLnTx/>
-                <a:uFillTx/>
-                <a:latin typeface="LatoRegular"/>
-                <a:ea typeface="+mn-ea"/>
-                <a:cs typeface="+mn-cs"/>
-              </a:rPr>
-              <a:t>III. Environment and Animals</a:t>
-            </a:r>
-            <a:br>
-              <a:rPr kumimoji="0" lang="en-US" sz="1800" b="0" i="0" u="none" strike="noStrike" kern="1200" cap="none" spc="0" normalizeH="0" baseline="0" noProof="0" dirty="0">
-                <a:ln>
-                  <a:noFill/>
-                </a:ln>
-                <a:solidFill>
-                  <a:prstClr val="black"/>
-                </a:solidFill>
-                <a:effectLst/>
-                <a:uLnTx/>
-                <a:uFillTx/>
-                <a:latin typeface="Calibri" panose="020F0502020204030204"/>
-                <a:ea typeface="+mn-ea"/>
-                <a:cs typeface="+mn-cs"/>
-              </a:rPr>
-            </a:br>
-            <a:r>
-              <a:rPr kumimoji="0" lang="en-US" sz="1800" b="0" i="0" u="none" strike="noStrike" kern="1200" cap="none" spc="0" normalizeH="0" baseline="0" noProof="0" dirty="0">
-                <a:ln>
-                  <a:noFill/>
-                </a:ln>
-                <a:solidFill>
-                  <a:srgbClr val="4A4B4A"/>
-                </a:solidFill>
-                <a:effectLst/>
-                <a:uLnTx/>
-                <a:uFillTx/>
-                <a:latin typeface="LatoRegular"/>
-                <a:ea typeface="+mn-ea"/>
-                <a:cs typeface="+mn-cs"/>
-              </a:rPr>
-              <a:t>IV. Health</a:t>
-            </a:r>
-            <a:br>
-              <a:rPr kumimoji="0" lang="en-US" sz="1800" b="0" i="0" u="none" strike="noStrike" kern="1200" cap="none" spc="0" normalizeH="0" baseline="0" noProof="0" dirty="0">
-                <a:ln>
-                  <a:noFill/>
-                </a:ln>
-                <a:solidFill>
-                  <a:prstClr val="black"/>
-                </a:solidFill>
-                <a:effectLst/>
-                <a:uLnTx/>
-                <a:uFillTx/>
-                <a:latin typeface="Calibri" panose="020F0502020204030204"/>
-                <a:ea typeface="+mn-ea"/>
-                <a:cs typeface="+mn-cs"/>
-              </a:rPr>
-            </a:br>
-            <a:r>
-              <a:rPr kumimoji="0" lang="en-US" sz="1800" b="0" i="0" u="none" strike="noStrike" kern="1200" cap="none" spc="0" normalizeH="0" baseline="0" noProof="0" dirty="0">
-                <a:ln>
-                  <a:noFill/>
-                </a:ln>
-                <a:solidFill>
-                  <a:srgbClr val="4A4B4A"/>
-                </a:solidFill>
-                <a:effectLst/>
-                <a:uLnTx/>
-                <a:uFillTx/>
-                <a:latin typeface="LatoRegular"/>
-                <a:ea typeface="+mn-ea"/>
-                <a:cs typeface="+mn-cs"/>
-              </a:rPr>
-              <a:t>V. Human Services </a:t>
-            </a:r>
-            <a:br>
-              <a:rPr kumimoji="0" lang="en-US" sz="1800" b="0" i="0" u="none" strike="noStrike" kern="1200" cap="none" spc="0" normalizeH="0" baseline="0" noProof="0" dirty="0">
-                <a:ln>
-                  <a:noFill/>
-                </a:ln>
-                <a:solidFill>
-                  <a:prstClr val="black"/>
-                </a:solidFill>
-                <a:effectLst/>
-                <a:uLnTx/>
-                <a:uFillTx/>
-                <a:latin typeface="Calibri" panose="020F0502020204030204"/>
-                <a:ea typeface="+mn-ea"/>
-                <a:cs typeface="+mn-cs"/>
-              </a:rPr>
-            </a:br>
-            <a:r>
-              <a:rPr kumimoji="0" lang="en-US" sz="1800" b="0" i="0" u="none" strike="noStrike" kern="1200" cap="none" spc="0" normalizeH="0" baseline="0" noProof="0" dirty="0">
-                <a:ln>
-                  <a:noFill/>
-                </a:ln>
-                <a:solidFill>
-                  <a:srgbClr val="4A4B4A"/>
-                </a:solidFill>
-                <a:effectLst/>
-                <a:uLnTx/>
-                <a:uFillTx/>
-                <a:latin typeface="LatoRegular"/>
-                <a:ea typeface="+mn-ea"/>
-                <a:cs typeface="+mn-cs"/>
-              </a:rPr>
-              <a:t>VI. International, Foreign Affairs </a:t>
-            </a:r>
-            <a:br>
-              <a:rPr kumimoji="0" lang="en-US" sz="1800" b="0" i="0" u="none" strike="noStrike" kern="1200" cap="none" spc="0" normalizeH="0" baseline="0" noProof="0" dirty="0">
-                <a:ln>
-                  <a:noFill/>
-                </a:ln>
-                <a:solidFill>
-                  <a:prstClr val="black"/>
-                </a:solidFill>
-                <a:effectLst/>
-                <a:uLnTx/>
-                <a:uFillTx/>
-                <a:latin typeface="Calibri" panose="020F0502020204030204"/>
-                <a:ea typeface="+mn-ea"/>
-                <a:cs typeface="+mn-cs"/>
-              </a:rPr>
-            </a:br>
-            <a:r>
-              <a:rPr kumimoji="0" lang="en-US" sz="1800" b="0" i="0" u="none" strike="noStrike" kern="1200" cap="none" spc="0" normalizeH="0" baseline="0" noProof="0" dirty="0">
-                <a:ln>
-                  <a:noFill/>
-                </a:ln>
-                <a:solidFill>
-                  <a:srgbClr val="4A4B4A"/>
-                </a:solidFill>
-                <a:effectLst/>
-                <a:uLnTx/>
-                <a:uFillTx/>
-                <a:latin typeface="LatoRegular"/>
-                <a:ea typeface="+mn-ea"/>
-                <a:cs typeface="+mn-cs"/>
-              </a:rPr>
-              <a:t>VII. Public, Societal Benefit</a:t>
-            </a:r>
-            <a:br>
-              <a:rPr kumimoji="0" lang="en-US" sz="1800" b="0" i="0" u="none" strike="noStrike" kern="1200" cap="none" spc="0" normalizeH="0" baseline="0" noProof="0" dirty="0">
-                <a:ln>
-                  <a:noFill/>
-                </a:ln>
-                <a:solidFill>
-                  <a:prstClr val="black"/>
-                </a:solidFill>
-                <a:effectLst/>
-                <a:uLnTx/>
-                <a:uFillTx/>
-                <a:latin typeface="Calibri" panose="020F0502020204030204"/>
-                <a:ea typeface="+mn-ea"/>
-                <a:cs typeface="+mn-cs"/>
-              </a:rPr>
-            </a:br>
-            <a:r>
-              <a:rPr kumimoji="0" lang="en-US" sz="1800" b="0" i="0" u="none" strike="noStrike" kern="1200" cap="none" spc="0" normalizeH="0" baseline="0" noProof="0" dirty="0">
-                <a:ln>
-                  <a:noFill/>
-                </a:ln>
-                <a:solidFill>
-                  <a:srgbClr val="953E16"/>
-                </a:solidFill>
-                <a:effectLst/>
-                <a:uLnTx/>
-                <a:uFillTx/>
-                <a:latin typeface="LatoRegular"/>
-                <a:ea typeface="+mn-ea"/>
-                <a:cs typeface="+mn-cs"/>
-              </a:rPr>
-              <a:t>VIII. Religion Related</a:t>
-            </a:r>
-            <a:endParaRPr kumimoji="0" lang="en-US" sz="1800" b="0" i="0" u="none" strike="noStrike" kern="1200" cap="none" spc="0" normalizeH="0" baseline="0" noProof="0" dirty="0">
-              <a:ln>
-                <a:noFill/>
-              </a:ln>
-              <a:solidFill>
-                <a:srgbClr val="953E16"/>
-              </a:solidFill>
-              <a:effectLst/>
-              <a:uLnTx/>
-              <a:uFillTx/>
-              <a:latin typeface="Calibri" panose="020F0502020204030204"/>
-              <a:ea typeface="+mn-ea"/>
-              <a:cs typeface="+mn-cs"/>
-            </a:endParaRPr>
-          </a:p>
-        </p:txBody>
-      </p:sp>
-      <p:sp>
-        <p:nvSpPr>
-          <p:cNvPr id="8" name="TextBox 7">
-            <a:extLst>
-              <a:ext uri="{FF2B5EF4-FFF2-40B4-BE49-F238E27FC236}">
-                <a16:creationId xmlns:a16="http://schemas.microsoft.com/office/drawing/2014/main" id="{43F192B6-C1CA-4D0F-BC4D-DC5D4069666D}"/>
-              </a:ext>
-            </a:extLst>
-          </p:cNvPr>
-          <p:cNvSpPr txBox="1"/>
-          <p:nvPr/>
-        </p:nvSpPr>
-        <p:spPr>
-          <a:xfrm>
-            <a:off x="2366626" y="287255"/>
-            <a:ext cx="3291073" cy="400110"/>
-          </a:xfrm>
-          <a:prstGeom prst="rect">
-            <a:avLst/>
-          </a:prstGeom>
-          <a:noFill/>
-        </p:spPr>
-        <p:txBody>
-          <a:bodyPr wrap="square" rtlCol="0">
-            <a:spAutoFit/>
-          </a:bodyPr>
-          <a:lstStyle/>
-          <a:p>
-            <a:pPr marL="0" marR="0" lvl="0" indent="0" algn="ctr" defTabSz="914400" rtl="0" eaLnBrk="1" fontAlgn="auto" latinLnBrk="0" hangingPunct="1">
-              <a:lnSpc>
-                <a:spcPct val="100000"/>
-              </a:lnSpc>
-              <a:spcBef>
-                <a:spcPts val="0"/>
-              </a:spcBef>
-              <a:spcAft>
-                <a:spcPts val="0"/>
-              </a:spcAft>
-              <a:buClrTx/>
-              <a:buSzTx/>
-              <a:buFontTx/>
-              <a:buNone/>
-              <a:tabLst/>
-              <a:defRPr/>
-            </a:pPr>
-            <a:r>
-              <a:rPr kumimoji="0" lang="en-US" sz="2000" b="0" i="0" u="none" strike="noStrike" kern="1200" cap="all" spc="0" normalizeH="0" noProof="0" dirty="0">
-                <a:ln>
-                  <a:noFill/>
-                </a:ln>
-                <a:solidFill>
-                  <a:srgbClr val="953E16"/>
-                </a:solidFill>
-                <a:effectLst/>
-                <a:uLnTx/>
-                <a:uFillTx/>
-                <a:latin typeface="Century Gothic" panose="020B0502020202020204" pitchFamily="34" charset="0"/>
-                <a:ea typeface="+mn-ea"/>
-                <a:cs typeface="+mn-cs"/>
-              </a:rPr>
-              <a:t>Religion</a:t>
-            </a:r>
-          </a:p>
-        </p:txBody>
-      </p:sp>
-      <p:cxnSp>
-        <p:nvCxnSpPr>
-          <p:cNvPr id="10" name="Straight Arrow Connector 9">
-            <a:extLst>
-              <a:ext uri="{FF2B5EF4-FFF2-40B4-BE49-F238E27FC236}">
-                <a16:creationId xmlns:a16="http://schemas.microsoft.com/office/drawing/2014/main" id="{4976B822-FAA2-4E3D-8009-9F5293D353B6}"/>
-              </a:ext>
-            </a:extLst>
-          </p:cNvPr>
-          <p:cNvCxnSpPr>
-            <a:cxnSpLocks/>
-          </p:cNvCxnSpPr>
-          <p:nvPr/>
-        </p:nvCxnSpPr>
-        <p:spPr>
-          <a:xfrm flipV="1">
-            <a:off x="1704826" y="2505965"/>
-            <a:ext cx="920566" cy="1834242"/>
-          </a:xfrm>
-          <a:prstGeom prst="straightConnector1">
-            <a:avLst/>
-          </a:prstGeom>
-          <a:ln w="12700">
-            <a:solidFill>
-              <a:srgbClr val="953E16"/>
-            </a:solidFill>
-            <a:tailEnd type="triangle"/>
-          </a:ln>
-        </p:spPr>
-        <p:style>
-          <a:lnRef idx="1">
-            <a:schemeClr val="accent1"/>
-          </a:lnRef>
-          <a:fillRef idx="0">
-            <a:schemeClr val="accent1"/>
-          </a:fillRef>
-          <a:effectRef idx="0">
-            <a:schemeClr val="accent1"/>
-          </a:effectRef>
-          <a:fontRef idx="minor">
-            <a:schemeClr val="tx1"/>
-          </a:fontRef>
-        </p:style>
-      </p:cxnSp>
-      <p:sp>
-        <p:nvSpPr>
-          <p:cNvPr id="11" name="TextBox 10">
-            <a:extLst>
-              <a:ext uri="{FF2B5EF4-FFF2-40B4-BE49-F238E27FC236}">
-                <a16:creationId xmlns:a16="http://schemas.microsoft.com/office/drawing/2014/main" id="{EA262CEA-046F-4C7C-917A-0DBF1D5996B9}"/>
-              </a:ext>
-            </a:extLst>
-          </p:cNvPr>
-          <p:cNvSpPr txBox="1"/>
-          <p:nvPr/>
-        </p:nvSpPr>
-        <p:spPr>
-          <a:xfrm>
-            <a:off x="6252972" y="362570"/>
-            <a:ext cx="3291073" cy="400110"/>
-          </a:xfrm>
-          <a:prstGeom prst="rect">
-            <a:avLst/>
-          </a:prstGeom>
-          <a:noFill/>
-        </p:spPr>
-        <p:txBody>
-          <a:bodyPr wrap="square" rtlCol="0">
-            <a:spAutoFit/>
-          </a:bodyPr>
-          <a:lstStyle/>
-          <a:p>
-            <a:pPr marL="0" marR="0" lvl="0" indent="0" algn="ctr" defTabSz="914400" rtl="0" eaLnBrk="1" fontAlgn="auto" latinLnBrk="0" hangingPunct="1">
-              <a:lnSpc>
-                <a:spcPct val="100000"/>
-              </a:lnSpc>
-              <a:spcBef>
-                <a:spcPts val="0"/>
-              </a:spcBef>
-              <a:spcAft>
-                <a:spcPts val="0"/>
-              </a:spcAft>
-              <a:buClrTx/>
-              <a:buSzTx/>
-              <a:buFontTx/>
-              <a:buNone/>
-              <a:tabLst/>
-              <a:defRPr/>
-            </a:pPr>
-            <a:r>
-              <a:rPr kumimoji="0" lang="en-US" sz="2000" b="0" i="0" u="none" strike="noStrike" kern="1200" cap="all" spc="0" normalizeH="0" noProof="0" dirty="0">
-                <a:ln>
-                  <a:noFill/>
-                </a:ln>
-                <a:solidFill>
-                  <a:srgbClr val="953E16"/>
-                </a:solidFill>
-                <a:effectLst/>
-                <a:uLnTx/>
-                <a:uFillTx/>
-                <a:latin typeface="Century Gothic" panose="020B0502020202020204" pitchFamily="34" charset="0"/>
-                <a:ea typeface="+mn-ea"/>
-                <a:cs typeface="+mn-cs"/>
-              </a:rPr>
-              <a:t>Environment</a:t>
-            </a:r>
-          </a:p>
-        </p:txBody>
-      </p:sp>
-      <p:sp>
-        <p:nvSpPr>
-          <p:cNvPr id="17" name="TextBox 16">
-            <a:extLst>
-              <a:ext uri="{FF2B5EF4-FFF2-40B4-BE49-F238E27FC236}">
-                <a16:creationId xmlns:a16="http://schemas.microsoft.com/office/drawing/2014/main" id="{363794E5-830F-481E-80D8-4834B1997EB7}"/>
-              </a:ext>
-            </a:extLst>
-          </p:cNvPr>
-          <p:cNvSpPr txBox="1"/>
-          <p:nvPr/>
-        </p:nvSpPr>
-        <p:spPr>
-          <a:xfrm>
-            <a:off x="-34704" y="4387564"/>
-            <a:ext cx="3291073" cy="707886"/>
-          </a:xfrm>
-          <a:prstGeom prst="rect">
-            <a:avLst/>
-          </a:prstGeom>
-          <a:noFill/>
-        </p:spPr>
-        <p:txBody>
-          <a:bodyPr wrap="square" rtlCol="0">
-            <a:spAutoFit/>
-          </a:bodyPr>
-          <a:lstStyle/>
-          <a:p>
-            <a:pPr marL="0" marR="0" lvl="0" indent="0" algn="ctr" defTabSz="914400" rtl="0" eaLnBrk="1" fontAlgn="auto" latinLnBrk="0" hangingPunct="1">
-              <a:lnSpc>
-                <a:spcPct val="100000"/>
-              </a:lnSpc>
-              <a:spcBef>
-                <a:spcPts val="0"/>
-              </a:spcBef>
-              <a:spcAft>
-                <a:spcPts val="0"/>
-              </a:spcAft>
-              <a:buClrTx/>
-              <a:buSzTx/>
-              <a:buFontTx/>
-              <a:buNone/>
-              <a:tabLst/>
-              <a:defRPr/>
-            </a:pPr>
-            <a:r>
-              <a:rPr lang="en-US" sz="2000" dirty="0">
-                <a:solidFill>
-                  <a:srgbClr val="953E16"/>
-                </a:solidFill>
-                <a:latin typeface="Century Gothic" panose="020B0502020202020204" pitchFamily="34" charset="0"/>
-              </a:rPr>
-              <a:t>Distinctive</a:t>
-            </a:r>
-          </a:p>
-          <a:p>
-            <a:pPr marL="0" marR="0" lvl="0" indent="0" algn="ctr" defTabSz="914400" rtl="0" eaLnBrk="1" fontAlgn="auto" latinLnBrk="0" hangingPunct="1">
-              <a:lnSpc>
-                <a:spcPct val="100000"/>
-              </a:lnSpc>
-              <a:spcBef>
-                <a:spcPts val="0"/>
-              </a:spcBef>
-              <a:spcAft>
-                <a:spcPts val="0"/>
-              </a:spcAft>
-              <a:buClrTx/>
-              <a:buSzTx/>
-              <a:buFontTx/>
-              <a:buNone/>
-              <a:tabLst/>
-              <a:defRPr/>
-            </a:pPr>
-            <a:r>
-              <a:rPr lang="en-US" sz="2000" dirty="0">
-                <a:solidFill>
-                  <a:srgbClr val="953E16"/>
-                </a:solidFill>
-                <a:latin typeface="Century Gothic" panose="020B0502020202020204" pitchFamily="34" charset="0"/>
-              </a:rPr>
-              <a:t>constructs</a:t>
-            </a:r>
-            <a:endParaRPr kumimoji="0" lang="en-US" sz="2000" b="0" i="0" u="none" strike="noStrike" kern="1200" cap="none" spc="0" normalizeH="0" baseline="0" noProof="0" dirty="0">
-              <a:ln>
-                <a:noFill/>
-              </a:ln>
-              <a:solidFill>
-                <a:srgbClr val="953E16"/>
-              </a:solidFill>
-              <a:effectLst/>
-              <a:uLnTx/>
-              <a:uFillTx/>
-              <a:latin typeface="Century Gothic" panose="020B0502020202020204" pitchFamily="34" charset="0"/>
-              <a:ea typeface="+mn-ea"/>
-              <a:cs typeface="+mn-cs"/>
-            </a:endParaRPr>
-          </a:p>
-        </p:txBody>
-      </p:sp>
-      <p:cxnSp>
-        <p:nvCxnSpPr>
-          <p:cNvPr id="22" name="Straight Arrow Connector 21">
-            <a:extLst>
-              <a:ext uri="{FF2B5EF4-FFF2-40B4-BE49-F238E27FC236}">
-                <a16:creationId xmlns:a16="http://schemas.microsoft.com/office/drawing/2014/main" id="{39FB0EE5-E971-41D9-A084-580FFBFB2048}"/>
-              </a:ext>
-            </a:extLst>
-          </p:cNvPr>
-          <p:cNvCxnSpPr>
-            <a:cxnSpLocks/>
-          </p:cNvCxnSpPr>
-          <p:nvPr/>
-        </p:nvCxnSpPr>
-        <p:spPr>
-          <a:xfrm flipH="1" flipV="1">
-            <a:off x="6466114" y="2646216"/>
-            <a:ext cx="2843657" cy="2382984"/>
-          </a:xfrm>
-          <a:prstGeom prst="straightConnector1">
-            <a:avLst/>
-          </a:prstGeom>
-          <a:ln w="12700">
-            <a:solidFill>
-              <a:srgbClr val="953E16"/>
-            </a:solidFill>
-            <a:tailEnd type="triangle"/>
-          </a:ln>
-        </p:spPr>
-        <p:style>
-          <a:lnRef idx="1">
-            <a:schemeClr val="accent1"/>
-          </a:lnRef>
-          <a:fillRef idx="0">
-            <a:schemeClr val="accent1"/>
-          </a:fillRef>
-          <a:effectRef idx="0">
-            <a:schemeClr val="accent1"/>
-          </a:effectRef>
-          <a:fontRef idx="minor">
-            <a:schemeClr val="tx1"/>
-          </a:fontRef>
-        </p:style>
-      </p:cxnSp>
-      <p:sp>
-        <p:nvSpPr>
-          <p:cNvPr id="23" name="TextBox 22">
-            <a:extLst>
-              <a:ext uri="{FF2B5EF4-FFF2-40B4-BE49-F238E27FC236}">
-                <a16:creationId xmlns:a16="http://schemas.microsoft.com/office/drawing/2014/main" id="{C43B2E35-7EFA-486A-9E6D-D693D5060BF6}"/>
-              </a:ext>
-            </a:extLst>
-          </p:cNvPr>
-          <p:cNvSpPr txBox="1"/>
-          <p:nvPr/>
-        </p:nvSpPr>
-        <p:spPr>
-          <a:xfrm>
-            <a:off x="8599222" y="4883653"/>
-            <a:ext cx="3291073" cy="707886"/>
-          </a:xfrm>
-          <a:prstGeom prst="rect">
-            <a:avLst/>
-          </a:prstGeom>
-          <a:noFill/>
-        </p:spPr>
-        <p:txBody>
-          <a:bodyPr wrap="square" rtlCol="0">
-            <a:spAutoFit/>
-          </a:bodyPr>
-          <a:lstStyle/>
-          <a:p>
-            <a:pPr marL="0" marR="0" lvl="0" indent="0" algn="ctr" defTabSz="914400" rtl="0" eaLnBrk="1" fontAlgn="auto" latinLnBrk="0" hangingPunct="1">
-              <a:lnSpc>
-                <a:spcPct val="100000"/>
-              </a:lnSpc>
-              <a:spcBef>
-                <a:spcPts val="0"/>
-              </a:spcBef>
-              <a:spcAft>
-                <a:spcPts val="0"/>
-              </a:spcAft>
-              <a:buClrTx/>
-              <a:buSzTx/>
-              <a:buFontTx/>
-              <a:buNone/>
-              <a:tabLst/>
-              <a:defRPr/>
-            </a:pPr>
-            <a:r>
-              <a:rPr lang="en-US" sz="2000" dirty="0">
-                <a:solidFill>
-                  <a:srgbClr val="953E16"/>
-                </a:solidFill>
-                <a:latin typeface="Century Gothic" panose="020B0502020202020204" pitchFamily="34" charset="0"/>
-              </a:rPr>
-              <a:t>Shared</a:t>
-            </a:r>
-          </a:p>
-          <a:p>
-            <a:pPr marL="0" marR="0" lvl="0" indent="0" algn="ctr" defTabSz="914400" rtl="0" eaLnBrk="1" fontAlgn="auto" latinLnBrk="0" hangingPunct="1">
-              <a:lnSpc>
-                <a:spcPct val="100000"/>
-              </a:lnSpc>
-              <a:spcBef>
-                <a:spcPts val="0"/>
-              </a:spcBef>
-              <a:spcAft>
-                <a:spcPts val="0"/>
-              </a:spcAft>
-              <a:buClrTx/>
-              <a:buSzTx/>
-              <a:buFontTx/>
-              <a:buNone/>
-              <a:tabLst/>
-              <a:defRPr/>
-            </a:pPr>
-            <a:r>
-              <a:rPr lang="en-US" sz="2000" dirty="0">
-                <a:solidFill>
-                  <a:srgbClr val="953E16"/>
-                </a:solidFill>
-                <a:latin typeface="Century Gothic" panose="020B0502020202020204" pitchFamily="34" charset="0"/>
-              </a:rPr>
-              <a:t>constructs</a:t>
-            </a:r>
-            <a:endParaRPr kumimoji="0" lang="en-US" sz="2000" b="0" i="0" u="none" strike="noStrike" kern="1200" cap="none" spc="0" normalizeH="0" baseline="0" noProof="0" dirty="0">
-              <a:ln>
-                <a:noFill/>
-              </a:ln>
-              <a:solidFill>
-                <a:srgbClr val="953E16"/>
-              </a:solidFill>
-              <a:effectLst/>
-              <a:uLnTx/>
-              <a:uFillTx/>
-              <a:latin typeface="Century Gothic" panose="020B0502020202020204" pitchFamily="34" charset="0"/>
-              <a:ea typeface="+mn-ea"/>
-              <a:cs typeface="+mn-cs"/>
-            </a:endParaRPr>
-          </a:p>
-        </p:txBody>
-      </p:sp>
-    </p:spTree>
-    <p:extLst>
-      <p:ext uri="{BB962C8B-B14F-4D97-AF65-F5344CB8AC3E}">
-        <p14:creationId xmlns:p14="http://schemas.microsoft.com/office/powerpoint/2010/main" val="4064060197"/>
-      </p:ext>
-    </p:extLst>
-  </p:cSld>
-  <p:clrMapOvr>
-    <a:masterClrMapping/>
-  </p:clrMapOvr>
-</p:sld>
-</file>
-
-<file path=ppt/slides/slide13.xml><?xml version="1.0" encoding="utf-8"?>
 <p:sld xmlns:a="http://schemas.openxmlformats.org/drawingml/2006/main" xmlns:r="http://schemas.openxmlformats.org/officeDocument/2006/relationships" xmlns:p="http://schemas.openxmlformats.org/presentationml/2006/main">
   <p:cSld>
     <p:spTree>
@@ -17431,6 +16139,1086 @@
 </p:sld>
 </file>
 
+<file path=ppt/slides/slide13.xml><?xml version="1.0" encoding="utf-8"?>
+<p:sld xmlns:a="http://schemas.openxmlformats.org/drawingml/2006/main" xmlns:r="http://schemas.openxmlformats.org/officeDocument/2006/relationships" xmlns:p="http://schemas.openxmlformats.org/presentationml/2006/main">
+  <p:cSld>
+    <p:spTree>
+      <p:nvGrpSpPr>
+        <p:cNvPr id="1" name=""/>
+        <p:cNvGrpSpPr/>
+        <p:nvPr/>
+      </p:nvGrpSpPr>
+      <p:grpSpPr>
+        <a:xfrm>
+          <a:off x="0" y="0"/>
+          <a:ext cx="0" cy="0"/>
+          <a:chOff x="0" y="0"/>
+          <a:chExt cx="0" cy="0"/>
+        </a:xfrm>
+      </p:grpSpPr>
+      <p:sp>
+        <p:nvSpPr>
+          <p:cNvPr id="2" name="Oval 1"/>
+          <p:cNvSpPr/>
+          <p:nvPr/>
+        </p:nvSpPr>
+        <p:spPr>
+          <a:xfrm>
+            <a:off x="960153" y="258357"/>
+            <a:ext cx="6615404" cy="3844211"/>
+          </a:xfrm>
+          <a:prstGeom prst="ellipse">
+            <a:avLst/>
+          </a:prstGeom>
+          <a:noFill/>
+          <a:ln>
+            <a:solidFill>
+              <a:schemeClr val="bg2">
+                <a:lumMod val="50000"/>
+              </a:schemeClr>
+            </a:solidFill>
+          </a:ln>
+        </p:spPr>
+        <p:style>
+          <a:lnRef idx="2">
+            <a:schemeClr val="accent1">
+              <a:shade val="50000"/>
+            </a:schemeClr>
+          </a:lnRef>
+          <a:fillRef idx="1">
+            <a:schemeClr val="accent1"/>
+          </a:fillRef>
+          <a:effectRef idx="0">
+            <a:schemeClr val="accent1"/>
+          </a:effectRef>
+          <a:fontRef idx="minor">
+            <a:schemeClr val="lt1"/>
+          </a:fontRef>
+        </p:style>
+        <p:txBody>
+          <a:bodyPr rtlCol="0" anchor="ctr"/>
+          <a:lstStyle/>
+          <a:p>
+            <a:pPr marL="0" marR="0" lvl="0" indent="0" algn="ctr" defTabSz="914400" rtl="0" eaLnBrk="1" fontAlgn="auto" latinLnBrk="0" hangingPunct="1">
+              <a:lnSpc>
+                <a:spcPct val="100000"/>
+              </a:lnSpc>
+              <a:spcBef>
+                <a:spcPts val="0"/>
+              </a:spcBef>
+              <a:spcAft>
+                <a:spcPts val="0"/>
+              </a:spcAft>
+              <a:buClrTx/>
+              <a:buSzTx/>
+              <a:buFontTx/>
+              <a:buNone/>
+              <a:tabLst/>
+              <a:defRPr/>
+            </a:pPr>
+            <a:endParaRPr kumimoji="0" lang="en-US" sz="1800" b="0" i="0" u="none" strike="noStrike" kern="1200" cap="none" spc="0" normalizeH="0" baseline="0" noProof="0">
+              <a:ln>
+                <a:noFill/>
+              </a:ln>
+              <a:solidFill>
+                <a:prstClr val="white"/>
+              </a:solidFill>
+              <a:effectLst/>
+              <a:uLnTx/>
+              <a:uFillTx/>
+              <a:latin typeface="Calibri" panose="020F0502020204030204"/>
+              <a:ea typeface="+mn-ea"/>
+              <a:cs typeface="+mn-cs"/>
+            </a:endParaRPr>
+          </a:p>
+        </p:txBody>
+      </p:sp>
+      <p:sp>
+        <p:nvSpPr>
+          <p:cNvPr id="13" name="TextBox 12"/>
+          <p:cNvSpPr txBox="1"/>
+          <p:nvPr/>
+        </p:nvSpPr>
+        <p:spPr>
+          <a:xfrm>
+            <a:off x="4675972" y="1771493"/>
+            <a:ext cx="2654779" cy="584775"/>
+          </a:xfrm>
+          <a:prstGeom prst="rect">
+            <a:avLst/>
+          </a:prstGeom>
+          <a:noFill/>
+        </p:spPr>
+        <p:txBody>
+          <a:bodyPr wrap="square" rtlCol="0">
+            <a:spAutoFit/>
+          </a:bodyPr>
+          <a:lstStyle/>
+          <a:p>
+            <a:pPr marL="0" marR="0" lvl="0" indent="0" algn="ctr" defTabSz="914400" rtl="0" eaLnBrk="1" fontAlgn="auto" latinLnBrk="0" hangingPunct="1">
+              <a:lnSpc>
+                <a:spcPct val="100000"/>
+              </a:lnSpc>
+              <a:spcBef>
+                <a:spcPts val="0"/>
+              </a:spcBef>
+              <a:spcAft>
+                <a:spcPts val="0"/>
+              </a:spcAft>
+              <a:buClrTx/>
+              <a:buSzTx/>
+              <a:buFontTx/>
+              <a:buNone/>
+              <a:tabLst/>
+              <a:defRPr/>
+            </a:pPr>
+            <a:r>
+              <a:rPr kumimoji="0" lang="en-US" sz="3200" b="0" i="0" u="none" strike="noStrike" kern="1200" cap="none" spc="0" normalizeH="0" baseline="0" noProof="0" dirty="0">
+                <a:ln>
+                  <a:noFill/>
+                </a:ln>
+                <a:solidFill>
+                  <a:prstClr val="black"/>
+                </a:solidFill>
+                <a:effectLst/>
+                <a:uLnTx/>
+                <a:uFillTx/>
+                <a:latin typeface="Century Gothic" panose="020B0502020202020204" pitchFamily="34" charset="0"/>
+                <a:ea typeface="+mn-ea"/>
+                <a:cs typeface="+mn-cs"/>
+              </a:rPr>
+              <a:t>stewardship</a:t>
+            </a:r>
+          </a:p>
+        </p:txBody>
+      </p:sp>
+      <p:sp>
+        <p:nvSpPr>
+          <p:cNvPr id="18" name="TextBox 17"/>
+          <p:cNvSpPr txBox="1"/>
+          <p:nvPr/>
+        </p:nvSpPr>
+        <p:spPr>
+          <a:xfrm>
+            <a:off x="1704826" y="1771492"/>
+            <a:ext cx="2226473" cy="584775"/>
+          </a:xfrm>
+          <a:prstGeom prst="rect">
+            <a:avLst/>
+          </a:prstGeom>
+          <a:noFill/>
+        </p:spPr>
+        <p:txBody>
+          <a:bodyPr wrap="square" rtlCol="0">
+            <a:spAutoFit/>
+          </a:bodyPr>
+          <a:lstStyle/>
+          <a:p>
+            <a:pPr marL="0" marR="0" lvl="0" indent="0" algn="ctr" defTabSz="914400" rtl="0" eaLnBrk="1" fontAlgn="auto" latinLnBrk="0" hangingPunct="1">
+              <a:lnSpc>
+                <a:spcPct val="100000"/>
+              </a:lnSpc>
+              <a:spcBef>
+                <a:spcPts val="0"/>
+              </a:spcBef>
+              <a:spcAft>
+                <a:spcPts val="0"/>
+              </a:spcAft>
+              <a:buClrTx/>
+              <a:buSzTx/>
+              <a:buFontTx/>
+              <a:buNone/>
+              <a:tabLst/>
+              <a:defRPr/>
+            </a:pPr>
+            <a:r>
+              <a:rPr kumimoji="0" lang="en-US" sz="3200" b="0" i="0" u="none" strike="noStrike" kern="1200" cap="none" spc="0" normalizeH="0" baseline="0" noProof="0" dirty="0">
+                <a:ln>
+                  <a:noFill/>
+                </a:ln>
+                <a:solidFill>
+                  <a:prstClr val="black"/>
+                </a:solidFill>
+                <a:effectLst/>
+                <a:uLnTx/>
+                <a:uFillTx/>
+                <a:latin typeface="Century Gothic" panose="020B0502020202020204" pitchFamily="34" charset="0"/>
+                <a:ea typeface="+mn-ea"/>
+                <a:cs typeface="+mn-cs"/>
+              </a:rPr>
+              <a:t>salvation</a:t>
+            </a:r>
+          </a:p>
+        </p:txBody>
+      </p:sp>
+      <p:sp>
+        <p:nvSpPr>
+          <p:cNvPr id="19" name="TextBox 18"/>
+          <p:cNvSpPr txBox="1"/>
+          <p:nvPr/>
+        </p:nvSpPr>
+        <p:spPr>
+          <a:xfrm>
+            <a:off x="7898509" y="1776445"/>
+            <a:ext cx="2682658" cy="584775"/>
+          </a:xfrm>
+          <a:prstGeom prst="rect">
+            <a:avLst/>
+          </a:prstGeom>
+          <a:noFill/>
+        </p:spPr>
+        <p:txBody>
+          <a:bodyPr wrap="square" rtlCol="0">
+            <a:spAutoFit/>
+          </a:bodyPr>
+          <a:lstStyle/>
+          <a:p>
+            <a:pPr marL="0" marR="0" lvl="0" indent="0" algn="ctr" defTabSz="914400" rtl="0" eaLnBrk="1" fontAlgn="auto" latinLnBrk="0" hangingPunct="1">
+              <a:lnSpc>
+                <a:spcPct val="100000"/>
+              </a:lnSpc>
+              <a:spcBef>
+                <a:spcPts val="0"/>
+              </a:spcBef>
+              <a:spcAft>
+                <a:spcPts val="0"/>
+              </a:spcAft>
+              <a:buClrTx/>
+              <a:buSzTx/>
+              <a:buFontTx/>
+              <a:buNone/>
+              <a:tabLst/>
+              <a:defRPr/>
+            </a:pPr>
+            <a:r>
+              <a:rPr kumimoji="0" lang="en-US" sz="3200" b="0" i="0" u="none" strike="noStrike" kern="1200" cap="none" spc="0" normalizeH="0" baseline="0" noProof="0" dirty="0">
+                <a:ln>
+                  <a:noFill/>
+                </a:ln>
+                <a:solidFill>
+                  <a:prstClr val="black"/>
+                </a:solidFill>
+                <a:effectLst/>
+                <a:uLnTx/>
+                <a:uFillTx/>
+                <a:latin typeface="Century Gothic" panose="020B0502020202020204" pitchFamily="34" charset="0"/>
+                <a:ea typeface="+mn-ea"/>
+                <a:cs typeface="+mn-cs"/>
+              </a:rPr>
+              <a:t>recycling</a:t>
+            </a:r>
+          </a:p>
+        </p:txBody>
+      </p:sp>
+      <p:sp>
+        <p:nvSpPr>
+          <p:cNvPr id="20" name="Oval 19"/>
+          <p:cNvSpPr/>
+          <p:nvPr/>
+        </p:nvSpPr>
+        <p:spPr>
+          <a:xfrm>
+            <a:off x="4359606" y="258356"/>
+            <a:ext cx="6615404" cy="3844211"/>
+          </a:xfrm>
+          <a:prstGeom prst="ellipse">
+            <a:avLst/>
+          </a:prstGeom>
+          <a:noFill/>
+          <a:ln>
+            <a:solidFill>
+              <a:schemeClr val="bg2">
+                <a:lumMod val="50000"/>
+              </a:schemeClr>
+            </a:solidFill>
+          </a:ln>
+        </p:spPr>
+        <p:style>
+          <a:lnRef idx="2">
+            <a:schemeClr val="accent1">
+              <a:shade val="50000"/>
+            </a:schemeClr>
+          </a:lnRef>
+          <a:fillRef idx="1">
+            <a:schemeClr val="accent1"/>
+          </a:fillRef>
+          <a:effectRef idx="0">
+            <a:schemeClr val="accent1"/>
+          </a:effectRef>
+          <a:fontRef idx="minor">
+            <a:schemeClr val="lt1"/>
+          </a:fontRef>
+        </p:style>
+        <p:txBody>
+          <a:bodyPr rtlCol="0" anchor="ctr"/>
+          <a:lstStyle/>
+          <a:p>
+            <a:pPr marL="0" marR="0" lvl="0" indent="0" algn="ctr" defTabSz="914400" rtl="0" eaLnBrk="1" fontAlgn="auto" latinLnBrk="0" hangingPunct="1">
+              <a:lnSpc>
+                <a:spcPct val="100000"/>
+              </a:lnSpc>
+              <a:spcBef>
+                <a:spcPts val="0"/>
+              </a:spcBef>
+              <a:spcAft>
+                <a:spcPts val="0"/>
+              </a:spcAft>
+              <a:buClrTx/>
+              <a:buSzTx/>
+              <a:buFontTx/>
+              <a:buNone/>
+              <a:tabLst/>
+              <a:defRPr/>
+            </a:pPr>
+            <a:endParaRPr kumimoji="0" lang="en-US" sz="1800" b="0" i="0" u="none" strike="noStrike" kern="1200" cap="none" spc="0" normalizeH="0" baseline="0" noProof="0">
+              <a:ln>
+                <a:noFill/>
+              </a:ln>
+              <a:solidFill>
+                <a:prstClr val="white"/>
+              </a:solidFill>
+              <a:effectLst/>
+              <a:uLnTx/>
+              <a:uFillTx/>
+              <a:latin typeface="Calibri" panose="020F0502020204030204"/>
+              <a:ea typeface="+mn-ea"/>
+              <a:cs typeface="+mn-cs"/>
+            </a:endParaRPr>
+          </a:p>
+        </p:txBody>
+      </p:sp>
+      <p:sp>
+        <p:nvSpPr>
+          <p:cNvPr id="21" name="Rectangle 20"/>
+          <p:cNvSpPr/>
+          <p:nvPr/>
+        </p:nvSpPr>
+        <p:spPr>
+          <a:xfrm>
+            <a:off x="4485167" y="4387564"/>
+            <a:ext cx="6096000" cy="2308324"/>
+          </a:xfrm>
+          <a:prstGeom prst="rect">
+            <a:avLst/>
+          </a:prstGeom>
+        </p:spPr>
+        <p:txBody>
+          <a:bodyPr>
+            <a:spAutoFit/>
+          </a:bodyPr>
+          <a:lstStyle/>
+          <a:p>
+            <a:pPr marL="0" marR="0" lvl="0" indent="0" algn="l" defTabSz="914400" rtl="0" eaLnBrk="1" fontAlgn="auto" latinLnBrk="0" hangingPunct="1">
+              <a:lnSpc>
+                <a:spcPct val="100000"/>
+              </a:lnSpc>
+              <a:spcBef>
+                <a:spcPts val="0"/>
+              </a:spcBef>
+              <a:spcAft>
+                <a:spcPts val="0"/>
+              </a:spcAft>
+              <a:buClrTx/>
+              <a:buSzTx/>
+              <a:buFontTx/>
+              <a:buNone/>
+              <a:tabLst/>
+              <a:defRPr/>
+            </a:pPr>
+            <a:r>
+              <a:rPr kumimoji="0" lang="en-US" sz="1800" b="0" i="0" u="none" strike="noStrike" kern="1200" cap="none" spc="0" normalizeH="0" baseline="0" noProof="0" dirty="0">
+                <a:ln>
+                  <a:noFill/>
+                </a:ln>
+                <a:solidFill>
+                  <a:srgbClr val="4A4B4A"/>
+                </a:solidFill>
+                <a:effectLst/>
+                <a:uLnTx/>
+                <a:uFillTx/>
+                <a:latin typeface="LatoRegular"/>
+                <a:ea typeface="+mn-ea"/>
+                <a:cs typeface="+mn-cs"/>
+              </a:rPr>
+              <a:t>I. Arts, Culture, and Humanities</a:t>
+            </a:r>
+            <a:br>
+              <a:rPr kumimoji="0" lang="en-US" sz="1800" b="0" i="0" u="none" strike="noStrike" kern="1200" cap="none" spc="0" normalizeH="0" baseline="0" noProof="0" dirty="0">
+                <a:ln>
+                  <a:noFill/>
+                </a:ln>
+                <a:solidFill>
+                  <a:prstClr val="black"/>
+                </a:solidFill>
+                <a:effectLst/>
+                <a:uLnTx/>
+                <a:uFillTx/>
+                <a:latin typeface="Calibri" panose="020F0502020204030204"/>
+                <a:ea typeface="+mn-ea"/>
+                <a:cs typeface="+mn-cs"/>
+              </a:rPr>
+            </a:br>
+            <a:r>
+              <a:rPr kumimoji="0" lang="en-US" sz="1800" b="0" i="0" u="none" strike="noStrike" kern="1200" cap="none" spc="0" normalizeH="0" baseline="0" noProof="0" dirty="0">
+                <a:ln>
+                  <a:noFill/>
+                </a:ln>
+                <a:solidFill>
+                  <a:srgbClr val="4A4B4A"/>
+                </a:solidFill>
+                <a:effectLst/>
+                <a:uLnTx/>
+                <a:uFillTx/>
+                <a:latin typeface="LatoRegular"/>
+                <a:ea typeface="+mn-ea"/>
+                <a:cs typeface="+mn-cs"/>
+              </a:rPr>
+              <a:t>II. Education</a:t>
+            </a:r>
+            <a:br>
+              <a:rPr kumimoji="0" lang="en-US" sz="1800" b="0" i="0" u="none" strike="noStrike" kern="1200" cap="none" spc="0" normalizeH="0" baseline="0" noProof="0" dirty="0">
+                <a:ln>
+                  <a:noFill/>
+                </a:ln>
+                <a:solidFill>
+                  <a:prstClr val="black"/>
+                </a:solidFill>
+                <a:effectLst/>
+                <a:uLnTx/>
+                <a:uFillTx/>
+                <a:latin typeface="Calibri" panose="020F0502020204030204"/>
+                <a:ea typeface="+mn-ea"/>
+                <a:cs typeface="+mn-cs"/>
+              </a:rPr>
+            </a:br>
+            <a:r>
+              <a:rPr kumimoji="0" lang="en-US" sz="1800" b="0" i="0" u="none" strike="noStrike" kern="1200" cap="none" spc="0" normalizeH="0" baseline="0" noProof="0" dirty="0">
+                <a:ln>
+                  <a:noFill/>
+                </a:ln>
+                <a:solidFill>
+                  <a:srgbClr val="953E16"/>
+                </a:solidFill>
+                <a:effectLst/>
+                <a:uLnTx/>
+                <a:uFillTx/>
+                <a:latin typeface="LatoRegular"/>
+                <a:ea typeface="+mn-ea"/>
+                <a:cs typeface="+mn-cs"/>
+              </a:rPr>
+              <a:t>III. Environment and Animals</a:t>
+            </a:r>
+            <a:br>
+              <a:rPr kumimoji="0" lang="en-US" sz="1800" b="0" i="0" u="none" strike="noStrike" kern="1200" cap="none" spc="0" normalizeH="0" baseline="0" noProof="0" dirty="0">
+                <a:ln>
+                  <a:noFill/>
+                </a:ln>
+                <a:solidFill>
+                  <a:prstClr val="black"/>
+                </a:solidFill>
+                <a:effectLst/>
+                <a:uLnTx/>
+                <a:uFillTx/>
+                <a:latin typeface="Calibri" panose="020F0502020204030204"/>
+                <a:ea typeface="+mn-ea"/>
+                <a:cs typeface="+mn-cs"/>
+              </a:rPr>
+            </a:br>
+            <a:r>
+              <a:rPr kumimoji="0" lang="en-US" sz="1800" b="0" i="0" u="none" strike="noStrike" kern="1200" cap="none" spc="0" normalizeH="0" baseline="0" noProof="0" dirty="0">
+                <a:ln>
+                  <a:noFill/>
+                </a:ln>
+                <a:solidFill>
+                  <a:srgbClr val="4A4B4A"/>
+                </a:solidFill>
+                <a:effectLst/>
+                <a:uLnTx/>
+                <a:uFillTx/>
+                <a:latin typeface="LatoRegular"/>
+                <a:ea typeface="+mn-ea"/>
+                <a:cs typeface="+mn-cs"/>
+              </a:rPr>
+              <a:t>IV. Health</a:t>
+            </a:r>
+            <a:br>
+              <a:rPr kumimoji="0" lang="en-US" sz="1800" b="0" i="0" u="none" strike="noStrike" kern="1200" cap="none" spc="0" normalizeH="0" baseline="0" noProof="0" dirty="0">
+                <a:ln>
+                  <a:noFill/>
+                </a:ln>
+                <a:solidFill>
+                  <a:prstClr val="black"/>
+                </a:solidFill>
+                <a:effectLst/>
+                <a:uLnTx/>
+                <a:uFillTx/>
+                <a:latin typeface="Calibri" panose="020F0502020204030204"/>
+                <a:ea typeface="+mn-ea"/>
+                <a:cs typeface="+mn-cs"/>
+              </a:rPr>
+            </a:br>
+            <a:r>
+              <a:rPr kumimoji="0" lang="en-US" sz="1800" b="0" i="0" u="none" strike="noStrike" kern="1200" cap="none" spc="0" normalizeH="0" baseline="0" noProof="0" dirty="0">
+                <a:ln>
+                  <a:noFill/>
+                </a:ln>
+                <a:solidFill>
+                  <a:srgbClr val="4A4B4A"/>
+                </a:solidFill>
+                <a:effectLst/>
+                <a:uLnTx/>
+                <a:uFillTx/>
+                <a:latin typeface="LatoRegular"/>
+                <a:ea typeface="+mn-ea"/>
+                <a:cs typeface="+mn-cs"/>
+              </a:rPr>
+              <a:t>V. Human Services </a:t>
+            </a:r>
+            <a:br>
+              <a:rPr kumimoji="0" lang="en-US" sz="1800" b="0" i="0" u="none" strike="noStrike" kern="1200" cap="none" spc="0" normalizeH="0" baseline="0" noProof="0" dirty="0">
+                <a:ln>
+                  <a:noFill/>
+                </a:ln>
+                <a:solidFill>
+                  <a:prstClr val="black"/>
+                </a:solidFill>
+                <a:effectLst/>
+                <a:uLnTx/>
+                <a:uFillTx/>
+                <a:latin typeface="Calibri" panose="020F0502020204030204"/>
+                <a:ea typeface="+mn-ea"/>
+                <a:cs typeface="+mn-cs"/>
+              </a:rPr>
+            </a:br>
+            <a:r>
+              <a:rPr kumimoji="0" lang="en-US" sz="1800" b="0" i="0" u="none" strike="noStrike" kern="1200" cap="none" spc="0" normalizeH="0" baseline="0" noProof="0" dirty="0">
+                <a:ln>
+                  <a:noFill/>
+                </a:ln>
+                <a:solidFill>
+                  <a:srgbClr val="4A4B4A"/>
+                </a:solidFill>
+                <a:effectLst/>
+                <a:uLnTx/>
+                <a:uFillTx/>
+                <a:latin typeface="LatoRegular"/>
+                <a:ea typeface="+mn-ea"/>
+                <a:cs typeface="+mn-cs"/>
+              </a:rPr>
+              <a:t>VI. International, Foreign Affairs </a:t>
+            </a:r>
+            <a:br>
+              <a:rPr kumimoji="0" lang="en-US" sz="1800" b="0" i="0" u="none" strike="noStrike" kern="1200" cap="none" spc="0" normalizeH="0" baseline="0" noProof="0" dirty="0">
+                <a:ln>
+                  <a:noFill/>
+                </a:ln>
+                <a:solidFill>
+                  <a:prstClr val="black"/>
+                </a:solidFill>
+                <a:effectLst/>
+                <a:uLnTx/>
+                <a:uFillTx/>
+                <a:latin typeface="Calibri" panose="020F0502020204030204"/>
+                <a:ea typeface="+mn-ea"/>
+                <a:cs typeface="+mn-cs"/>
+              </a:rPr>
+            </a:br>
+            <a:r>
+              <a:rPr kumimoji="0" lang="en-US" sz="1800" b="0" i="0" u="none" strike="noStrike" kern="1200" cap="none" spc="0" normalizeH="0" baseline="0" noProof="0" dirty="0">
+                <a:ln>
+                  <a:noFill/>
+                </a:ln>
+                <a:solidFill>
+                  <a:srgbClr val="4A4B4A"/>
+                </a:solidFill>
+                <a:effectLst/>
+                <a:uLnTx/>
+                <a:uFillTx/>
+                <a:latin typeface="LatoRegular"/>
+                <a:ea typeface="+mn-ea"/>
+                <a:cs typeface="+mn-cs"/>
+              </a:rPr>
+              <a:t>VII. Public, Societal Benefit</a:t>
+            </a:r>
+            <a:br>
+              <a:rPr kumimoji="0" lang="en-US" sz="1800" b="0" i="0" u="none" strike="noStrike" kern="1200" cap="none" spc="0" normalizeH="0" baseline="0" noProof="0" dirty="0">
+                <a:ln>
+                  <a:noFill/>
+                </a:ln>
+                <a:solidFill>
+                  <a:prstClr val="black"/>
+                </a:solidFill>
+                <a:effectLst/>
+                <a:uLnTx/>
+                <a:uFillTx/>
+                <a:latin typeface="Calibri" panose="020F0502020204030204"/>
+                <a:ea typeface="+mn-ea"/>
+                <a:cs typeface="+mn-cs"/>
+              </a:rPr>
+            </a:br>
+            <a:r>
+              <a:rPr kumimoji="0" lang="en-US" sz="1800" b="0" i="0" u="none" strike="noStrike" kern="1200" cap="none" spc="0" normalizeH="0" baseline="0" noProof="0" dirty="0">
+                <a:ln>
+                  <a:noFill/>
+                </a:ln>
+                <a:solidFill>
+                  <a:srgbClr val="953E16"/>
+                </a:solidFill>
+                <a:effectLst/>
+                <a:uLnTx/>
+                <a:uFillTx/>
+                <a:latin typeface="LatoRegular"/>
+                <a:ea typeface="+mn-ea"/>
+                <a:cs typeface="+mn-cs"/>
+              </a:rPr>
+              <a:t>VIII. Religion Related</a:t>
+            </a:r>
+            <a:endParaRPr kumimoji="0" lang="en-US" sz="1800" b="0" i="0" u="none" strike="noStrike" kern="1200" cap="none" spc="0" normalizeH="0" baseline="0" noProof="0" dirty="0">
+              <a:ln>
+                <a:noFill/>
+              </a:ln>
+              <a:solidFill>
+                <a:srgbClr val="953E16"/>
+              </a:solidFill>
+              <a:effectLst/>
+              <a:uLnTx/>
+              <a:uFillTx/>
+              <a:latin typeface="Calibri" panose="020F0502020204030204"/>
+              <a:ea typeface="+mn-ea"/>
+              <a:cs typeface="+mn-cs"/>
+            </a:endParaRPr>
+          </a:p>
+        </p:txBody>
+      </p:sp>
+      <p:sp>
+        <p:nvSpPr>
+          <p:cNvPr id="8" name="TextBox 7">
+            <a:extLst>
+              <a:ext uri="{FF2B5EF4-FFF2-40B4-BE49-F238E27FC236}">
+                <a16:creationId xmlns:a16="http://schemas.microsoft.com/office/drawing/2014/main" id="{43F192B6-C1CA-4D0F-BC4D-DC5D4069666D}"/>
+              </a:ext>
+            </a:extLst>
+          </p:cNvPr>
+          <p:cNvSpPr txBox="1"/>
+          <p:nvPr/>
+        </p:nvSpPr>
+        <p:spPr>
+          <a:xfrm>
+            <a:off x="2366626" y="287255"/>
+            <a:ext cx="3291073" cy="400110"/>
+          </a:xfrm>
+          <a:prstGeom prst="rect">
+            <a:avLst/>
+          </a:prstGeom>
+          <a:noFill/>
+        </p:spPr>
+        <p:txBody>
+          <a:bodyPr wrap="square" rtlCol="0">
+            <a:spAutoFit/>
+          </a:bodyPr>
+          <a:lstStyle/>
+          <a:p>
+            <a:pPr marL="0" marR="0" lvl="0" indent="0" algn="ctr" defTabSz="914400" rtl="0" eaLnBrk="1" fontAlgn="auto" latinLnBrk="0" hangingPunct="1">
+              <a:lnSpc>
+                <a:spcPct val="100000"/>
+              </a:lnSpc>
+              <a:spcBef>
+                <a:spcPts val="0"/>
+              </a:spcBef>
+              <a:spcAft>
+                <a:spcPts val="0"/>
+              </a:spcAft>
+              <a:buClrTx/>
+              <a:buSzTx/>
+              <a:buFontTx/>
+              <a:buNone/>
+              <a:tabLst/>
+              <a:defRPr/>
+            </a:pPr>
+            <a:r>
+              <a:rPr kumimoji="0" lang="en-US" sz="2000" b="0" i="0" u="none" strike="noStrike" kern="1200" cap="all" spc="0" normalizeH="0" noProof="0" dirty="0">
+                <a:ln>
+                  <a:noFill/>
+                </a:ln>
+                <a:solidFill>
+                  <a:srgbClr val="953E16"/>
+                </a:solidFill>
+                <a:effectLst/>
+                <a:uLnTx/>
+                <a:uFillTx/>
+                <a:latin typeface="Century Gothic" panose="020B0502020202020204" pitchFamily="34" charset="0"/>
+                <a:ea typeface="+mn-ea"/>
+                <a:cs typeface="+mn-cs"/>
+              </a:rPr>
+              <a:t>Religion</a:t>
+            </a:r>
+          </a:p>
+        </p:txBody>
+      </p:sp>
+      <p:cxnSp>
+        <p:nvCxnSpPr>
+          <p:cNvPr id="10" name="Straight Arrow Connector 9">
+            <a:extLst>
+              <a:ext uri="{FF2B5EF4-FFF2-40B4-BE49-F238E27FC236}">
+                <a16:creationId xmlns:a16="http://schemas.microsoft.com/office/drawing/2014/main" id="{4976B822-FAA2-4E3D-8009-9F5293D353B6}"/>
+              </a:ext>
+            </a:extLst>
+          </p:cNvPr>
+          <p:cNvCxnSpPr>
+            <a:cxnSpLocks/>
+          </p:cNvCxnSpPr>
+          <p:nvPr/>
+        </p:nvCxnSpPr>
+        <p:spPr>
+          <a:xfrm flipV="1">
+            <a:off x="1704826" y="2505965"/>
+            <a:ext cx="920566" cy="1834242"/>
+          </a:xfrm>
+          <a:prstGeom prst="straightConnector1">
+            <a:avLst/>
+          </a:prstGeom>
+          <a:ln w="12700">
+            <a:solidFill>
+              <a:srgbClr val="953E16"/>
+            </a:solidFill>
+            <a:tailEnd type="triangle"/>
+          </a:ln>
+        </p:spPr>
+        <p:style>
+          <a:lnRef idx="1">
+            <a:schemeClr val="accent1"/>
+          </a:lnRef>
+          <a:fillRef idx="0">
+            <a:schemeClr val="accent1"/>
+          </a:fillRef>
+          <a:effectRef idx="0">
+            <a:schemeClr val="accent1"/>
+          </a:effectRef>
+          <a:fontRef idx="minor">
+            <a:schemeClr val="tx1"/>
+          </a:fontRef>
+        </p:style>
+      </p:cxnSp>
+      <p:sp>
+        <p:nvSpPr>
+          <p:cNvPr id="11" name="TextBox 10">
+            <a:extLst>
+              <a:ext uri="{FF2B5EF4-FFF2-40B4-BE49-F238E27FC236}">
+                <a16:creationId xmlns:a16="http://schemas.microsoft.com/office/drawing/2014/main" id="{EA262CEA-046F-4C7C-917A-0DBF1D5996B9}"/>
+              </a:ext>
+            </a:extLst>
+          </p:cNvPr>
+          <p:cNvSpPr txBox="1"/>
+          <p:nvPr/>
+        </p:nvSpPr>
+        <p:spPr>
+          <a:xfrm>
+            <a:off x="6252972" y="362570"/>
+            <a:ext cx="3291073" cy="400110"/>
+          </a:xfrm>
+          <a:prstGeom prst="rect">
+            <a:avLst/>
+          </a:prstGeom>
+          <a:noFill/>
+        </p:spPr>
+        <p:txBody>
+          <a:bodyPr wrap="square" rtlCol="0">
+            <a:spAutoFit/>
+          </a:bodyPr>
+          <a:lstStyle/>
+          <a:p>
+            <a:pPr marL="0" marR="0" lvl="0" indent="0" algn="ctr" defTabSz="914400" rtl="0" eaLnBrk="1" fontAlgn="auto" latinLnBrk="0" hangingPunct="1">
+              <a:lnSpc>
+                <a:spcPct val="100000"/>
+              </a:lnSpc>
+              <a:spcBef>
+                <a:spcPts val="0"/>
+              </a:spcBef>
+              <a:spcAft>
+                <a:spcPts val="0"/>
+              </a:spcAft>
+              <a:buClrTx/>
+              <a:buSzTx/>
+              <a:buFontTx/>
+              <a:buNone/>
+              <a:tabLst/>
+              <a:defRPr/>
+            </a:pPr>
+            <a:r>
+              <a:rPr kumimoji="0" lang="en-US" sz="2000" b="0" i="0" u="none" strike="noStrike" kern="1200" cap="all" spc="0" normalizeH="0" noProof="0" dirty="0">
+                <a:ln>
+                  <a:noFill/>
+                </a:ln>
+                <a:solidFill>
+                  <a:srgbClr val="953E16"/>
+                </a:solidFill>
+                <a:effectLst/>
+                <a:uLnTx/>
+                <a:uFillTx/>
+                <a:latin typeface="Century Gothic" panose="020B0502020202020204" pitchFamily="34" charset="0"/>
+                <a:ea typeface="+mn-ea"/>
+                <a:cs typeface="+mn-cs"/>
+              </a:rPr>
+              <a:t>Environment</a:t>
+            </a:r>
+          </a:p>
+        </p:txBody>
+      </p:sp>
+      <p:sp>
+        <p:nvSpPr>
+          <p:cNvPr id="17" name="TextBox 16">
+            <a:extLst>
+              <a:ext uri="{FF2B5EF4-FFF2-40B4-BE49-F238E27FC236}">
+                <a16:creationId xmlns:a16="http://schemas.microsoft.com/office/drawing/2014/main" id="{363794E5-830F-481E-80D8-4834B1997EB7}"/>
+              </a:ext>
+            </a:extLst>
+          </p:cNvPr>
+          <p:cNvSpPr txBox="1"/>
+          <p:nvPr/>
+        </p:nvSpPr>
+        <p:spPr>
+          <a:xfrm>
+            <a:off x="-34704" y="4387564"/>
+            <a:ext cx="3291073" cy="707886"/>
+          </a:xfrm>
+          <a:prstGeom prst="rect">
+            <a:avLst/>
+          </a:prstGeom>
+          <a:noFill/>
+        </p:spPr>
+        <p:txBody>
+          <a:bodyPr wrap="square" rtlCol="0">
+            <a:spAutoFit/>
+          </a:bodyPr>
+          <a:lstStyle/>
+          <a:p>
+            <a:pPr marL="0" marR="0" lvl="0" indent="0" algn="ctr" defTabSz="914400" rtl="0" eaLnBrk="1" fontAlgn="auto" latinLnBrk="0" hangingPunct="1">
+              <a:lnSpc>
+                <a:spcPct val="100000"/>
+              </a:lnSpc>
+              <a:spcBef>
+                <a:spcPts val="0"/>
+              </a:spcBef>
+              <a:spcAft>
+                <a:spcPts val="0"/>
+              </a:spcAft>
+              <a:buClrTx/>
+              <a:buSzTx/>
+              <a:buFontTx/>
+              <a:buNone/>
+              <a:tabLst/>
+              <a:defRPr/>
+            </a:pPr>
+            <a:r>
+              <a:rPr lang="en-US" sz="2000" dirty="0">
+                <a:solidFill>
+                  <a:srgbClr val="953E16"/>
+                </a:solidFill>
+                <a:latin typeface="Century Gothic" panose="020B0502020202020204" pitchFamily="34" charset="0"/>
+              </a:rPr>
+              <a:t>Distinctive</a:t>
+            </a:r>
+          </a:p>
+          <a:p>
+            <a:pPr marL="0" marR="0" lvl="0" indent="0" algn="ctr" defTabSz="914400" rtl="0" eaLnBrk="1" fontAlgn="auto" latinLnBrk="0" hangingPunct="1">
+              <a:lnSpc>
+                <a:spcPct val="100000"/>
+              </a:lnSpc>
+              <a:spcBef>
+                <a:spcPts val="0"/>
+              </a:spcBef>
+              <a:spcAft>
+                <a:spcPts val="0"/>
+              </a:spcAft>
+              <a:buClrTx/>
+              <a:buSzTx/>
+              <a:buFontTx/>
+              <a:buNone/>
+              <a:tabLst/>
+              <a:defRPr/>
+            </a:pPr>
+            <a:r>
+              <a:rPr lang="en-US" sz="2000" dirty="0">
+                <a:solidFill>
+                  <a:srgbClr val="953E16"/>
+                </a:solidFill>
+                <a:latin typeface="Century Gothic" panose="020B0502020202020204" pitchFamily="34" charset="0"/>
+              </a:rPr>
+              <a:t>constructs</a:t>
+            </a:r>
+            <a:endParaRPr kumimoji="0" lang="en-US" sz="2000" b="0" i="0" u="none" strike="noStrike" kern="1200" cap="none" spc="0" normalizeH="0" baseline="0" noProof="0" dirty="0">
+              <a:ln>
+                <a:noFill/>
+              </a:ln>
+              <a:solidFill>
+                <a:srgbClr val="953E16"/>
+              </a:solidFill>
+              <a:effectLst/>
+              <a:uLnTx/>
+              <a:uFillTx/>
+              <a:latin typeface="Century Gothic" panose="020B0502020202020204" pitchFamily="34" charset="0"/>
+              <a:ea typeface="+mn-ea"/>
+              <a:cs typeface="+mn-cs"/>
+            </a:endParaRPr>
+          </a:p>
+        </p:txBody>
+      </p:sp>
+      <p:cxnSp>
+        <p:nvCxnSpPr>
+          <p:cNvPr id="22" name="Straight Arrow Connector 21">
+            <a:extLst>
+              <a:ext uri="{FF2B5EF4-FFF2-40B4-BE49-F238E27FC236}">
+                <a16:creationId xmlns:a16="http://schemas.microsoft.com/office/drawing/2014/main" id="{39FB0EE5-E971-41D9-A084-580FFBFB2048}"/>
+              </a:ext>
+            </a:extLst>
+          </p:cNvPr>
+          <p:cNvCxnSpPr>
+            <a:cxnSpLocks/>
+          </p:cNvCxnSpPr>
+          <p:nvPr/>
+        </p:nvCxnSpPr>
+        <p:spPr>
+          <a:xfrm flipH="1" flipV="1">
+            <a:off x="6466114" y="2646216"/>
+            <a:ext cx="2843657" cy="2382984"/>
+          </a:xfrm>
+          <a:prstGeom prst="straightConnector1">
+            <a:avLst/>
+          </a:prstGeom>
+          <a:ln w="12700">
+            <a:solidFill>
+              <a:srgbClr val="953E16"/>
+            </a:solidFill>
+            <a:tailEnd type="triangle"/>
+          </a:ln>
+        </p:spPr>
+        <p:style>
+          <a:lnRef idx="1">
+            <a:schemeClr val="accent1"/>
+          </a:lnRef>
+          <a:fillRef idx="0">
+            <a:schemeClr val="accent1"/>
+          </a:fillRef>
+          <a:effectRef idx="0">
+            <a:schemeClr val="accent1"/>
+          </a:effectRef>
+          <a:fontRef idx="minor">
+            <a:schemeClr val="tx1"/>
+          </a:fontRef>
+        </p:style>
+      </p:cxnSp>
+      <p:sp>
+        <p:nvSpPr>
+          <p:cNvPr id="23" name="TextBox 22">
+            <a:extLst>
+              <a:ext uri="{FF2B5EF4-FFF2-40B4-BE49-F238E27FC236}">
+                <a16:creationId xmlns:a16="http://schemas.microsoft.com/office/drawing/2014/main" id="{C43B2E35-7EFA-486A-9E6D-D693D5060BF6}"/>
+              </a:ext>
+            </a:extLst>
+          </p:cNvPr>
+          <p:cNvSpPr txBox="1"/>
+          <p:nvPr/>
+        </p:nvSpPr>
+        <p:spPr>
+          <a:xfrm>
+            <a:off x="8599222" y="4883653"/>
+            <a:ext cx="3291073" cy="707886"/>
+          </a:xfrm>
+          <a:prstGeom prst="rect">
+            <a:avLst/>
+          </a:prstGeom>
+          <a:noFill/>
+        </p:spPr>
+        <p:txBody>
+          <a:bodyPr wrap="square" rtlCol="0">
+            <a:spAutoFit/>
+          </a:bodyPr>
+          <a:lstStyle/>
+          <a:p>
+            <a:pPr marL="0" marR="0" lvl="0" indent="0" algn="ctr" defTabSz="914400" rtl="0" eaLnBrk="1" fontAlgn="auto" latinLnBrk="0" hangingPunct="1">
+              <a:lnSpc>
+                <a:spcPct val="100000"/>
+              </a:lnSpc>
+              <a:spcBef>
+                <a:spcPts val="0"/>
+              </a:spcBef>
+              <a:spcAft>
+                <a:spcPts val="0"/>
+              </a:spcAft>
+              <a:buClrTx/>
+              <a:buSzTx/>
+              <a:buFontTx/>
+              <a:buNone/>
+              <a:tabLst/>
+              <a:defRPr/>
+            </a:pPr>
+            <a:r>
+              <a:rPr lang="en-US" sz="2000" dirty="0">
+                <a:solidFill>
+                  <a:srgbClr val="953E16"/>
+                </a:solidFill>
+                <a:latin typeface="Century Gothic" panose="020B0502020202020204" pitchFamily="34" charset="0"/>
+              </a:rPr>
+              <a:t>Shared</a:t>
+            </a:r>
+          </a:p>
+          <a:p>
+            <a:pPr marL="0" marR="0" lvl="0" indent="0" algn="ctr" defTabSz="914400" rtl="0" eaLnBrk="1" fontAlgn="auto" latinLnBrk="0" hangingPunct="1">
+              <a:lnSpc>
+                <a:spcPct val="100000"/>
+              </a:lnSpc>
+              <a:spcBef>
+                <a:spcPts val="0"/>
+              </a:spcBef>
+              <a:spcAft>
+                <a:spcPts val="0"/>
+              </a:spcAft>
+              <a:buClrTx/>
+              <a:buSzTx/>
+              <a:buFontTx/>
+              <a:buNone/>
+              <a:tabLst/>
+              <a:defRPr/>
+            </a:pPr>
+            <a:r>
+              <a:rPr lang="en-US" sz="2000" dirty="0">
+                <a:solidFill>
+                  <a:srgbClr val="953E16"/>
+                </a:solidFill>
+                <a:latin typeface="Century Gothic" panose="020B0502020202020204" pitchFamily="34" charset="0"/>
+              </a:rPr>
+              <a:t>constructs</a:t>
+            </a:r>
+            <a:endParaRPr kumimoji="0" lang="en-US" sz="2000" b="0" i="0" u="none" strike="noStrike" kern="1200" cap="none" spc="0" normalizeH="0" baseline="0" noProof="0" dirty="0">
+              <a:ln>
+                <a:noFill/>
+              </a:ln>
+              <a:solidFill>
+                <a:srgbClr val="953E16"/>
+              </a:solidFill>
+              <a:effectLst/>
+              <a:uLnTx/>
+              <a:uFillTx/>
+              <a:latin typeface="Century Gothic" panose="020B0502020202020204" pitchFamily="34" charset="0"/>
+              <a:ea typeface="+mn-ea"/>
+              <a:cs typeface="+mn-cs"/>
+            </a:endParaRPr>
+          </a:p>
+        </p:txBody>
+      </p:sp>
+    </p:spTree>
+    <p:extLst>
+      <p:ext uri="{BB962C8B-B14F-4D97-AF65-F5344CB8AC3E}">
+        <p14:creationId xmlns:p14="http://schemas.microsoft.com/office/powerpoint/2010/main" val="4064060197"/>
+      </p:ext>
+    </p:extLst>
+  </p:cSld>
+  <p:clrMapOvr>
+    <a:masterClrMapping/>
+  </p:clrMapOvr>
+</p:sld>
+</file>
+
 <file path=ppt/slides/slide14.xml><?xml version="1.0" encoding="utf-8"?>
 <p:sld xmlns:a="http://schemas.openxmlformats.org/drawingml/2006/main" xmlns:r="http://schemas.openxmlformats.org/officeDocument/2006/relationships" xmlns:p="http://schemas.openxmlformats.org/presentationml/2006/main">
   <p:cSld>
@@ -17552,7 +17340,7 @@
         </p:nvSpPr>
         <p:spPr bwMode="auto">
           <a:xfrm>
-            <a:off x="6846165" y="885292"/>
+            <a:off x="6846165" y="1178981"/>
             <a:ext cx="4790327" cy="1107996"/>
           </a:xfrm>
           <a:prstGeom prst="rect">
@@ -17799,7 +17587,7 @@
         </p:nvSpPr>
         <p:spPr bwMode="auto">
           <a:xfrm>
-            <a:off x="560026" y="762598"/>
+            <a:off x="560026" y="1056287"/>
             <a:ext cx="5049466" cy="1292662"/>
           </a:xfrm>
           <a:prstGeom prst="rect">
@@ -18894,7 +18682,7 @@
         </p:nvCxnSpPr>
         <p:spPr>
           <a:xfrm>
-            <a:off x="5251939" y="1424918"/>
+            <a:off x="5251939" y="1718607"/>
             <a:ext cx="1154611" cy="0"/>
           </a:xfrm>
           <a:prstGeom prst="straightConnector1">
@@ -18994,6 +18782,41 @@
               <a:ea typeface="+mn-ea"/>
               <a:cs typeface="+mn-cs"/>
             </a:endParaRPr>
+          </a:p>
+        </p:txBody>
+      </p:sp>
+      <p:sp>
+        <p:nvSpPr>
+          <p:cNvPr id="5" name="TextBox 4">
+            <a:extLst>
+              <a:ext uri="{FF2B5EF4-FFF2-40B4-BE49-F238E27FC236}">
+                <a16:creationId xmlns:a16="http://schemas.microsoft.com/office/drawing/2014/main" id="{90C9D049-C28E-FC72-C661-24D0F63D9682}"/>
+              </a:ext>
+            </a:extLst>
+          </p:cNvPr>
+          <p:cNvSpPr txBox="1"/>
+          <p:nvPr/>
+        </p:nvSpPr>
+        <p:spPr>
+          <a:xfrm>
+            <a:off x="392387" y="140994"/>
+            <a:ext cx="11244105" cy="369332"/>
+          </a:xfrm>
+          <a:prstGeom prst="rect">
+            <a:avLst/>
+          </a:prstGeom>
+          <a:noFill/>
+        </p:spPr>
+        <p:txBody>
+          <a:bodyPr wrap="square">
+            <a:spAutoFit/>
+          </a:bodyPr>
+          <a:lstStyle/>
+          <a:p>
+            <a:r>
+              <a:rPr lang="en-US" dirty="0"/>
+              <a:t>https://nonprofit-open-data-collective.github.io/machine_learning_mission_codes/tutorials/semantic_networks.html</a:t>
+            </a:r>
           </a:p>
         </p:txBody>
       </p:sp>
@@ -34278,191 +34101,6 @@
       </p:grpSpPr>
       <p:sp>
         <p:nvSpPr>
-          <p:cNvPr id="2" name="Slide Number Placeholder 1"/>
-          <p:cNvSpPr>
-            <a:spLocks noGrp="1"/>
-          </p:cNvSpPr>
-          <p:nvPr>
-            <p:ph type="sldNum" sz="quarter" idx="12"/>
-          </p:nvPr>
-        </p:nvSpPr>
-        <p:spPr/>
-        <p:txBody>
-          <a:bodyPr/>
-          <a:lstStyle/>
-          <a:p>
-            <a:fld id="{0FDD4DA2-4FBE-4694-B57B-F9990517B432}" type="slidenum">
-              <a:rPr lang="en-US" smtClean="0"/>
-              <a:t>5</a:t>
-            </a:fld>
-            <a:endParaRPr lang="en-US"/>
-          </a:p>
-        </p:txBody>
-      </p:sp>
-      <p:sp>
-        <p:nvSpPr>
-          <p:cNvPr id="3" name="Rectangle 2"/>
-          <p:cNvSpPr/>
-          <p:nvPr/>
-        </p:nvSpPr>
-        <p:spPr>
-          <a:xfrm>
-            <a:off x="4012162" y="603237"/>
-            <a:ext cx="3844211" cy="3539430"/>
-          </a:xfrm>
-          <a:prstGeom prst="rect">
-            <a:avLst/>
-          </a:prstGeom>
-        </p:spPr>
-        <p:txBody>
-          <a:bodyPr wrap="square">
-            <a:spAutoFit/>
-          </a:bodyPr>
-          <a:lstStyle/>
-          <a:p>
-            <a:pPr algn="ctr">
-              <a:lnSpc>
-                <a:spcPct val="200000"/>
-              </a:lnSpc>
-            </a:pPr>
-            <a:r>
-              <a:rPr lang="en-US" sz="4000" cap="all" dirty="0">
-                <a:solidFill>
-                  <a:srgbClr val="953E16"/>
-                </a:solidFill>
-                <a:latin typeface="Century Gothic" panose="020B0502020202020204" pitchFamily="34" charset="0"/>
-              </a:rPr>
-              <a:t>Stemming</a:t>
-            </a:r>
-          </a:p>
-          <a:p>
-            <a:pPr>
-              <a:lnSpc>
-                <a:spcPct val="200000"/>
-              </a:lnSpc>
-            </a:pPr>
-            <a:endParaRPr lang="en-US" sz="2400" cap="all" dirty="0"/>
-          </a:p>
-          <a:p>
-            <a:pPr>
-              <a:lnSpc>
-                <a:spcPct val="200000"/>
-              </a:lnSpc>
-            </a:pPr>
-            <a:r>
-              <a:rPr lang="en-US" sz="2400" cap="all" dirty="0"/>
-              <a:t>lend</a:t>
-            </a:r>
-          </a:p>
-          <a:p>
-            <a:pPr>
-              <a:lnSpc>
-                <a:spcPct val="200000"/>
-              </a:lnSpc>
-            </a:pPr>
-            <a:r>
-              <a:rPr lang="en-US" sz="2400" cap="all" dirty="0"/>
-              <a:t>lend</a:t>
-            </a:r>
-            <a:r>
-              <a:rPr lang="en-US" sz="2400" strike="sngStrike" dirty="0"/>
-              <a:t>ing</a:t>
-            </a:r>
-          </a:p>
-        </p:txBody>
-      </p:sp>
-      <p:sp>
-        <p:nvSpPr>
-          <p:cNvPr id="5" name="Rectangle 4"/>
-          <p:cNvSpPr/>
-          <p:nvPr/>
-        </p:nvSpPr>
-        <p:spPr>
-          <a:xfrm>
-            <a:off x="6509656" y="2573007"/>
-            <a:ext cx="6096000" cy="1569660"/>
-          </a:xfrm>
-          <a:prstGeom prst="rect">
-            <a:avLst/>
-          </a:prstGeom>
-        </p:spPr>
-        <p:txBody>
-          <a:bodyPr>
-            <a:spAutoFit/>
-          </a:bodyPr>
-          <a:lstStyle/>
-          <a:p>
-            <a:pPr lvl="0">
-              <a:lnSpc>
-                <a:spcPct val="200000"/>
-              </a:lnSpc>
-            </a:pPr>
-            <a:r>
-              <a:rPr lang="en-US" sz="2400" cap="all" dirty="0">
-                <a:solidFill>
-                  <a:prstClr val="black"/>
-                </a:solidFill>
-              </a:rPr>
-              <a:t>relate</a:t>
-            </a:r>
-          </a:p>
-          <a:p>
-            <a:pPr lvl="0">
-              <a:lnSpc>
-                <a:spcPct val="200000"/>
-              </a:lnSpc>
-            </a:pPr>
-            <a:r>
-              <a:rPr lang="en-US" sz="2400" cap="all" dirty="0">
-                <a:solidFill>
-                  <a:prstClr val="black"/>
-                </a:solidFill>
-              </a:rPr>
-              <a:t>relate</a:t>
-            </a:r>
-            <a:r>
-              <a:rPr lang="en-US" sz="2400" strike="sngStrike" dirty="0">
-                <a:solidFill>
-                  <a:prstClr val="black"/>
-                </a:solidFill>
-              </a:rPr>
-              <a:t>d</a:t>
-            </a:r>
-          </a:p>
-        </p:txBody>
-      </p:sp>
-    </p:spTree>
-    <p:extLst>
-      <p:ext uri="{BB962C8B-B14F-4D97-AF65-F5344CB8AC3E}">
-        <p14:creationId xmlns:p14="http://schemas.microsoft.com/office/powerpoint/2010/main" val="1678773642"/>
-      </p:ext>
-    </p:extLst>
-  </p:cSld>
-  <p:clrMapOvr>
-    <a:masterClrMapping/>
-  </p:clrMapOvr>
-</p:sld>
-</file>
-
-<file path=ppt/slides/slide6.xml><?xml version="1.0" encoding="utf-8"?>
-<p:sld xmlns:a="http://schemas.openxmlformats.org/drawingml/2006/main" xmlns:r="http://schemas.openxmlformats.org/officeDocument/2006/relationships" xmlns:p="http://schemas.openxmlformats.org/presentationml/2006/main">
-  <p:cSld>
-    <p:spTree>
-      <p:nvGrpSpPr>
-        <p:cNvPr id="1" name=""/>
-        <p:cNvGrpSpPr/>
-        <p:nvPr/>
-      </p:nvGrpSpPr>
-      <p:grpSpPr>
-        <a:xfrm>
-          <a:off x="0" y="0"/>
-          <a:ext cx="0" cy="0"/>
-          <a:chOff x="0" y="0"/>
-          <a:chExt cx="0" cy="0"/>
-        </a:xfrm>
-      </p:grpSpPr>
-      <p:sp>
-        <p:nvSpPr>
           <p:cNvPr id="2" name="Slide Number Placeholder 1">
             <a:extLst>
               <a:ext uri="{FF2B5EF4-FFF2-40B4-BE49-F238E27FC236}">
@@ -34489,7 +34127,7 @@
           <a:p>
             <a:fld id="{0FDD4DA2-4FBE-4694-B57B-F9990517B432}" type="slidenum">
               <a:rPr lang="en-US" smtClean="0"/>
-              <a:t>6</a:t>
+              <a:t>5</a:t>
             </a:fld>
             <a:endParaRPr lang="en-US"/>
           </a:p>
@@ -34743,6 +34381,65 @@
           </a:p>
         </p:txBody>
       </p:sp>
+      <p:sp>
+        <p:nvSpPr>
+          <p:cNvPr id="6" name="TextBox 5">
+            <a:extLst>
+              <a:ext uri="{FF2B5EF4-FFF2-40B4-BE49-F238E27FC236}">
+                <a16:creationId xmlns:a16="http://schemas.microsoft.com/office/drawing/2014/main" id="{626F67C8-1A43-453A-DA60-CBB7B2363090}"/>
+              </a:ext>
+            </a:extLst>
+          </p:cNvPr>
+          <p:cNvSpPr txBox="1"/>
+          <p:nvPr/>
+        </p:nvSpPr>
+        <p:spPr>
+          <a:xfrm>
+            <a:off x="6986513" y="1857828"/>
+            <a:ext cx="2185828" cy="1169551"/>
+          </a:xfrm>
+          <a:prstGeom prst="rect">
+            <a:avLst/>
+          </a:prstGeom>
+          <a:noFill/>
+        </p:spPr>
+        <p:txBody>
+          <a:bodyPr wrap="square" rtlCol="0">
+            <a:spAutoFit/>
+          </a:bodyPr>
+          <a:lstStyle/>
+          <a:p>
+            <a:pPr algn="ctr"/>
+            <a:r>
+              <a:rPr lang="en-US" sz="1400" dirty="0">
+                <a:latin typeface="+mj-lt"/>
+                <a:cs typeface="Biome Light" panose="020B0303030204020804" pitchFamily="34" charset="0"/>
+              </a:rPr>
+              <a:t>Examples of N-GRAMS</a:t>
+            </a:r>
+            <a:br>
+              <a:rPr lang="en-US" sz="1400" dirty="0">
+                <a:latin typeface="+mj-lt"/>
+                <a:cs typeface="Biome Light" panose="020B0303030204020804" pitchFamily="34" charset="0"/>
+              </a:rPr>
+            </a:br>
+            <a:endParaRPr lang="en-US" sz="1400" dirty="0">
+              <a:latin typeface="+mj-lt"/>
+              <a:cs typeface="Biome Light" panose="020B0303030204020804" pitchFamily="34" charset="0"/>
+            </a:endParaRPr>
+          </a:p>
+          <a:p>
+            <a:pPr algn="ctr"/>
+            <a:r>
+              <a:rPr lang="en-US" sz="1400" dirty="0">
+                <a:latin typeface="+mj-lt"/>
+                <a:cs typeface="Biome Light" panose="020B0303030204020804" pitchFamily="34" charset="0"/>
+              </a:rPr>
+              <a:t>two-word or three-word groups that map to a single concept</a:t>
+            </a:r>
+          </a:p>
+        </p:txBody>
+      </p:sp>
     </p:spTree>
     <p:extLst>
       <p:ext uri="{BB962C8B-B14F-4D97-AF65-F5344CB8AC3E}">
@@ -34756,7 +34453,7 @@
 </p:sld>
 </file>
 
-<file path=ppt/slides/slide7.xml><?xml version="1.0" encoding="utf-8"?>
+<file path=ppt/slides/slide6.xml><?xml version="1.0" encoding="utf-8"?>
 <p:sld xmlns:a="http://schemas.openxmlformats.org/drawingml/2006/main" xmlns:r="http://schemas.openxmlformats.org/officeDocument/2006/relationships" xmlns:p="http://schemas.openxmlformats.org/presentationml/2006/main">
   <p:cSld>
     <p:spTree>
@@ -34801,7 +34498,7 @@
           <a:p>
             <a:fld id="{0FDD4DA2-4FBE-4694-B57B-F9990517B432}" type="slidenum">
               <a:rPr lang="en-US" smtClean="0"/>
-              <a:t>7</a:t>
+              <a:t>6</a:t>
             </a:fld>
             <a:endParaRPr lang="en-US"/>
           </a:p>
@@ -35357,10 +35054,325 @@
           </a:p>
         </p:txBody>
       </p:sp>
+      <p:sp>
+        <p:nvSpPr>
+          <p:cNvPr id="3" name="TextBox 2">
+            <a:extLst>
+              <a:ext uri="{FF2B5EF4-FFF2-40B4-BE49-F238E27FC236}">
+                <a16:creationId xmlns:a16="http://schemas.microsoft.com/office/drawing/2014/main" id="{957497D5-C22D-7D6E-E73C-0DCE4A134364}"/>
+              </a:ext>
+            </a:extLst>
+          </p:cNvPr>
+          <p:cNvSpPr txBox="1"/>
+          <p:nvPr/>
+        </p:nvSpPr>
+        <p:spPr>
+          <a:xfrm>
+            <a:off x="6770670" y="1764018"/>
+            <a:ext cx="2792089" cy="954107"/>
+          </a:xfrm>
+          <a:prstGeom prst="rect">
+            <a:avLst/>
+          </a:prstGeom>
+          <a:noFill/>
+        </p:spPr>
+        <p:txBody>
+          <a:bodyPr wrap="square" rtlCol="0">
+            <a:spAutoFit/>
+          </a:bodyPr>
+          <a:lstStyle/>
+          <a:p>
+            <a:pPr algn="ctr"/>
+            <a:r>
+              <a:rPr lang="en-US" sz="1400" dirty="0">
+                <a:latin typeface="+mj-lt"/>
+                <a:cs typeface="Biome Light" panose="020B0303030204020804" pitchFamily="34" charset="0"/>
+              </a:rPr>
+              <a:t>Other mappings that you might want to do within the dictionary to disambiguate the term “New York” using context.</a:t>
+            </a:r>
+          </a:p>
+        </p:txBody>
+      </p:sp>
+      <p:sp>
+        <p:nvSpPr>
+          <p:cNvPr id="4" name="TextBox 3">
+            <a:extLst>
+              <a:ext uri="{FF2B5EF4-FFF2-40B4-BE49-F238E27FC236}">
+                <a16:creationId xmlns:a16="http://schemas.microsoft.com/office/drawing/2014/main" id="{A53656EA-C788-A18F-7A03-DB117DA0877D}"/>
+              </a:ext>
+            </a:extLst>
+          </p:cNvPr>
+          <p:cNvSpPr txBox="1"/>
+          <p:nvPr/>
+        </p:nvSpPr>
+        <p:spPr>
+          <a:xfrm>
+            <a:off x="6770670" y="5995198"/>
+            <a:ext cx="3452118" cy="338554"/>
+          </a:xfrm>
+          <a:prstGeom prst="rect">
+            <a:avLst/>
+          </a:prstGeom>
+          <a:noFill/>
+        </p:spPr>
+        <p:txBody>
+          <a:bodyPr wrap="square" rtlCol="0">
+            <a:spAutoFit/>
+          </a:bodyPr>
+          <a:lstStyle/>
+          <a:p>
+            <a:pPr algn="ctr"/>
+            <a:r>
+              <a:rPr lang="en-US" sz="1600" dirty="0">
+                <a:solidFill>
+                  <a:schemeClr val="tx1">
+                    <a:lumMod val="50000"/>
+                    <a:lumOff val="50000"/>
+                  </a:schemeClr>
+                </a:solidFill>
+                <a:latin typeface="+mj-lt"/>
+                <a:cs typeface="Biome Light" panose="020B0303030204020804" pitchFamily="34" charset="0"/>
+              </a:rPr>
+              <a:t>(ambiguous – can also be the city)</a:t>
+            </a:r>
+          </a:p>
+        </p:txBody>
+      </p:sp>
     </p:spTree>
     <p:extLst>
       <p:ext uri="{BB962C8B-B14F-4D97-AF65-F5344CB8AC3E}">
         <p14:creationId xmlns:p14="http://schemas.microsoft.com/office/powerpoint/2010/main" val="1973511020"/>
+      </p:ext>
+    </p:extLst>
+  </p:cSld>
+  <p:clrMapOvr>
+    <a:masterClrMapping/>
+  </p:clrMapOvr>
+</p:sld>
+</file>
+
+<file path=ppt/slides/slide7.xml><?xml version="1.0" encoding="utf-8"?>
+<p:sld xmlns:a="http://schemas.openxmlformats.org/drawingml/2006/main" xmlns:r="http://schemas.openxmlformats.org/officeDocument/2006/relationships" xmlns:p="http://schemas.openxmlformats.org/presentationml/2006/main">
+  <p:cSld>
+    <p:spTree>
+      <p:nvGrpSpPr>
+        <p:cNvPr id="1" name=""/>
+        <p:cNvGrpSpPr/>
+        <p:nvPr/>
+      </p:nvGrpSpPr>
+      <p:grpSpPr>
+        <a:xfrm>
+          <a:off x="0" y="0"/>
+          <a:ext cx="0" cy="0"/>
+          <a:chOff x="0" y="0"/>
+          <a:chExt cx="0" cy="0"/>
+        </a:xfrm>
+      </p:grpSpPr>
+      <p:sp>
+        <p:nvSpPr>
+          <p:cNvPr id="2" name="Slide Number Placeholder 1"/>
+          <p:cNvSpPr>
+            <a:spLocks noGrp="1"/>
+          </p:cNvSpPr>
+          <p:nvPr>
+            <p:ph type="sldNum" sz="quarter" idx="12"/>
+          </p:nvPr>
+        </p:nvSpPr>
+        <p:spPr/>
+        <p:txBody>
+          <a:bodyPr/>
+          <a:lstStyle/>
+          <a:p>
+            <a:fld id="{0FDD4DA2-4FBE-4694-B57B-F9990517B432}" type="slidenum">
+              <a:rPr lang="en-US" smtClean="0"/>
+              <a:t>7</a:t>
+            </a:fld>
+            <a:endParaRPr lang="en-US"/>
+          </a:p>
+        </p:txBody>
+      </p:sp>
+      <p:sp>
+        <p:nvSpPr>
+          <p:cNvPr id="3" name="Rectangle 2"/>
+          <p:cNvSpPr/>
+          <p:nvPr/>
+        </p:nvSpPr>
+        <p:spPr>
+          <a:xfrm>
+            <a:off x="4012162" y="603237"/>
+            <a:ext cx="3844211" cy="3539430"/>
+          </a:xfrm>
+          <a:prstGeom prst="rect">
+            <a:avLst/>
+          </a:prstGeom>
+        </p:spPr>
+        <p:txBody>
+          <a:bodyPr wrap="square">
+            <a:spAutoFit/>
+          </a:bodyPr>
+          <a:lstStyle/>
+          <a:p>
+            <a:pPr algn="ctr">
+              <a:lnSpc>
+                <a:spcPct val="200000"/>
+              </a:lnSpc>
+            </a:pPr>
+            <a:r>
+              <a:rPr lang="en-US" sz="4000" cap="all" dirty="0">
+                <a:solidFill>
+                  <a:srgbClr val="953E16"/>
+                </a:solidFill>
+                <a:latin typeface="Century Gothic" panose="020B0502020202020204" pitchFamily="34" charset="0"/>
+              </a:rPr>
+              <a:t>Stemming</a:t>
+            </a:r>
+          </a:p>
+          <a:p>
+            <a:pPr>
+              <a:lnSpc>
+                <a:spcPct val="200000"/>
+              </a:lnSpc>
+            </a:pPr>
+            <a:endParaRPr lang="en-US" sz="2400" cap="all" dirty="0"/>
+          </a:p>
+          <a:p>
+            <a:pPr>
+              <a:lnSpc>
+                <a:spcPct val="200000"/>
+              </a:lnSpc>
+            </a:pPr>
+            <a:r>
+              <a:rPr lang="en-US" sz="2400" cap="all" dirty="0"/>
+              <a:t>lend</a:t>
+            </a:r>
+          </a:p>
+          <a:p>
+            <a:pPr>
+              <a:lnSpc>
+                <a:spcPct val="200000"/>
+              </a:lnSpc>
+            </a:pPr>
+            <a:r>
+              <a:rPr lang="en-US" sz="2400" cap="all" dirty="0"/>
+              <a:t>lend</a:t>
+            </a:r>
+            <a:r>
+              <a:rPr lang="en-US" sz="2400" strike="sngStrike" dirty="0"/>
+              <a:t>ing</a:t>
+            </a:r>
+          </a:p>
+        </p:txBody>
+      </p:sp>
+      <p:sp>
+        <p:nvSpPr>
+          <p:cNvPr id="5" name="Rectangle 4"/>
+          <p:cNvSpPr/>
+          <p:nvPr/>
+        </p:nvSpPr>
+        <p:spPr>
+          <a:xfrm>
+            <a:off x="6509656" y="2573007"/>
+            <a:ext cx="6096000" cy="1569660"/>
+          </a:xfrm>
+          <a:prstGeom prst="rect">
+            <a:avLst/>
+          </a:prstGeom>
+        </p:spPr>
+        <p:txBody>
+          <a:bodyPr>
+            <a:spAutoFit/>
+          </a:bodyPr>
+          <a:lstStyle/>
+          <a:p>
+            <a:pPr lvl="0">
+              <a:lnSpc>
+                <a:spcPct val="200000"/>
+              </a:lnSpc>
+            </a:pPr>
+            <a:r>
+              <a:rPr lang="en-US" sz="2400" cap="all" dirty="0">
+                <a:solidFill>
+                  <a:prstClr val="black"/>
+                </a:solidFill>
+              </a:rPr>
+              <a:t>relate</a:t>
+            </a:r>
+          </a:p>
+          <a:p>
+            <a:pPr lvl="0">
+              <a:lnSpc>
+                <a:spcPct val="200000"/>
+              </a:lnSpc>
+            </a:pPr>
+            <a:r>
+              <a:rPr lang="en-US" sz="2400" cap="all" dirty="0">
+                <a:solidFill>
+                  <a:prstClr val="black"/>
+                </a:solidFill>
+              </a:rPr>
+              <a:t>relate</a:t>
+            </a:r>
+            <a:r>
+              <a:rPr lang="en-US" sz="2400" strike="sngStrike" dirty="0">
+                <a:solidFill>
+                  <a:prstClr val="black"/>
+                </a:solidFill>
+              </a:rPr>
+              <a:t>d</a:t>
+            </a:r>
+          </a:p>
+        </p:txBody>
+      </p:sp>
+      <p:sp>
+        <p:nvSpPr>
+          <p:cNvPr id="4" name="TextBox 3">
+            <a:extLst>
+              <a:ext uri="{FF2B5EF4-FFF2-40B4-BE49-F238E27FC236}">
+                <a16:creationId xmlns:a16="http://schemas.microsoft.com/office/drawing/2014/main" id="{6E516A41-8303-F7B3-0400-1123871A03F8}"/>
+              </a:ext>
+            </a:extLst>
+          </p:cNvPr>
+          <p:cNvSpPr txBox="1"/>
+          <p:nvPr/>
+        </p:nvSpPr>
+        <p:spPr>
+          <a:xfrm>
+            <a:off x="2695978" y="5250094"/>
+            <a:ext cx="7137210" cy="369332"/>
+          </a:xfrm>
+          <a:prstGeom prst="rect">
+            <a:avLst/>
+          </a:prstGeom>
+          <a:noFill/>
+        </p:spPr>
+        <p:txBody>
+          <a:bodyPr wrap="none" rtlCol="0">
+            <a:spAutoFit/>
+          </a:bodyPr>
+          <a:lstStyle/>
+          <a:p>
+            <a:r>
+              <a:rPr lang="en-US" dirty="0"/>
+              <a:t>Convert all words to their respective </a:t>
+            </a:r>
+            <a:r>
+              <a:rPr lang="en-US" b="1" dirty="0">
+                <a:latin typeface="Aharoni" panose="02010803020104030203" pitchFamily="2" charset="-79"/>
+                <a:cs typeface="Aharoni" panose="02010803020104030203" pitchFamily="2" charset="-79"/>
+              </a:rPr>
+              <a:t>word roots </a:t>
+            </a:r>
+            <a:r>
+              <a:rPr lang="en-US" dirty="0"/>
+              <a:t>to standardize the data.</a:t>
+            </a:r>
+          </a:p>
+        </p:txBody>
+      </p:sp>
+    </p:spTree>
+    <p:extLst>
+      <p:ext uri="{BB962C8B-B14F-4D97-AF65-F5344CB8AC3E}">
+        <p14:creationId xmlns:p14="http://schemas.microsoft.com/office/powerpoint/2010/main" val="1678773642"/>
       </p:ext>
     </p:extLst>
   </p:cSld>
@@ -35402,9 +35414,773 @@
           <a:bodyPr/>
           <a:lstStyle/>
           <a:p>
+            <a:pPr marL="0" marR="0" lvl="0" indent="0" algn="r" defTabSz="914400" rtl="0" eaLnBrk="1" fontAlgn="auto" latinLnBrk="0" hangingPunct="1">
+              <a:lnSpc>
+                <a:spcPct val="100000"/>
+              </a:lnSpc>
+              <a:spcBef>
+                <a:spcPts val="0"/>
+              </a:spcBef>
+              <a:spcAft>
+                <a:spcPts val="0"/>
+              </a:spcAft>
+              <a:buClrTx/>
+              <a:buSzTx/>
+              <a:buFontTx/>
+              <a:buNone/>
+              <a:tabLst/>
+              <a:defRPr/>
+            </a:pPr>
+            <a:fld id="{0FDD4DA2-4FBE-4694-B57B-F9990517B432}" type="slidenum">
+              <a:rPr kumimoji="0" lang="en-US" sz="1200" b="0" i="0" u="none" strike="noStrike" kern="1200" cap="none" spc="0" normalizeH="0" baseline="0" noProof="0" smtClean="0">
+                <a:ln>
+                  <a:noFill/>
+                </a:ln>
+                <a:solidFill>
+                  <a:prstClr val="black">
+                    <a:tint val="75000"/>
+                  </a:prstClr>
+                </a:solidFill>
+                <a:effectLst/>
+                <a:uLnTx/>
+                <a:uFillTx/>
+                <a:latin typeface="Calibri" panose="020F0502020204030204"/>
+                <a:ea typeface="+mn-ea"/>
+                <a:cs typeface="+mn-cs"/>
+              </a:rPr>
+              <a:pPr marL="0" marR="0" lvl="0" indent="0" algn="r" defTabSz="914400" rtl="0" eaLnBrk="1" fontAlgn="auto" latinLnBrk="0" hangingPunct="1">
+                <a:lnSpc>
+                  <a:spcPct val="100000"/>
+                </a:lnSpc>
+                <a:spcBef>
+                  <a:spcPts val="0"/>
+                </a:spcBef>
+                <a:spcAft>
+                  <a:spcPts val="0"/>
+                </a:spcAft>
+                <a:buClrTx/>
+                <a:buSzTx/>
+                <a:buFontTx/>
+                <a:buNone/>
+                <a:tabLst/>
+                <a:defRPr/>
+              </a:pPr>
+              <a:t>8</a:t>
+            </a:fld>
+            <a:endParaRPr kumimoji="0" lang="en-US" sz="1200" b="0" i="0" u="none" strike="noStrike" kern="1200" cap="none" spc="0" normalizeH="0" baseline="0" noProof="0">
+              <a:ln>
+                <a:noFill/>
+              </a:ln>
+              <a:solidFill>
+                <a:prstClr val="black">
+                  <a:tint val="75000"/>
+                </a:prstClr>
+              </a:solidFill>
+              <a:effectLst/>
+              <a:uLnTx/>
+              <a:uFillTx/>
+              <a:latin typeface="Calibri" panose="020F0502020204030204"/>
+              <a:ea typeface="+mn-ea"/>
+              <a:cs typeface="+mn-cs"/>
+            </a:endParaRPr>
+          </a:p>
+        </p:txBody>
+      </p:sp>
+      <p:sp>
+        <p:nvSpPr>
+          <p:cNvPr id="3" name="Rectangle 2"/>
+          <p:cNvSpPr/>
+          <p:nvPr/>
+        </p:nvSpPr>
+        <p:spPr>
+          <a:xfrm>
+            <a:off x="877078" y="340483"/>
+            <a:ext cx="10243457" cy="3682226"/>
+          </a:xfrm>
+          <a:prstGeom prst="rect">
+            <a:avLst/>
+          </a:prstGeom>
+        </p:spPr>
+        <p:txBody>
+          <a:bodyPr wrap="square">
+            <a:spAutoFit/>
+          </a:bodyPr>
+          <a:lstStyle/>
+          <a:p>
+            <a:pPr marL="0" marR="0" lvl="0" indent="0" algn="l" defTabSz="914400" rtl="0" eaLnBrk="1" fontAlgn="auto" latinLnBrk="0" hangingPunct="1">
+              <a:lnSpc>
+                <a:spcPct val="200000"/>
+              </a:lnSpc>
+              <a:spcBef>
+                <a:spcPts val="0"/>
+              </a:spcBef>
+              <a:spcAft>
+                <a:spcPts val="0"/>
+              </a:spcAft>
+              <a:buClrTx/>
+              <a:buSzTx/>
+              <a:buFontTx/>
+              <a:buNone/>
+              <a:tabLst/>
+              <a:defRPr/>
+            </a:pPr>
+            <a:r>
+              <a:rPr kumimoji="0" lang="en-US" sz="2400" b="0" i="0" u="none" strike="sngStrike" kern="1200" cap="none" spc="0" normalizeH="0" baseline="0" noProof="0" dirty="0">
+                <a:ln>
+                  <a:noFill/>
+                </a:ln>
+                <a:solidFill>
+                  <a:prstClr val="black"/>
+                </a:solidFill>
+                <a:effectLst/>
+                <a:uLnTx/>
+                <a:uFillTx/>
+                <a:latin typeface="Calibri" panose="020F0502020204030204"/>
+                <a:ea typeface="+mn-ea"/>
+                <a:cs typeface="+mn-cs"/>
+              </a:rPr>
+              <a:t>the</a:t>
+            </a:r>
+            <a:r>
+              <a:rPr kumimoji="0" lang="en-US" sz="2400" b="0" i="0" u="none" strike="noStrike" kern="1200" cap="none" spc="0" normalizeH="0" baseline="0" noProof="0" dirty="0">
+                <a:ln>
+                  <a:noFill/>
+                </a:ln>
+                <a:solidFill>
+                  <a:prstClr val="black"/>
+                </a:solidFill>
+                <a:effectLst/>
+                <a:uLnTx/>
+                <a:uFillTx/>
+                <a:latin typeface="Calibri" panose="020F0502020204030204"/>
+                <a:ea typeface="+mn-ea"/>
+                <a:cs typeface="+mn-cs"/>
+              </a:rPr>
+              <a:t> corporation specific purpose </a:t>
+            </a:r>
+            <a:r>
+              <a:rPr kumimoji="0" lang="en-US" sz="2400" b="0" i="0" u="none" strike="sngStrike" kern="1200" cap="none" spc="0" normalizeH="0" baseline="0" noProof="0" dirty="0">
+                <a:ln>
+                  <a:noFill/>
+                </a:ln>
+                <a:solidFill>
+                  <a:prstClr val="black"/>
+                </a:solidFill>
+                <a:effectLst/>
+                <a:uLnTx/>
+                <a:uFillTx/>
+                <a:latin typeface="Calibri" panose="020F0502020204030204"/>
+                <a:ea typeface="+mn-ea"/>
+                <a:cs typeface="+mn-cs"/>
+              </a:rPr>
+              <a:t>is to </a:t>
+            </a:r>
+            <a:r>
+              <a:rPr kumimoji="0" lang="en-US" sz="2400" b="0" i="0" u="none" strike="noStrike" kern="1200" cap="none" spc="0" normalizeH="0" baseline="0" noProof="0" dirty="0">
+                <a:ln>
+                  <a:noFill/>
+                </a:ln>
+                <a:solidFill>
+                  <a:prstClr val="black"/>
+                </a:solidFill>
+                <a:effectLst/>
+                <a:uLnTx/>
+                <a:uFillTx/>
+                <a:latin typeface="Calibri" panose="020F0502020204030204"/>
+                <a:ea typeface="+mn-ea"/>
+                <a:cs typeface="+mn-cs"/>
+              </a:rPr>
+              <a:t>support </a:t>
+            </a:r>
+            <a:r>
+              <a:rPr kumimoji="0" lang="en-US" sz="2400" b="0" i="0" u="none" strike="noStrike" kern="1200" cap="all" spc="0" normalizeH="0" baseline="0" noProof="0" dirty="0" err="1">
+                <a:ln>
+                  <a:noFill/>
+                </a:ln>
+                <a:solidFill>
+                  <a:srgbClr val="953E16"/>
+                </a:solidFill>
+                <a:effectLst/>
+                <a:uLnTx/>
+                <a:uFillTx/>
+                <a:latin typeface="Calibri" panose="020F0502020204030204"/>
+                <a:ea typeface="+mn-ea"/>
+                <a:cs typeface="+mn-cs"/>
+              </a:rPr>
+              <a:t>affordable_housing</a:t>
+            </a:r>
+            <a:r>
+              <a:rPr kumimoji="0" lang="en-US" sz="2400" b="0" i="0" u="none" strike="noStrike" kern="1200" cap="none" spc="0" normalizeH="0" baseline="0" noProof="0" dirty="0">
+                <a:ln>
+                  <a:noFill/>
+                </a:ln>
+                <a:solidFill>
+                  <a:prstClr val="black"/>
+                </a:solidFill>
+                <a:effectLst/>
+                <a:uLnTx/>
+                <a:uFillTx/>
+                <a:latin typeface="Calibri" panose="020F0502020204030204"/>
+                <a:ea typeface="+mn-ea"/>
+                <a:cs typeface="+mn-cs"/>
+              </a:rPr>
+              <a:t>, community development </a:t>
+            </a:r>
+            <a:r>
+              <a:rPr kumimoji="0" lang="en-US" sz="2400" b="0" i="0" u="none" strike="sngStrike" kern="1200" cap="none" spc="0" normalizeH="0" baseline="0" noProof="0" dirty="0">
+                <a:ln>
+                  <a:noFill/>
+                </a:ln>
+                <a:solidFill>
+                  <a:prstClr val="black"/>
+                </a:solidFill>
+                <a:effectLst/>
+                <a:uLnTx/>
+                <a:uFillTx/>
+                <a:latin typeface="Calibri" panose="020F0502020204030204"/>
+                <a:ea typeface="+mn-ea"/>
+                <a:cs typeface="+mn-cs"/>
+              </a:rPr>
+              <a:t>and</a:t>
+            </a:r>
+            <a:r>
+              <a:rPr kumimoji="0" lang="en-US" sz="2400" b="0" i="0" u="none" strike="noStrike" kern="1200" cap="none" spc="0" normalizeH="0" baseline="0" noProof="0" dirty="0">
+                <a:ln>
+                  <a:noFill/>
+                </a:ln>
+                <a:solidFill>
+                  <a:prstClr val="black"/>
+                </a:solidFill>
+                <a:effectLst/>
+                <a:uLnTx/>
+                <a:uFillTx/>
+                <a:latin typeface="Calibri" panose="020F0502020204030204"/>
+                <a:ea typeface="+mn-ea"/>
+                <a:cs typeface="+mn-cs"/>
+              </a:rPr>
+              <a:t> </a:t>
+            </a:r>
+            <a:r>
+              <a:rPr kumimoji="0" lang="en-US" sz="2400" b="0" i="0" u="none" strike="noStrike" kern="1200" cap="all" spc="0" normalizeH="0" baseline="0" noProof="0" dirty="0" err="1">
+                <a:ln>
+                  <a:noFill/>
+                </a:ln>
+                <a:solidFill>
+                  <a:srgbClr val="953E16"/>
+                </a:solidFill>
+                <a:effectLst/>
+                <a:uLnTx/>
+                <a:uFillTx/>
+                <a:latin typeface="Calibri" panose="020F0502020204030204"/>
+                <a:ea typeface="+mn-ea"/>
+                <a:cs typeface="+mn-cs"/>
+              </a:rPr>
+              <a:t>economic_development</a:t>
+            </a:r>
+            <a:r>
+              <a:rPr kumimoji="0" lang="en-US" sz="2400" b="0" i="0" u="none" strike="noStrike" kern="1200" cap="all" spc="0" normalizeH="0" baseline="0" noProof="0" dirty="0">
+                <a:ln>
+                  <a:noFill/>
+                </a:ln>
+                <a:solidFill>
+                  <a:srgbClr val="953E16"/>
+                </a:solidFill>
+                <a:effectLst/>
+                <a:uLnTx/>
+                <a:uFillTx/>
+                <a:latin typeface="Calibri" panose="020F0502020204030204"/>
+                <a:ea typeface="+mn-ea"/>
+                <a:cs typeface="+mn-cs"/>
+              </a:rPr>
+              <a:t> </a:t>
+            </a:r>
+            <a:r>
+              <a:rPr kumimoji="0" lang="en-US" sz="2400" b="0" i="0" u="none" strike="sngStrike" kern="1200" cap="none" spc="0" normalizeH="0" baseline="0" noProof="0" dirty="0">
+                <a:ln>
+                  <a:noFill/>
+                </a:ln>
+                <a:solidFill>
+                  <a:prstClr val="black"/>
+                </a:solidFill>
+                <a:effectLst/>
+                <a:uLnTx/>
+                <a:uFillTx/>
+                <a:latin typeface="Calibri" panose="020F0502020204030204"/>
+                <a:ea typeface="+mn-ea"/>
+                <a:cs typeface="+mn-cs"/>
+              </a:rPr>
+              <a:t>of the </a:t>
+            </a:r>
+            <a:r>
+              <a:rPr kumimoji="0" lang="en-US" sz="2400" b="0" i="0" u="none" strike="noStrike" kern="1200" cap="none" spc="0" normalizeH="0" baseline="0" noProof="0" dirty="0">
+                <a:ln>
+                  <a:noFill/>
+                </a:ln>
+                <a:solidFill>
+                  <a:prstClr val="black"/>
+                </a:solidFill>
+                <a:effectLst/>
+                <a:uLnTx/>
+                <a:uFillTx/>
+                <a:latin typeface="Calibri" panose="020F0502020204030204"/>
+                <a:ea typeface="+mn-ea"/>
+                <a:cs typeface="+mn-cs"/>
+              </a:rPr>
+              <a:t>city and county of </a:t>
+            </a:r>
+            <a:r>
+              <a:rPr kumimoji="0" lang="en-US" sz="2400" b="0" i="0" u="none" strike="noStrike" kern="1200" cap="all" spc="0" normalizeH="0" baseline="0" noProof="0" dirty="0" err="1">
+                <a:ln>
+                  <a:noFill/>
+                </a:ln>
+                <a:solidFill>
+                  <a:srgbClr val="953E16"/>
+                </a:solidFill>
+                <a:effectLst/>
+                <a:uLnTx/>
+                <a:uFillTx/>
+                <a:latin typeface="Calibri" panose="020F0502020204030204"/>
+                <a:ea typeface="+mn-ea"/>
+                <a:cs typeface="+mn-cs"/>
+              </a:rPr>
+              <a:t>san_francisco</a:t>
+            </a:r>
+            <a:r>
+              <a:rPr kumimoji="0" lang="en-US" sz="2400" b="0" i="0" u="none" strike="noStrike" kern="1200" cap="none" spc="0" normalizeH="0" baseline="0" noProof="0" dirty="0">
+                <a:ln>
+                  <a:noFill/>
+                </a:ln>
+                <a:solidFill>
+                  <a:prstClr val="black"/>
+                </a:solidFill>
+                <a:effectLst/>
+                <a:uLnTx/>
+                <a:uFillTx/>
+                <a:latin typeface="Calibri" panose="020F0502020204030204"/>
+                <a:ea typeface="+mn-ea"/>
+                <a:cs typeface="+mn-cs"/>
+              </a:rPr>
+              <a:t> economically disadvantaged individuals and communities by lending </a:t>
+            </a:r>
+            <a:r>
+              <a:rPr kumimoji="0" lang="en-US" sz="2400" b="0" i="0" u="none" strike="sngStrike" kern="1200" cap="none" spc="0" normalizeH="0" baseline="0" noProof="0" dirty="0">
+                <a:ln>
+                  <a:noFill/>
+                </a:ln>
+                <a:solidFill>
+                  <a:prstClr val="black"/>
+                </a:solidFill>
+                <a:effectLst/>
+                <a:uLnTx/>
+                <a:uFillTx/>
+                <a:latin typeface="Calibri" panose="020F0502020204030204"/>
+                <a:ea typeface="+mn-ea"/>
+                <a:cs typeface="+mn-cs"/>
+              </a:rPr>
+              <a:t>to</a:t>
+            </a:r>
+            <a:r>
+              <a:rPr kumimoji="0" lang="en-US" sz="2400" b="0" i="0" u="none" strike="noStrike" kern="1200" cap="none" spc="0" normalizeH="0" baseline="0" noProof="0" dirty="0">
+                <a:ln>
+                  <a:noFill/>
+                </a:ln>
+                <a:solidFill>
+                  <a:prstClr val="black"/>
+                </a:solidFill>
+                <a:effectLst/>
+                <a:uLnTx/>
+                <a:uFillTx/>
+                <a:latin typeface="Calibri" panose="020F0502020204030204"/>
+                <a:ea typeface="+mn-ea"/>
+                <a:cs typeface="+mn-cs"/>
+              </a:rPr>
+              <a:t> investing </a:t>
+            </a:r>
+            <a:r>
+              <a:rPr kumimoji="0" lang="en-US" sz="2400" b="0" i="0" u="none" strike="sngStrike" kern="1200" cap="none" spc="0" normalizeH="0" baseline="0" noProof="0" dirty="0">
+                <a:ln>
+                  <a:noFill/>
+                </a:ln>
+                <a:solidFill>
+                  <a:prstClr val="black"/>
+                </a:solidFill>
+                <a:effectLst/>
+                <a:uLnTx/>
+                <a:uFillTx/>
+                <a:latin typeface="Calibri" panose="020F0502020204030204"/>
+                <a:ea typeface="+mn-ea"/>
+                <a:cs typeface="+mn-cs"/>
+              </a:rPr>
+              <a:t>in and </a:t>
+            </a:r>
+            <a:r>
+              <a:rPr kumimoji="0" lang="en-US" sz="2400" b="0" i="0" u="none" strike="noStrike" kern="1200" cap="none" spc="0" normalizeH="0" baseline="0" noProof="0" dirty="0">
+                <a:ln>
+                  <a:noFill/>
+                </a:ln>
+                <a:solidFill>
+                  <a:prstClr val="black"/>
+                </a:solidFill>
+                <a:effectLst/>
+                <a:uLnTx/>
+                <a:uFillTx/>
+                <a:latin typeface="Calibri" panose="020F0502020204030204"/>
+                <a:ea typeface="+mn-ea"/>
+                <a:cs typeface="+mn-cs"/>
+              </a:rPr>
+              <a:t>directly acquiring </a:t>
+            </a:r>
+            <a:r>
+              <a:rPr kumimoji="0" lang="en-US" sz="2400" b="0" i="0" u="none" strike="sngStrike" kern="1200" cap="none" spc="0" normalizeH="0" baseline="0" noProof="0" dirty="0">
+                <a:ln>
+                  <a:noFill/>
+                </a:ln>
+                <a:solidFill>
+                  <a:prstClr val="black"/>
+                </a:solidFill>
+                <a:effectLst/>
+                <a:uLnTx/>
+                <a:uFillTx/>
+                <a:latin typeface="Calibri" panose="020F0502020204030204"/>
+                <a:ea typeface="+mn-ea"/>
+                <a:cs typeface="+mn-cs"/>
+              </a:rPr>
+              <a:t>such </a:t>
+            </a:r>
+            <a:r>
+              <a:rPr kumimoji="0" lang="en-US" sz="2400" b="0" i="0" u="none" strike="noStrike" kern="1200" cap="all" spc="0" normalizeH="0" baseline="0" noProof="0" dirty="0" err="1">
+                <a:ln>
+                  <a:noFill/>
+                </a:ln>
+                <a:solidFill>
+                  <a:srgbClr val="953E16"/>
+                </a:solidFill>
+                <a:effectLst/>
+                <a:uLnTx/>
+                <a:uFillTx/>
+                <a:latin typeface="Calibri" panose="020F0502020204030204"/>
+                <a:ea typeface="+mn-ea"/>
+                <a:cs typeface="+mn-cs"/>
+              </a:rPr>
+              <a:t>affordable_housing</a:t>
+            </a:r>
+            <a:r>
+              <a:rPr kumimoji="0" lang="en-US" sz="2400" b="0" i="0" u="none" strike="noStrike" kern="1200" cap="all" spc="0" normalizeH="0" baseline="0" noProof="0" dirty="0">
+                <a:ln>
+                  <a:noFill/>
+                </a:ln>
+                <a:solidFill>
+                  <a:srgbClr val="953E16"/>
+                </a:solidFill>
+                <a:effectLst/>
+                <a:uLnTx/>
+                <a:uFillTx/>
+                <a:latin typeface="Calibri" panose="020F0502020204030204"/>
+                <a:ea typeface="+mn-ea"/>
+                <a:cs typeface="+mn-cs"/>
+              </a:rPr>
+              <a:t> </a:t>
+            </a:r>
+            <a:r>
+              <a:rPr kumimoji="0" lang="en-US" sz="2400" b="0" i="0" u="none" strike="sngStrike" kern="1200" cap="none" spc="0" normalizeH="0" baseline="0" noProof="0" dirty="0">
+                <a:ln>
+                  <a:noFill/>
+                </a:ln>
+                <a:solidFill>
+                  <a:prstClr val="black"/>
+                </a:solidFill>
+                <a:effectLst/>
+                <a:uLnTx/>
+                <a:uFillTx/>
+                <a:latin typeface="Calibri" panose="020F0502020204030204"/>
+                <a:ea typeface="+mn-ea"/>
+                <a:cs typeface="+mn-cs"/>
+              </a:rPr>
+              <a:t>and</a:t>
+            </a:r>
+            <a:r>
+              <a:rPr kumimoji="0" lang="en-US" sz="2400" b="0" i="0" u="none" strike="noStrike" kern="1200" cap="none" spc="0" normalizeH="0" baseline="0" noProof="0" dirty="0">
+                <a:ln>
+                  <a:noFill/>
+                </a:ln>
+                <a:solidFill>
+                  <a:prstClr val="black"/>
+                </a:solidFill>
+                <a:effectLst/>
+                <a:uLnTx/>
+                <a:uFillTx/>
+                <a:latin typeface="Calibri" panose="020F0502020204030204"/>
+                <a:ea typeface="+mn-ea"/>
+                <a:cs typeface="+mn-cs"/>
+              </a:rPr>
+              <a:t> related community development </a:t>
+            </a:r>
+            <a:r>
+              <a:rPr kumimoji="0" lang="en-US" sz="2400" b="0" i="0" u="none" strike="noStrike" kern="1200" cap="all" spc="0" normalizeH="0" baseline="0" noProof="0" dirty="0" err="1">
+                <a:ln>
+                  <a:noFill/>
+                </a:ln>
+                <a:solidFill>
+                  <a:srgbClr val="953E16"/>
+                </a:solidFill>
+                <a:effectLst/>
+                <a:uLnTx/>
+                <a:uFillTx/>
+                <a:latin typeface="Calibri" panose="020F0502020204030204"/>
+                <a:ea typeface="+mn-ea"/>
+                <a:cs typeface="+mn-cs"/>
+              </a:rPr>
+              <a:t>real_estate</a:t>
+            </a:r>
+            <a:r>
+              <a:rPr kumimoji="0" lang="en-US" sz="2400" b="0" i="0" u="none" strike="noStrike" kern="1200" cap="all" spc="0" normalizeH="0" baseline="0" noProof="0" dirty="0">
+                <a:ln>
+                  <a:noFill/>
+                </a:ln>
+                <a:solidFill>
+                  <a:srgbClr val="953E16"/>
+                </a:solidFill>
+                <a:effectLst/>
+                <a:uLnTx/>
+                <a:uFillTx/>
+                <a:latin typeface="Calibri" panose="020F0502020204030204"/>
+                <a:ea typeface="+mn-ea"/>
+                <a:cs typeface="+mn-cs"/>
+              </a:rPr>
+              <a:t> </a:t>
+            </a:r>
+            <a:r>
+              <a:rPr kumimoji="0" lang="en-US" sz="2400" b="0" i="0" u="none" strike="noStrike" kern="1200" cap="none" spc="0" normalizeH="0" baseline="0" noProof="0" dirty="0">
+                <a:ln>
+                  <a:noFill/>
+                </a:ln>
+                <a:solidFill>
+                  <a:prstClr val="black"/>
+                </a:solidFill>
+                <a:effectLst/>
+                <a:uLnTx/>
+                <a:uFillTx/>
+                <a:latin typeface="Calibri" panose="020F0502020204030204"/>
+                <a:ea typeface="+mn-ea"/>
+                <a:cs typeface="+mn-cs"/>
+              </a:rPr>
+              <a:t>assets</a:t>
+            </a:r>
+          </a:p>
+        </p:txBody>
+      </p:sp>
+      <p:sp>
+        <p:nvSpPr>
+          <p:cNvPr id="4" name="Rectangle 3"/>
+          <p:cNvSpPr/>
+          <p:nvPr/>
+        </p:nvSpPr>
+        <p:spPr>
+          <a:xfrm>
+            <a:off x="877077" y="4659282"/>
+            <a:ext cx="10243457" cy="1697068"/>
+          </a:xfrm>
+          <a:prstGeom prst="rect">
+            <a:avLst/>
+          </a:prstGeom>
+        </p:spPr>
+        <p:txBody>
+          <a:bodyPr wrap="square">
+            <a:spAutoFit/>
+          </a:bodyPr>
+          <a:lstStyle/>
+          <a:p>
+            <a:pPr marL="457200" marR="0" lvl="0" indent="-457200" algn="l" defTabSz="914400" rtl="0" eaLnBrk="1" fontAlgn="auto" latinLnBrk="0" hangingPunct="1">
+              <a:lnSpc>
+                <a:spcPct val="150000"/>
+              </a:lnSpc>
+              <a:spcBef>
+                <a:spcPts val="0"/>
+              </a:spcBef>
+              <a:spcAft>
+                <a:spcPts val="0"/>
+              </a:spcAft>
+              <a:buClrTx/>
+              <a:buSzTx/>
+              <a:buFont typeface="+mj-lt"/>
+              <a:buAutoNum type="arabicPeriod"/>
+              <a:tabLst/>
+              <a:defRPr/>
+            </a:pPr>
+            <a:r>
+              <a:rPr kumimoji="0" lang="en-US" sz="2400" b="0" i="0" u="none" strike="noStrike" kern="1200" cap="none" spc="0" normalizeH="0" baseline="0" noProof="0" dirty="0">
+                <a:ln>
+                  <a:noFill/>
+                </a:ln>
+                <a:solidFill>
+                  <a:srgbClr val="953E16"/>
+                </a:solidFill>
+                <a:effectLst/>
+                <a:uLnTx/>
+                <a:uFillTx/>
+                <a:latin typeface="Calibri" panose="020F0502020204030204"/>
+                <a:ea typeface="+mn-ea"/>
+                <a:cs typeface="+mn-cs"/>
+              </a:rPr>
+              <a:t>Remove punctuation</a:t>
+            </a:r>
+          </a:p>
+          <a:p>
+            <a:pPr marL="457200" marR="0" lvl="0" indent="-457200" algn="l" defTabSz="914400" rtl="0" eaLnBrk="1" fontAlgn="auto" latinLnBrk="0" hangingPunct="1">
+              <a:lnSpc>
+                <a:spcPct val="150000"/>
+              </a:lnSpc>
+              <a:spcBef>
+                <a:spcPts val="0"/>
+              </a:spcBef>
+              <a:spcAft>
+                <a:spcPts val="0"/>
+              </a:spcAft>
+              <a:buClrTx/>
+              <a:buSzTx/>
+              <a:buFont typeface="+mj-lt"/>
+              <a:buAutoNum type="arabicPeriod"/>
+              <a:tabLst/>
+              <a:defRPr/>
+            </a:pPr>
+            <a:r>
+              <a:rPr kumimoji="0" lang="en-US" sz="2400" b="0" i="0" u="none" strike="noStrike" kern="1200" cap="none" spc="0" normalizeH="0" baseline="0" noProof="0" dirty="0">
+                <a:ln>
+                  <a:noFill/>
+                </a:ln>
+                <a:solidFill>
+                  <a:srgbClr val="953E16"/>
+                </a:solidFill>
+                <a:effectLst/>
+                <a:uLnTx/>
+                <a:uFillTx/>
+                <a:latin typeface="Calibri" panose="020F0502020204030204"/>
+                <a:ea typeface="+mn-ea"/>
+                <a:cs typeface="+mn-cs"/>
+              </a:rPr>
+              <a:t>Delete words with little information value (“stop words” in </a:t>
+            </a:r>
+            <a:r>
+              <a:rPr kumimoji="0" lang="en-US" sz="2400" b="0" i="0" u="none" strike="noStrike" kern="1200" cap="none" spc="0" normalizeH="0" baseline="0" noProof="0" dirty="0" err="1">
+                <a:ln>
+                  <a:noFill/>
+                </a:ln>
+                <a:solidFill>
+                  <a:srgbClr val="953E16"/>
+                </a:solidFill>
+                <a:effectLst/>
+                <a:uLnTx/>
+                <a:uFillTx/>
+                <a:latin typeface="Calibri" panose="020F0502020204030204"/>
+                <a:ea typeface="+mn-ea"/>
+                <a:cs typeface="+mn-cs"/>
+              </a:rPr>
+              <a:t>quanteda</a:t>
+            </a:r>
+            <a:r>
+              <a:rPr kumimoji="0" lang="en-US" sz="2400" b="0" i="0" u="none" strike="noStrike" kern="1200" cap="none" spc="0" normalizeH="0" baseline="0" noProof="0" dirty="0">
+                <a:ln>
+                  <a:noFill/>
+                </a:ln>
+                <a:solidFill>
+                  <a:srgbClr val="953E16"/>
+                </a:solidFill>
+                <a:effectLst/>
+                <a:uLnTx/>
+                <a:uFillTx/>
+                <a:latin typeface="Calibri" panose="020F0502020204030204"/>
+                <a:ea typeface="+mn-ea"/>
+                <a:cs typeface="+mn-cs"/>
+              </a:rPr>
+              <a:t>)</a:t>
+            </a:r>
+          </a:p>
+          <a:p>
+            <a:pPr marL="457200" marR="0" lvl="0" indent="-457200" algn="l" defTabSz="914400" rtl="0" eaLnBrk="1" fontAlgn="auto" latinLnBrk="0" hangingPunct="1">
+              <a:lnSpc>
+                <a:spcPct val="150000"/>
+              </a:lnSpc>
+              <a:spcBef>
+                <a:spcPts val="0"/>
+              </a:spcBef>
+              <a:spcAft>
+                <a:spcPts val="0"/>
+              </a:spcAft>
+              <a:buClrTx/>
+              <a:buSzTx/>
+              <a:buFont typeface="+mj-lt"/>
+              <a:buAutoNum type="arabicPeriod"/>
+              <a:tabLst/>
+              <a:defRPr/>
+            </a:pPr>
+            <a:r>
+              <a:rPr kumimoji="0" lang="en-US" sz="2400" b="0" i="0" u="none" strike="noStrike" kern="1200" cap="none" spc="0" normalizeH="0" baseline="0" noProof="0" dirty="0">
+                <a:ln>
+                  <a:noFill/>
+                </a:ln>
+                <a:solidFill>
+                  <a:srgbClr val="953E16"/>
+                </a:solidFill>
+                <a:effectLst/>
+                <a:uLnTx/>
+                <a:uFillTx/>
+                <a:latin typeface="Calibri" panose="020F0502020204030204"/>
+                <a:ea typeface="+mn-ea"/>
+                <a:cs typeface="+mn-cs"/>
+              </a:rPr>
+              <a:t>Identify compound constructs (apply “dictionary”)</a:t>
+            </a:r>
+          </a:p>
+        </p:txBody>
+      </p:sp>
+    </p:spTree>
+    <p:extLst>
+      <p:ext uri="{BB962C8B-B14F-4D97-AF65-F5344CB8AC3E}">
+        <p14:creationId xmlns:p14="http://schemas.microsoft.com/office/powerpoint/2010/main" val="2223992991"/>
+      </p:ext>
+    </p:extLst>
+  </p:cSld>
+  <p:clrMapOvr>
+    <a:masterClrMapping/>
+  </p:clrMapOvr>
+</p:sld>
+</file>
+
+<file path=ppt/slides/slide9.xml><?xml version="1.0" encoding="utf-8"?>
+<p:sld xmlns:a="http://schemas.openxmlformats.org/drawingml/2006/main" xmlns:r="http://schemas.openxmlformats.org/officeDocument/2006/relationships" xmlns:p="http://schemas.openxmlformats.org/presentationml/2006/main">
+  <p:cSld>
+    <p:spTree>
+      <p:nvGrpSpPr>
+        <p:cNvPr id="1" name=""/>
+        <p:cNvGrpSpPr/>
+        <p:nvPr/>
+      </p:nvGrpSpPr>
+      <p:grpSpPr>
+        <a:xfrm>
+          <a:off x="0" y="0"/>
+          <a:ext cx="0" cy="0"/>
+          <a:chOff x="0" y="0"/>
+          <a:chExt cx="0" cy="0"/>
+        </a:xfrm>
+      </p:grpSpPr>
+      <p:sp>
+        <p:nvSpPr>
+          <p:cNvPr id="2" name="Slide Number Placeholder 1"/>
+          <p:cNvSpPr>
+            <a:spLocks noGrp="1"/>
+          </p:cNvSpPr>
+          <p:nvPr>
+            <p:ph type="sldNum" sz="quarter" idx="12"/>
+          </p:nvPr>
+        </p:nvSpPr>
+        <p:spPr/>
+        <p:txBody>
+          <a:bodyPr/>
+          <a:lstStyle/>
+          <a:p>
             <a:fld id="{0FDD4DA2-4FBE-4694-B57B-F9990517B432}" type="slidenum">
               <a:rPr lang="en-US" smtClean="0"/>
-              <a:t>8</a:t>
+              <a:t>9</a:t>
             </a:fld>
             <a:endParaRPr lang="en-US"/>
           </a:p>
@@ -35463,8 +36239,8 @@
         </p:nvSpPr>
         <p:spPr>
           <a:xfrm>
-            <a:off x="130292" y="136525"/>
-            <a:ext cx="12267318" cy="610873"/>
+            <a:off x="99470" y="319088"/>
+            <a:ext cx="12267318" cy="769441"/>
           </a:xfrm>
           <a:prstGeom prst="rect">
             <a:avLst/>
@@ -35476,13 +36252,9 @@
           </a:bodyPr>
           <a:lstStyle/>
           <a:p>
-            <a:pPr>
-              <a:lnSpc>
-                <a:spcPct val="200000"/>
-              </a:lnSpc>
-            </a:pPr>
-            <a:r>
-              <a:rPr lang="en-US" sz="2000" cap="all" dirty="0">
+            <a:pPr algn="ctr"/>
+            <a:r>
+              <a:rPr lang="en-US" sz="2400" b="1" cap="all" dirty="0">
                 <a:solidFill>
                   <a:srgbClr val="953E16"/>
                 </a:solidFill>
@@ -35490,6 +36262,14 @@
               </a:rPr>
               <a:t>Document frequency matrix (DFM): </a:t>
             </a:r>
+            <a:br>
+              <a:rPr lang="en-US" sz="2000" b="1" cap="all" dirty="0">
+                <a:solidFill>
+                  <a:srgbClr val="953E16"/>
+                </a:solidFill>
+                <a:latin typeface="Century Gothic" panose="020B0502020202020204" pitchFamily="34" charset="0"/>
+              </a:rPr>
+            </a:br>
             <a:r>
               <a:rPr lang="en-US" sz="2000" dirty="0">
                 <a:solidFill>
@@ -35521,178 +36301,6 @@
     <p:extLst>
       <p:ext uri="{BB962C8B-B14F-4D97-AF65-F5344CB8AC3E}">
         <p14:creationId xmlns:p14="http://schemas.microsoft.com/office/powerpoint/2010/main" val="733696881"/>
-      </p:ext>
-    </p:extLst>
-  </p:cSld>
-  <p:clrMapOvr>
-    <a:masterClrMapping/>
-  </p:clrMapOvr>
-</p:sld>
-</file>
-
-<file path=ppt/slides/slide9.xml><?xml version="1.0" encoding="utf-8"?>
-<p:sld xmlns:a="http://schemas.openxmlformats.org/drawingml/2006/main" xmlns:r="http://schemas.openxmlformats.org/officeDocument/2006/relationships" xmlns:p="http://schemas.openxmlformats.org/presentationml/2006/main">
-  <p:cSld>
-    <p:bg>
-      <p:bgPr>
-        <a:solidFill>
-          <a:schemeClr val="bg2">
-            <a:lumMod val="25000"/>
-          </a:schemeClr>
-        </a:solidFill>
-        <a:effectLst/>
-      </p:bgPr>
-    </p:bg>
-    <p:spTree>
-      <p:nvGrpSpPr>
-        <p:cNvPr id="1" name=""/>
-        <p:cNvGrpSpPr/>
-        <p:nvPr/>
-      </p:nvGrpSpPr>
-      <p:grpSpPr>
-        <a:xfrm>
-          <a:off x="0" y="0"/>
-          <a:ext cx="0" cy="0"/>
-          <a:chOff x="0" y="0"/>
-          <a:chExt cx="0" cy="0"/>
-        </a:xfrm>
-      </p:grpSpPr>
-      <p:sp>
-        <p:nvSpPr>
-          <p:cNvPr id="2" name="Title 1">
-            <a:extLst>
-              <a:ext uri="{FF2B5EF4-FFF2-40B4-BE49-F238E27FC236}">
-                <a16:creationId xmlns:a16="http://schemas.microsoft.com/office/drawing/2014/main" id="{F949266A-EDBD-4981-AC19-0432B39789F9}"/>
-              </a:ext>
-            </a:extLst>
-          </p:cNvPr>
-          <p:cNvSpPr>
-            <a:spLocks noGrp="1"/>
-          </p:cNvSpPr>
-          <p:nvPr>
-            <p:ph type="ctrTitle"/>
-          </p:nvPr>
-        </p:nvSpPr>
-        <p:spPr>
-          <a:xfrm>
-            <a:off x="1154984" y="989045"/>
-            <a:ext cx="9663954" cy="2387600"/>
-          </a:xfrm>
-        </p:spPr>
-        <p:txBody>
-          <a:bodyPr>
-            <a:noAutofit/>
-          </a:bodyPr>
-          <a:lstStyle/>
-          <a:p>
-            <a:r>
-              <a:rPr lang="en-US" sz="8000" cap="small" dirty="0">
-                <a:solidFill>
-                  <a:schemeClr val="bg1"/>
-                </a:solidFill>
-              </a:rPr>
-              <a:t>Machine Learning</a:t>
-            </a:r>
-          </a:p>
-        </p:txBody>
-      </p:sp>
-      <p:cxnSp>
-        <p:nvCxnSpPr>
-          <p:cNvPr id="5" name="Straight Connector 4"/>
-          <p:cNvCxnSpPr/>
-          <p:nvPr/>
-        </p:nvCxnSpPr>
-        <p:spPr>
-          <a:xfrm>
-            <a:off x="3433666" y="3704252"/>
-            <a:ext cx="5271796" cy="0"/>
-          </a:xfrm>
-          <a:prstGeom prst="line">
-            <a:avLst/>
-          </a:prstGeom>
-          <a:ln w="22225">
-            <a:solidFill>
-              <a:schemeClr val="bg1"/>
-            </a:solidFill>
-          </a:ln>
-        </p:spPr>
-        <p:style>
-          <a:lnRef idx="1">
-            <a:schemeClr val="accent1"/>
-          </a:lnRef>
-          <a:fillRef idx="0">
-            <a:schemeClr val="accent1"/>
-          </a:fillRef>
-          <a:effectRef idx="0">
-            <a:schemeClr val="accent1"/>
-          </a:effectRef>
-          <a:fontRef idx="minor">
-            <a:schemeClr val="tx1"/>
-          </a:fontRef>
-        </p:style>
-      </p:cxnSp>
-      <p:sp>
-        <p:nvSpPr>
-          <p:cNvPr id="6" name="Title 1">
-            <a:extLst>
-              <a:ext uri="{FF2B5EF4-FFF2-40B4-BE49-F238E27FC236}">
-                <a16:creationId xmlns:a16="http://schemas.microsoft.com/office/drawing/2014/main" id="{F949266A-EDBD-4981-AC19-0432B39789F9}"/>
-              </a:ext>
-            </a:extLst>
-          </p:cNvPr>
-          <p:cNvSpPr txBox="1">
-            <a:spLocks/>
-          </p:cNvSpPr>
-          <p:nvPr/>
-        </p:nvSpPr>
-        <p:spPr>
-          <a:xfrm>
-            <a:off x="1064788" y="2510452"/>
-            <a:ext cx="9663954" cy="2387600"/>
-          </a:xfrm>
-          <a:prstGeom prst="rect">
-            <a:avLst/>
-          </a:prstGeom>
-        </p:spPr>
-        <p:txBody>
-          <a:bodyPr vert="horz" lIns="91440" tIns="45720" rIns="91440" bIns="45720" rtlCol="0" anchor="b">
-            <a:noAutofit/>
-          </a:bodyPr>
-          <a:lstStyle>
-            <a:lvl1pPr algn="ctr" defTabSz="914400" rtl="0" eaLnBrk="1" latinLnBrk="0" hangingPunct="1">
-              <a:lnSpc>
-                <a:spcPct val="90000"/>
-              </a:lnSpc>
-              <a:spcBef>
-                <a:spcPct val="0"/>
-              </a:spcBef>
-              <a:buNone/>
-              <a:defRPr sz="6000" kern="1200">
-                <a:solidFill>
-                  <a:schemeClr val="tx1"/>
-                </a:solidFill>
-                <a:latin typeface="+mj-lt"/>
-                <a:ea typeface="+mj-ea"/>
-                <a:cs typeface="+mj-cs"/>
-              </a:defRPr>
-            </a:lvl1pPr>
-          </a:lstStyle>
-          <a:p>
-            <a:r>
-              <a:rPr lang="en-US" cap="small" dirty="0">
-                <a:solidFill>
-                  <a:schemeClr val="bg1"/>
-                </a:solidFill>
-              </a:rPr>
-              <a:t>( classification )</a:t>
-            </a:r>
-          </a:p>
-        </p:txBody>
-      </p:sp>
-    </p:spTree>
-    <p:extLst>
-      <p:ext uri="{BB962C8B-B14F-4D97-AF65-F5344CB8AC3E}">
-        <p14:creationId xmlns:p14="http://schemas.microsoft.com/office/powerpoint/2010/main" val="788097437"/>
       </p:ext>
     </p:extLst>
   </p:cSld>

</xml_diff>